<commit_message>
Forgrund og baggrund png
</commit_message>
<xml_diff>
--- a/Baggrund til myrespil (Powerpoint er bedre end gimp).pptx
+++ b/Baggrund til myrespil (Powerpoint er bedre end gimp).pptx
@@ -7,6 +7,7 @@
   <p:sldIdLst>
     <p:sldId id="256" r:id="rId2"/>
     <p:sldId id="258" r:id="rId3"/>
+    <p:sldId id="259" r:id="rId4"/>
   </p:sldIdLst>
   <p:sldSz cx="12192000" cy="6858000"/>
   <p:notesSz cx="6858000" cy="9144000"/>
@@ -105,7 +106,495 @@
       </a:defRPr>
     </a:lvl9pPr>
   </p:defaultTextStyle>
+  <p:extLst>
+    <p:ext uri="{EFAFB233-063F-42B5-8137-9DF3F51BA10A}">
+      <p15:sldGuideLst xmlns:p15="http://schemas.microsoft.com/office/powerpoint/2012/main"/>
+    </p:ext>
+  </p:extLst>
 </p:presentation>
+</file>
+
+<file path=ppt/revisionInfo.xml><?xml version="1.0" encoding="utf-8"?>
+<p1510:revInfo xmlns:a="http://schemas.openxmlformats.org/drawingml/2006/main" xmlns:r="http://schemas.openxmlformats.org/officeDocument/2006/relationships" xmlns:p1510="http://schemas.microsoft.com/office/powerpoint/2015/10/main">
+  <p1510:revLst>
+    <p1510:client id="{DC7B2068-E1F4-4E5C-877E-327DD41C7028}" v="249" dt="2022-09-13T08:27:24.376"/>
+  </p1510:revLst>
+</p1510:revInfo>
+</file>
+
+<file path=ppt/changesInfos/changesInfo1.xml><?xml version="1.0" encoding="utf-8"?>
+<pc:chgInfo xmlns:a="http://schemas.openxmlformats.org/drawingml/2006/main" xmlns:r="http://schemas.openxmlformats.org/officeDocument/2006/relationships" xmlns:ac="http://schemas.microsoft.com/office/drawing/2013/main/command" xmlns:pc="http://schemas.microsoft.com/office/powerpoint/2013/main/command">
+  <pc:docChgLst>
+    <pc:chgData name="Cathrine Duedahl-Olesen" userId="0f4ad920445e6980" providerId="LiveId" clId="{DC7B2068-E1F4-4E5C-877E-327DD41C7028}"/>
+    <pc:docChg chg="custSel addSld modSld">
+      <pc:chgData name="Cathrine Duedahl-Olesen" userId="0f4ad920445e6980" providerId="LiveId" clId="{DC7B2068-E1F4-4E5C-877E-327DD41C7028}" dt="2022-09-13T08:27:24.376" v="293" actId="478"/>
+      <pc:docMkLst>
+        <pc:docMk/>
+      </pc:docMkLst>
+      <pc:sldChg chg="addSp delSp modSp mod">
+        <pc:chgData name="Cathrine Duedahl-Olesen" userId="0f4ad920445e6980" providerId="LiveId" clId="{DC7B2068-E1F4-4E5C-877E-327DD41C7028}" dt="2022-09-13T08:27:24.376" v="293" actId="478"/>
+        <pc:sldMkLst>
+          <pc:docMk/>
+          <pc:sldMk cId="431311570" sldId="256"/>
+        </pc:sldMkLst>
+        <pc:spChg chg="mod">
+          <ac:chgData name="Cathrine Duedahl-Olesen" userId="0f4ad920445e6980" providerId="LiveId" clId="{DC7B2068-E1F4-4E5C-877E-327DD41C7028}" dt="2022-09-13T07:52:49.628" v="287" actId="14100"/>
+          <ac:spMkLst>
+            <pc:docMk/>
+            <pc:sldMk cId="431311570" sldId="256"/>
+            <ac:spMk id="69" creationId="{78D079CE-A541-4A70-57D7-595F0CE41B74}"/>
+          </ac:spMkLst>
+        </pc:spChg>
+        <pc:picChg chg="add del mod">
+          <ac:chgData name="Cathrine Duedahl-Olesen" userId="0f4ad920445e6980" providerId="LiveId" clId="{DC7B2068-E1F4-4E5C-877E-327DD41C7028}" dt="2022-09-13T08:27:24.376" v="293" actId="478"/>
+          <ac:picMkLst>
+            <pc:docMk/>
+            <pc:sldMk cId="431311570" sldId="256"/>
+            <ac:picMk id="2" creationId="{9EB95B74-1D1A-E4AD-FAFC-237598594844}"/>
+          </ac:picMkLst>
+        </pc:picChg>
+      </pc:sldChg>
+      <pc:sldChg chg="addSp delSp modSp mod">
+        <pc:chgData name="Cathrine Duedahl-Olesen" userId="0f4ad920445e6980" providerId="LiveId" clId="{DC7B2068-E1F4-4E5C-877E-327DD41C7028}" dt="2022-09-13T07:55:37.487" v="292" actId="478"/>
+        <pc:sldMkLst>
+          <pc:docMk/>
+          <pc:sldMk cId="3262991845" sldId="258"/>
+        </pc:sldMkLst>
+        <pc:spChg chg="del">
+          <ac:chgData name="Cathrine Duedahl-Olesen" userId="0f4ad920445e6980" providerId="LiveId" clId="{DC7B2068-E1F4-4E5C-877E-327DD41C7028}" dt="2022-09-13T07:15:04.862" v="151" actId="478"/>
+          <ac:spMkLst>
+            <pc:docMk/>
+            <pc:sldMk cId="3262991845" sldId="258"/>
+            <ac:spMk id="2" creationId="{2F444BB8-974F-2FFB-3891-72E2CA48B3CE}"/>
+          </ac:spMkLst>
+        </pc:spChg>
+        <pc:spChg chg="mod">
+          <ac:chgData name="Cathrine Duedahl-Olesen" userId="0f4ad920445e6980" providerId="LiveId" clId="{DC7B2068-E1F4-4E5C-877E-327DD41C7028}" dt="2022-09-13T06:58:08.910" v="34" actId="207"/>
+          <ac:spMkLst>
+            <pc:docMk/>
+            <pc:sldMk cId="3262991845" sldId="258"/>
+            <ac:spMk id="39" creationId="{29C78A60-6333-CEEC-E6CE-C677C85FD8CE}"/>
+          </ac:spMkLst>
+        </pc:spChg>
+        <pc:spChg chg="mod">
+          <ac:chgData name="Cathrine Duedahl-Olesen" userId="0f4ad920445e6980" providerId="LiveId" clId="{DC7B2068-E1F4-4E5C-877E-327DD41C7028}" dt="2022-09-13T06:58:03.788" v="32" actId="208"/>
+          <ac:spMkLst>
+            <pc:docMk/>
+            <pc:sldMk cId="3262991845" sldId="258"/>
+            <ac:spMk id="42" creationId="{ACCEFFC4-E204-ADC5-C152-2F92754A061C}"/>
+          </ac:spMkLst>
+        </pc:spChg>
+        <pc:spChg chg="mod">
+          <ac:chgData name="Cathrine Duedahl-Olesen" userId="0f4ad920445e6980" providerId="LiveId" clId="{DC7B2068-E1F4-4E5C-877E-327DD41C7028}" dt="2022-09-13T06:57:59.088" v="30" actId="208"/>
+          <ac:spMkLst>
+            <pc:docMk/>
+            <pc:sldMk cId="3262991845" sldId="258"/>
+            <ac:spMk id="45" creationId="{FAA02CC3-CCB9-C3AB-63F0-D71D0F875E2C}"/>
+          </ac:spMkLst>
+        </pc:spChg>
+        <pc:spChg chg="mod">
+          <ac:chgData name="Cathrine Duedahl-Olesen" userId="0f4ad920445e6980" providerId="LiveId" clId="{DC7B2068-E1F4-4E5C-877E-327DD41C7028}" dt="2022-09-13T06:59:44.477" v="47" actId="1076"/>
+          <ac:spMkLst>
+            <pc:docMk/>
+            <pc:sldMk cId="3262991845" sldId="258"/>
+            <ac:spMk id="49" creationId="{BE0DA540-BE5E-F9C9-040B-89BBC89A1116}"/>
+          </ac:spMkLst>
+        </pc:spChg>
+        <pc:picChg chg="add mod">
+          <ac:chgData name="Cathrine Duedahl-Olesen" userId="0f4ad920445e6980" providerId="LiveId" clId="{DC7B2068-E1F4-4E5C-877E-327DD41C7028}" dt="2022-09-13T07:47:55.967" v="258" actId="14100"/>
+          <ac:picMkLst>
+            <pc:docMk/>
+            <pc:sldMk cId="3262991845" sldId="258"/>
+            <ac:picMk id="4" creationId="{F7D70BF5-5FC5-18B6-DD5B-D22BADAE6E1E}"/>
+          </ac:picMkLst>
+        </pc:picChg>
+        <pc:picChg chg="add mod">
+          <ac:chgData name="Cathrine Duedahl-Olesen" userId="0f4ad920445e6980" providerId="LiveId" clId="{DC7B2068-E1F4-4E5C-877E-327DD41C7028}" dt="2022-09-13T07:09:25.418" v="119" actId="1076"/>
+          <ac:picMkLst>
+            <pc:docMk/>
+            <pc:sldMk cId="3262991845" sldId="258"/>
+            <ac:picMk id="5" creationId="{5FE719CE-7E28-9DFB-D144-E96A5D9D7126}"/>
+          </ac:picMkLst>
+        </pc:picChg>
+        <pc:picChg chg="add mod">
+          <ac:chgData name="Cathrine Duedahl-Olesen" userId="0f4ad920445e6980" providerId="LiveId" clId="{DC7B2068-E1F4-4E5C-877E-327DD41C7028}" dt="2022-09-13T07:08:49.178" v="114" actId="1076"/>
+          <ac:picMkLst>
+            <pc:docMk/>
+            <pc:sldMk cId="3262991845" sldId="258"/>
+            <ac:picMk id="6" creationId="{B8E151BD-3D86-6977-179D-623F0DF9A264}"/>
+          </ac:picMkLst>
+        </pc:picChg>
+        <pc:picChg chg="add mod">
+          <ac:chgData name="Cathrine Duedahl-Olesen" userId="0f4ad920445e6980" providerId="LiveId" clId="{DC7B2068-E1F4-4E5C-877E-327DD41C7028}" dt="2022-09-13T07:09:10.781" v="118" actId="1076"/>
+          <ac:picMkLst>
+            <pc:docMk/>
+            <pc:sldMk cId="3262991845" sldId="258"/>
+            <ac:picMk id="7" creationId="{F7119DA4-2C94-ED05-73D0-8133B3E94F7F}"/>
+          </ac:picMkLst>
+        </pc:picChg>
+        <pc:picChg chg="add mod">
+          <ac:chgData name="Cathrine Duedahl-Olesen" userId="0f4ad920445e6980" providerId="LiveId" clId="{DC7B2068-E1F4-4E5C-877E-327DD41C7028}" dt="2022-09-13T07:10:24.012" v="127" actId="1076"/>
+          <ac:picMkLst>
+            <pc:docMk/>
+            <pc:sldMk cId="3262991845" sldId="258"/>
+            <ac:picMk id="8" creationId="{23675225-3AD6-2B48-33D5-84A18011BD8A}"/>
+          </ac:picMkLst>
+        </pc:picChg>
+        <pc:picChg chg="add mod">
+          <ac:chgData name="Cathrine Duedahl-Olesen" userId="0f4ad920445e6980" providerId="LiveId" clId="{DC7B2068-E1F4-4E5C-877E-327DD41C7028}" dt="2022-09-13T07:10:20.235" v="126" actId="1076"/>
+          <ac:picMkLst>
+            <pc:docMk/>
+            <pc:sldMk cId="3262991845" sldId="258"/>
+            <ac:picMk id="9" creationId="{2C8CCB34-D6FC-E253-B1C5-F45BFF8F8F6A}"/>
+          </ac:picMkLst>
+        </pc:picChg>
+        <pc:picChg chg="add mod">
+          <ac:chgData name="Cathrine Duedahl-Olesen" userId="0f4ad920445e6980" providerId="LiveId" clId="{DC7B2068-E1F4-4E5C-877E-327DD41C7028}" dt="2022-09-13T07:10:33.343" v="129" actId="1076"/>
+          <ac:picMkLst>
+            <pc:docMk/>
+            <pc:sldMk cId="3262991845" sldId="258"/>
+            <ac:picMk id="10" creationId="{175434BA-FDD0-4494-D7ED-12DAA1F2EE78}"/>
+          </ac:picMkLst>
+        </pc:picChg>
+        <pc:picChg chg="add mod">
+          <ac:chgData name="Cathrine Duedahl-Olesen" userId="0f4ad920445e6980" providerId="LiveId" clId="{DC7B2068-E1F4-4E5C-877E-327DD41C7028}" dt="2022-09-13T07:10:52.984" v="132" actId="14100"/>
+          <ac:picMkLst>
+            <pc:docMk/>
+            <pc:sldMk cId="3262991845" sldId="258"/>
+            <ac:picMk id="11" creationId="{5F920E76-EBAE-5D52-9427-07209FEDFAB0}"/>
+          </ac:picMkLst>
+        </pc:picChg>
+        <pc:picChg chg="add del mod">
+          <ac:chgData name="Cathrine Duedahl-Olesen" userId="0f4ad920445e6980" providerId="LiveId" clId="{DC7B2068-E1F4-4E5C-877E-327DD41C7028}" dt="2022-09-13T07:53:40.506" v="290" actId="478"/>
+          <ac:picMkLst>
+            <pc:docMk/>
+            <pc:sldMk cId="3262991845" sldId="258"/>
+            <ac:picMk id="12" creationId="{671E6FC4-C8A8-4950-3007-1530829229B0}"/>
+          </ac:picMkLst>
+        </pc:picChg>
+        <pc:picChg chg="add mod">
+          <ac:chgData name="Cathrine Duedahl-Olesen" userId="0f4ad920445e6980" providerId="LiveId" clId="{DC7B2068-E1F4-4E5C-877E-327DD41C7028}" dt="2022-09-13T07:15:26.787" v="155" actId="1076"/>
+          <ac:picMkLst>
+            <pc:docMk/>
+            <pc:sldMk cId="3262991845" sldId="258"/>
+            <ac:picMk id="13" creationId="{A6D1A054-6DAC-3FF3-6FCB-05350FE8E551}"/>
+          </ac:picMkLst>
+        </pc:picChg>
+        <pc:picChg chg="add del mod">
+          <ac:chgData name="Cathrine Duedahl-Olesen" userId="0f4ad920445e6980" providerId="LiveId" clId="{DC7B2068-E1F4-4E5C-877E-327DD41C7028}" dt="2022-09-13T07:20:44.289" v="168" actId="478"/>
+          <ac:picMkLst>
+            <pc:docMk/>
+            <pc:sldMk cId="3262991845" sldId="258"/>
+            <ac:picMk id="14" creationId="{3471F4D4-A0F3-7C05-4FEC-BDF3B86A36DF}"/>
+          </ac:picMkLst>
+        </pc:picChg>
+        <pc:picChg chg="add del mod">
+          <ac:chgData name="Cathrine Duedahl-Olesen" userId="0f4ad920445e6980" providerId="LiveId" clId="{DC7B2068-E1F4-4E5C-877E-327DD41C7028}" dt="2022-09-13T07:32:49.184" v="201" actId="478"/>
+          <ac:picMkLst>
+            <pc:docMk/>
+            <pc:sldMk cId="3262991845" sldId="258"/>
+            <ac:picMk id="15" creationId="{63E396B3-39DB-B5B0-2A1F-2CDE9DC22267}"/>
+          </ac:picMkLst>
+        </pc:picChg>
+        <pc:picChg chg="add mod ord">
+          <ac:chgData name="Cathrine Duedahl-Olesen" userId="0f4ad920445e6980" providerId="LiveId" clId="{DC7B2068-E1F4-4E5C-877E-327DD41C7028}" dt="2022-09-13T07:48:12.976" v="260" actId="14100"/>
+          <ac:picMkLst>
+            <pc:docMk/>
+            <pc:sldMk cId="3262991845" sldId="258"/>
+            <ac:picMk id="17" creationId="{F5240DBC-9482-9659-A0DB-98556F58CE36}"/>
+          </ac:picMkLst>
+        </pc:picChg>
+        <pc:picChg chg="add mod ord">
+          <ac:chgData name="Cathrine Duedahl-Olesen" userId="0f4ad920445e6980" providerId="LiveId" clId="{DC7B2068-E1F4-4E5C-877E-327DD41C7028}" dt="2022-09-13T07:48:22.266" v="261" actId="14100"/>
+          <ac:picMkLst>
+            <pc:docMk/>
+            <pc:sldMk cId="3262991845" sldId="258"/>
+            <ac:picMk id="19" creationId="{C9857FAE-FAA9-67C9-2D78-A69105D36603}"/>
+          </ac:picMkLst>
+        </pc:picChg>
+        <pc:picChg chg="add del mod ord">
+          <ac:chgData name="Cathrine Duedahl-Olesen" userId="0f4ad920445e6980" providerId="LiveId" clId="{DC7B2068-E1F4-4E5C-877E-327DD41C7028}" dt="2022-09-13T07:48:08.362" v="259" actId="478"/>
+          <ac:picMkLst>
+            <pc:docMk/>
+            <pc:sldMk cId="3262991845" sldId="258"/>
+            <ac:picMk id="21" creationId="{5EFF8883-5D99-C1D6-67E8-F984530BF480}"/>
+          </ac:picMkLst>
+        </pc:picChg>
+        <pc:picChg chg="add del mod">
+          <ac:chgData name="Cathrine Duedahl-Olesen" userId="0f4ad920445e6980" providerId="LiveId" clId="{DC7B2068-E1F4-4E5C-877E-327DD41C7028}" dt="2022-09-13T07:50:10.207" v="265" actId="478"/>
+          <ac:picMkLst>
+            <pc:docMk/>
+            <pc:sldMk cId="3262991845" sldId="258"/>
+            <ac:picMk id="22" creationId="{B15DD545-19A3-14D2-E1DA-9630B06856A3}"/>
+          </ac:picMkLst>
+        </pc:picChg>
+        <pc:picChg chg="add mod">
+          <ac:chgData name="Cathrine Duedahl-Olesen" userId="0f4ad920445e6980" providerId="LiveId" clId="{DC7B2068-E1F4-4E5C-877E-327DD41C7028}" dt="2022-09-13T07:53:42.184" v="291"/>
+          <ac:picMkLst>
+            <pc:docMk/>
+            <pc:sldMk cId="3262991845" sldId="258"/>
+            <ac:picMk id="23" creationId="{E60CA198-11B4-5B95-D4E7-F4BB94052518}"/>
+          </ac:picMkLst>
+        </pc:picChg>
+        <pc:picChg chg="add del mod">
+          <ac:chgData name="Cathrine Duedahl-Olesen" userId="0f4ad920445e6980" providerId="LiveId" clId="{DC7B2068-E1F4-4E5C-877E-327DD41C7028}" dt="2022-09-13T06:47:07.999" v="16" actId="478"/>
+          <ac:picMkLst>
+            <pc:docMk/>
+            <pc:sldMk cId="3262991845" sldId="258"/>
+            <ac:picMk id="1026" creationId="{F6DEB013-0D60-EDE1-0993-88FA839BB5BE}"/>
+          </ac:picMkLst>
+        </pc:picChg>
+        <pc:picChg chg="add del mod">
+          <ac:chgData name="Cathrine Duedahl-Olesen" userId="0f4ad920445e6980" providerId="LiveId" clId="{DC7B2068-E1F4-4E5C-877E-327DD41C7028}" dt="2022-09-13T06:47:06.184" v="15" actId="478"/>
+          <ac:picMkLst>
+            <pc:docMk/>
+            <pc:sldMk cId="3262991845" sldId="258"/>
+            <ac:picMk id="1028" creationId="{178639DE-2FA9-2B1B-4903-67D12B2791D4}"/>
+          </ac:picMkLst>
+        </pc:picChg>
+        <pc:picChg chg="add del mod">
+          <ac:chgData name="Cathrine Duedahl-Olesen" userId="0f4ad920445e6980" providerId="LiveId" clId="{DC7B2068-E1F4-4E5C-877E-327DD41C7028}" dt="2022-09-13T07:15:13.575" v="153" actId="478"/>
+          <ac:picMkLst>
+            <pc:docMk/>
+            <pc:sldMk cId="3262991845" sldId="258"/>
+            <ac:picMk id="1030" creationId="{C8A16169-ECF6-18F2-FBBC-4FA541C3289C}"/>
+          </ac:picMkLst>
+        </pc:picChg>
+        <pc:picChg chg="add del mod">
+          <ac:chgData name="Cathrine Duedahl-Olesen" userId="0f4ad920445e6980" providerId="LiveId" clId="{DC7B2068-E1F4-4E5C-877E-327DD41C7028}" dt="2022-09-13T06:59:30.327" v="40"/>
+          <ac:picMkLst>
+            <pc:docMk/>
+            <pc:sldMk cId="3262991845" sldId="258"/>
+            <ac:picMk id="1032" creationId="{366D9A7D-CF00-A685-3742-B0B6DF6AB1F1}"/>
+          </ac:picMkLst>
+        </pc:picChg>
+        <pc:picChg chg="add del mod">
+          <ac:chgData name="Cathrine Duedahl-Olesen" userId="0f4ad920445e6980" providerId="LiveId" clId="{DC7B2068-E1F4-4E5C-877E-327DD41C7028}" dt="2022-09-13T06:59:37.406" v="44"/>
+          <ac:picMkLst>
+            <pc:docMk/>
+            <pc:sldMk cId="3262991845" sldId="258"/>
+            <ac:picMk id="1034" creationId="{BAC59397-E776-3D49-51FC-15F97D3E3AEA}"/>
+          </ac:picMkLst>
+        </pc:picChg>
+        <pc:picChg chg="add del mod">
+          <ac:chgData name="Cathrine Duedahl-Olesen" userId="0f4ad920445e6980" providerId="LiveId" clId="{DC7B2068-E1F4-4E5C-877E-327DD41C7028}" dt="2022-09-13T06:59:45.360" v="48"/>
+          <ac:picMkLst>
+            <pc:docMk/>
+            <pc:sldMk cId="3262991845" sldId="258"/>
+            <ac:picMk id="1036" creationId="{F55A9B66-B60B-7C2E-7E5C-9503B5854A06}"/>
+          </ac:picMkLst>
+        </pc:picChg>
+        <pc:picChg chg="add del mod">
+          <ac:chgData name="Cathrine Duedahl-Olesen" userId="0f4ad920445e6980" providerId="LiveId" clId="{DC7B2068-E1F4-4E5C-877E-327DD41C7028}" dt="2022-09-13T06:59:54.456" v="51" actId="478"/>
+          <ac:picMkLst>
+            <pc:docMk/>
+            <pc:sldMk cId="3262991845" sldId="258"/>
+            <ac:picMk id="1038" creationId="{AE74D7AA-644D-9CE0-2A5A-8137EA005032}"/>
+          </ac:picMkLst>
+        </pc:picChg>
+        <pc:picChg chg="add del mod">
+          <ac:chgData name="Cathrine Duedahl-Olesen" userId="0f4ad920445e6980" providerId="LiveId" clId="{DC7B2068-E1F4-4E5C-877E-327DD41C7028}" dt="2022-09-13T07:01:11.323" v="61" actId="478"/>
+          <ac:picMkLst>
+            <pc:docMk/>
+            <pc:sldMk cId="3262991845" sldId="258"/>
+            <ac:picMk id="1040" creationId="{E318E1F7-E61D-3B74-8802-3AF3A642CEB0}"/>
+          </ac:picMkLst>
+        </pc:picChg>
+        <pc:picChg chg="add del mod">
+          <ac:chgData name="Cathrine Duedahl-Olesen" userId="0f4ad920445e6980" providerId="LiveId" clId="{DC7B2068-E1F4-4E5C-877E-327DD41C7028}" dt="2022-09-13T07:02:04.734" v="71" actId="478"/>
+          <ac:picMkLst>
+            <pc:docMk/>
+            <pc:sldMk cId="3262991845" sldId="258"/>
+            <ac:picMk id="1042" creationId="{469DCA38-6DB5-9BF0-0C59-C1B97149CE3A}"/>
+          </ac:picMkLst>
+        </pc:picChg>
+        <pc:picChg chg="add del mod">
+          <ac:chgData name="Cathrine Duedahl-Olesen" userId="0f4ad920445e6980" providerId="LiveId" clId="{DC7B2068-E1F4-4E5C-877E-327DD41C7028}" dt="2022-09-13T07:02:47.167" v="74" actId="478"/>
+          <ac:picMkLst>
+            <pc:docMk/>
+            <pc:sldMk cId="3262991845" sldId="258"/>
+            <ac:picMk id="1044" creationId="{FD4DC21B-6F06-42F0-97BC-D5F8F2180D73}"/>
+          </ac:picMkLst>
+        </pc:picChg>
+        <pc:picChg chg="add del mod">
+          <ac:chgData name="Cathrine Duedahl-Olesen" userId="0f4ad920445e6980" providerId="LiveId" clId="{DC7B2068-E1F4-4E5C-877E-327DD41C7028}" dt="2022-09-13T07:04:01.841" v="82" actId="478"/>
+          <ac:picMkLst>
+            <pc:docMk/>
+            <pc:sldMk cId="3262991845" sldId="258"/>
+            <ac:picMk id="1046" creationId="{984A49AC-40F8-3F67-00CB-B11F5B40D526}"/>
+          </ac:picMkLst>
+        </pc:picChg>
+        <pc:picChg chg="add mod">
+          <ac:chgData name="Cathrine Duedahl-Olesen" userId="0f4ad920445e6980" providerId="LiveId" clId="{DC7B2068-E1F4-4E5C-877E-327DD41C7028}" dt="2022-09-13T07:06:57.375" v="104" actId="1076"/>
+          <ac:picMkLst>
+            <pc:docMk/>
+            <pc:sldMk cId="3262991845" sldId="258"/>
+            <ac:picMk id="1048" creationId="{DE5A3D14-EC96-91EC-ADAB-A94B419C32B2}"/>
+          </ac:picMkLst>
+        </pc:picChg>
+        <pc:picChg chg="add mod">
+          <ac:chgData name="Cathrine Duedahl-Olesen" userId="0f4ad920445e6980" providerId="LiveId" clId="{DC7B2068-E1F4-4E5C-877E-327DD41C7028}" dt="2022-09-13T07:05:27.979" v="89" actId="1076"/>
+          <ac:picMkLst>
+            <pc:docMk/>
+            <pc:sldMk cId="3262991845" sldId="258"/>
+            <ac:picMk id="1050" creationId="{68F50C16-2713-0F5A-EAA1-9166429CEF52}"/>
+          </ac:picMkLst>
+        </pc:picChg>
+        <pc:picChg chg="add del mod">
+          <ac:chgData name="Cathrine Duedahl-Olesen" userId="0f4ad920445e6980" providerId="LiveId" clId="{DC7B2068-E1F4-4E5C-877E-327DD41C7028}" dt="2022-09-13T07:13:50.555" v="139"/>
+          <ac:picMkLst>
+            <pc:docMk/>
+            <pc:sldMk cId="3262991845" sldId="258"/>
+            <ac:picMk id="1052" creationId="{66713EC0-E89E-4042-FC8E-433EB88156B4}"/>
+          </ac:picMkLst>
+        </pc:picChg>
+        <pc:picChg chg="del mod">
+          <ac:chgData name="Cathrine Duedahl-Olesen" userId="0f4ad920445e6980" providerId="LiveId" clId="{DC7B2068-E1F4-4E5C-877E-327DD41C7028}" dt="2022-09-13T07:55:37.487" v="292" actId="478"/>
+          <ac:picMkLst>
+            <pc:docMk/>
+            <pc:sldMk cId="3262991845" sldId="258"/>
+            <ac:picMk id="1054" creationId="{07A16504-209B-3EC9-FA71-0BD0D4BA0F7F}"/>
+          </ac:picMkLst>
+        </pc:picChg>
+        <pc:picChg chg="add del">
+          <ac:chgData name="Cathrine Duedahl-Olesen" userId="0f4ad920445e6980" providerId="LiveId" clId="{DC7B2068-E1F4-4E5C-877E-327DD41C7028}" dt="2022-09-13T07:18:05.076" v="165"/>
+          <ac:picMkLst>
+            <pc:docMk/>
+            <pc:sldMk cId="3262991845" sldId="258"/>
+            <ac:picMk id="1056" creationId="{8E9FB2B1-863E-2C7C-BDA1-CDB454648FE3}"/>
+          </ac:picMkLst>
+        </pc:picChg>
+        <pc:picChg chg="add del">
+          <ac:chgData name="Cathrine Duedahl-Olesen" userId="0f4ad920445e6980" providerId="LiveId" clId="{DC7B2068-E1F4-4E5C-877E-327DD41C7028}" dt="2022-09-13T07:20:57.761" v="170" actId="478"/>
+          <ac:picMkLst>
+            <pc:docMk/>
+            <pc:sldMk cId="3262991845" sldId="258"/>
+            <ac:picMk id="1058" creationId="{2632CEC1-CCE9-C451-3D44-6FAC8525ABEB}"/>
+          </ac:picMkLst>
+        </pc:picChg>
+        <pc:picChg chg="add del">
+          <ac:chgData name="Cathrine Duedahl-Olesen" userId="0f4ad920445e6980" providerId="LiveId" clId="{DC7B2068-E1F4-4E5C-877E-327DD41C7028}" dt="2022-09-13T07:21:26.842" v="172" actId="478"/>
+          <ac:picMkLst>
+            <pc:docMk/>
+            <pc:sldMk cId="3262991845" sldId="258"/>
+            <ac:picMk id="1060" creationId="{A21D8410-C3A7-56AA-E929-BA3962EA77A2}"/>
+          </ac:picMkLst>
+        </pc:picChg>
+        <pc:picChg chg="add del mod">
+          <ac:chgData name="Cathrine Duedahl-Olesen" userId="0f4ad920445e6980" providerId="LiveId" clId="{DC7B2068-E1F4-4E5C-877E-327DD41C7028}" dt="2022-09-13T07:25:21.863" v="176" actId="478"/>
+          <ac:picMkLst>
+            <pc:docMk/>
+            <pc:sldMk cId="3262991845" sldId="258"/>
+            <ac:picMk id="1062" creationId="{D7D616C0-72F9-234C-E4AA-E4E4DB1F8372}"/>
+          </ac:picMkLst>
+        </pc:picChg>
+        <pc:picChg chg="add del mod">
+          <ac:chgData name="Cathrine Duedahl-Olesen" userId="0f4ad920445e6980" providerId="LiveId" clId="{DC7B2068-E1F4-4E5C-877E-327DD41C7028}" dt="2022-09-13T07:25:41.570" v="185" actId="478"/>
+          <ac:picMkLst>
+            <pc:docMk/>
+            <pc:sldMk cId="3262991845" sldId="258"/>
+            <ac:picMk id="1064" creationId="{F6647BF1-5D9D-8BBB-81F3-14E8F81DA85F}"/>
+          </ac:picMkLst>
+        </pc:picChg>
+        <pc:picChg chg="add del mod">
+          <ac:chgData name="Cathrine Duedahl-Olesen" userId="0f4ad920445e6980" providerId="LiveId" clId="{DC7B2068-E1F4-4E5C-877E-327DD41C7028}" dt="2022-09-13T07:26:32.575" v="188" actId="478"/>
+          <ac:picMkLst>
+            <pc:docMk/>
+            <pc:sldMk cId="3262991845" sldId="258"/>
+            <ac:picMk id="1066" creationId="{BCB3DE69-3E11-1FB1-3B46-437E322C478E}"/>
+          </ac:picMkLst>
+        </pc:picChg>
+        <pc:picChg chg="add del mod">
+          <ac:chgData name="Cathrine Duedahl-Olesen" userId="0f4ad920445e6980" providerId="LiveId" clId="{DC7B2068-E1F4-4E5C-877E-327DD41C7028}" dt="2022-09-13T07:29:00.638" v="197" actId="478"/>
+          <ac:picMkLst>
+            <pc:docMk/>
+            <pc:sldMk cId="3262991845" sldId="258"/>
+            <ac:picMk id="1068" creationId="{5E8B729A-961C-E70A-AEFF-A0D707789E0B}"/>
+          </ac:picMkLst>
+        </pc:picChg>
+        <pc:picChg chg="add del mod">
+          <ac:chgData name="Cathrine Duedahl-Olesen" userId="0f4ad920445e6980" providerId="LiveId" clId="{DC7B2068-E1F4-4E5C-877E-327DD41C7028}" dt="2022-09-13T07:33:12.974" v="205" actId="478"/>
+          <ac:picMkLst>
+            <pc:docMk/>
+            <pc:sldMk cId="3262991845" sldId="258"/>
+            <ac:picMk id="1070" creationId="{D6F0369C-DC9A-AC3D-F026-8F1DE0E0B907}"/>
+          </ac:picMkLst>
+        </pc:picChg>
+        <pc:picChg chg="add del mod">
+          <ac:chgData name="Cathrine Duedahl-Olesen" userId="0f4ad920445e6980" providerId="LiveId" clId="{DC7B2068-E1F4-4E5C-877E-327DD41C7028}" dt="2022-09-13T07:35:58.158" v="215" actId="478"/>
+          <ac:picMkLst>
+            <pc:docMk/>
+            <pc:sldMk cId="3262991845" sldId="258"/>
+            <ac:picMk id="1072" creationId="{E64E12B8-7C11-902D-064F-346D29D94A79}"/>
+          </ac:picMkLst>
+        </pc:picChg>
+        <pc:picChg chg="add del mod">
+          <ac:chgData name="Cathrine Duedahl-Olesen" userId="0f4ad920445e6980" providerId="LiveId" clId="{DC7B2068-E1F4-4E5C-877E-327DD41C7028}" dt="2022-09-13T07:37:30.182" v="222" actId="478"/>
+          <ac:picMkLst>
+            <pc:docMk/>
+            <pc:sldMk cId="3262991845" sldId="258"/>
+            <ac:picMk id="1074" creationId="{79220190-D86C-DEBB-7EA4-633D26FDD1B3}"/>
+          </ac:picMkLst>
+        </pc:picChg>
+        <pc:picChg chg="add del mod">
+          <ac:chgData name="Cathrine Duedahl-Olesen" userId="0f4ad920445e6980" providerId="LiveId" clId="{DC7B2068-E1F4-4E5C-877E-327DD41C7028}" dt="2022-09-13T07:43:54.729" v="234" actId="478"/>
+          <ac:picMkLst>
+            <pc:docMk/>
+            <pc:sldMk cId="3262991845" sldId="258"/>
+            <ac:picMk id="1076" creationId="{F17F7970-206D-6B25-957A-47D6997C4F29}"/>
+          </ac:picMkLst>
+        </pc:picChg>
+        <pc:picChg chg="del">
+          <ac:chgData name="Cathrine Duedahl-Olesen" userId="0f4ad920445e6980" providerId="LiveId" clId="{DC7B2068-E1F4-4E5C-877E-327DD41C7028}" dt="2022-09-13T07:14:05.469" v="143" actId="478"/>
+          <ac:picMkLst>
+            <pc:docMk/>
+            <pc:sldMk cId="3262991845" sldId="258"/>
+            <ac:picMk id="2054" creationId="{7E1B3FF8-B712-BD57-D2EC-E78B0CCE906D}"/>
+          </ac:picMkLst>
+        </pc:picChg>
+        <pc:picChg chg="mod">
+          <ac:chgData name="Cathrine Duedahl-Olesen" userId="0f4ad920445e6980" providerId="LiveId" clId="{DC7B2068-E1F4-4E5C-877E-327DD41C7028}" dt="2022-09-13T07:15:31.747" v="156" actId="1076"/>
+          <ac:picMkLst>
+            <pc:docMk/>
+            <pc:sldMk cId="3262991845" sldId="258"/>
+            <ac:picMk id="2064" creationId="{2939920B-EA15-252B-07D3-C13FBB53BE5F}"/>
+          </ac:picMkLst>
+        </pc:picChg>
+        <pc:picChg chg="mod">
+          <ac:chgData name="Cathrine Duedahl-Olesen" userId="0f4ad920445e6980" providerId="LiveId" clId="{DC7B2068-E1F4-4E5C-877E-327DD41C7028}" dt="2022-09-13T07:15:36.952" v="157" actId="1076"/>
+          <ac:picMkLst>
+            <pc:docMk/>
+            <pc:sldMk cId="3262991845" sldId="258"/>
+            <ac:picMk id="2066" creationId="{F811E012-932E-5535-B609-7459EE07C8E2}"/>
+          </ac:picMkLst>
+        </pc:picChg>
+        <pc:picChg chg="del">
+          <ac:chgData name="Cathrine Duedahl-Olesen" userId="0f4ad920445e6980" providerId="LiveId" clId="{DC7B2068-E1F4-4E5C-877E-327DD41C7028}" dt="2022-09-13T06:44:59.242" v="0" actId="478"/>
+          <ac:picMkLst>
+            <pc:docMk/>
+            <pc:sldMk cId="3262991845" sldId="258"/>
+            <ac:picMk id="2074" creationId="{F17D7F41-74A7-452D-28CF-AFBC4B52CB42}"/>
+          </ac:picMkLst>
+        </pc:picChg>
+      </pc:sldChg>
+      <pc:sldChg chg="addSp delSp modSp new">
+        <pc:chgData name="Cathrine Duedahl-Olesen" userId="0f4ad920445e6980" providerId="LiveId" clId="{DC7B2068-E1F4-4E5C-877E-327DD41C7028}" dt="2022-09-13T07:50:01.575" v="263" actId="21"/>
+        <pc:sldMkLst>
+          <pc:docMk/>
+          <pc:sldMk cId="2862107733" sldId="259"/>
+        </pc:sldMkLst>
+        <pc:picChg chg="add del mod">
+          <ac:chgData name="Cathrine Duedahl-Olesen" userId="0f4ad920445e6980" providerId="LiveId" clId="{DC7B2068-E1F4-4E5C-877E-327DD41C7028}" dt="2022-09-13T07:50:01.575" v="263" actId="21"/>
+          <ac:picMkLst>
+            <pc:docMk/>
+            <pc:sldMk cId="2862107733" sldId="259"/>
+            <ac:picMk id="4" creationId="{20065C4F-61C7-6FF5-1EA0-29D779770C8D}"/>
+          </ac:picMkLst>
+        </pc:picChg>
+      </pc:sldChg>
+    </pc:docChg>
+  </pc:docChgLst>
+</pc:chgInfo>
 </file>
 
 <file path=ppt/slideLayouts/slideLayout1.xml><?xml version="1.0" encoding="utf-8"?>
@@ -257,7 +746,7 @@
           <a:p>
             <a:fld id="{FD2766A6-3C10-4AB8-86A1-BB1F0CDA7EFE}" type="datetimeFigureOut">
               <a:rPr lang="en-US" smtClean="0"/>
-              <a:t>9/12/2022</a:t>
+              <a:t>9/13/2022</a:t>
             </a:fld>
             <a:endParaRPr lang="en-US"/>
           </a:p>
@@ -455,7 +944,7 @@
           <a:p>
             <a:fld id="{FD2766A6-3C10-4AB8-86A1-BB1F0CDA7EFE}" type="datetimeFigureOut">
               <a:rPr lang="en-US" smtClean="0"/>
-              <a:t>9/12/2022</a:t>
+              <a:t>9/13/2022</a:t>
             </a:fld>
             <a:endParaRPr lang="en-US"/>
           </a:p>
@@ -663,7 +1152,7 @@
           <a:p>
             <a:fld id="{FD2766A6-3C10-4AB8-86A1-BB1F0CDA7EFE}" type="datetimeFigureOut">
               <a:rPr lang="en-US" smtClean="0"/>
-              <a:t>9/12/2022</a:t>
+              <a:t>9/13/2022</a:t>
             </a:fld>
             <a:endParaRPr lang="en-US"/>
           </a:p>
@@ -861,7 +1350,7 @@
           <a:p>
             <a:fld id="{FD2766A6-3C10-4AB8-86A1-BB1F0CDA7EFE}" type="datetimeFigureOut">
               <a:rPr lang="en-US" smtClean="0"/>
-              <a:t>9/12/2022</a:t>
+              <a:t>9/13/2022</a:t>
             </a:fld>
             <a:endParaRPr lang="en-US"/>
           </a:p>
@@ -1134,7 +1623,7 @@
           <a:p>
             <a:fld id="{FD2766A6-3C10-4AB8-86A1-BB1F0CDA7EFE}" type="datetimeFigureOut">
               <a:rPr lang="en-US" smtClean="0"/>
-              <a:t>9/12/2022</a:t>
+              <a:t>9/13/2022</a:t>
             </a:fld>
             <a:endParaRPr lang="en-US"/>
           </a:p>
@@ -1399,7 +1888,7 @@
           <a:p>
             <a:fld id="{FD2766A6-3C10-4AB8-86A1-BB1F0CDA7EFE}" type="datetimeFigureOut">
               <a:rPr lang="en-US" smtClean="0"/>
-              <a:t>9/12/2022</a:t>
+              <a:t>9/13/2022</a:t>
             </a:fld>
             <a:endParaRPr lang="en-US"/>
           </a:p>
@@ -1825,7 +2314,7 @@
           <a:p>
             <a:fld id="{FD2766A6-3C10-4AB8-86A1-BB1F0CDA7EFE}" type="datetimeFigureOut">
               <a:rPr lang="en-US" smtClean="0"/>
-              <a:t>9/12/2022</a:t>
+              <a:t>9/13/2022</a:t>
             </a:fld>
             <a:endParaRPr lang="en-US"/>
           </a:p>
@@ -1966,7 +2455,7 @@
           <a:p>
             <a:fld id="{FD2766A6-3C10-4AB8-86A1-BB1F0CDA7EFE}" type="datetimeFigureOut">
               <a:rPr lang="en-US" smtClean="0"/>
-              <a:t>9/12/2022</a:t>
+              <a:t>9/13/2022</a:t>
             </a:fld>
             <a:endParaRPr lang="en-US"/>
           </a:p>
@@ -2079,7 +2568,7 @@
           <a:p>
             <a:fld id="{FD2766A6-3C10-4AB8-86A1-BB1F0CDA7EFE}" type="datetimeFigureOut">
               <a:rPr lang="en-US" smtClean="0"/>
-              <a:t>9/12/2022</a:t>
+              <a:t>9/13/2022</a:t>
             </a:fld>
             <a:endParaRPr lang="en-US"/>
           </a:p>
@@ -2434,7 +2923,7 @@
           <a:p>
             <a:fld id="{FD2766A6-3C10-4AB8-86A1-BB1F0CDA7EFE}" type="datetimeFigureOut">
               <a:rPr lang="en-US" smtClean="0"/>
-              <a:t>9/12/2022</a:t>
+              <a:t>9/13/2022</a:t>
             </a:fld>
             <a:endParaRPr lang="en-US"/>
           </a:p>
@@ -2764,7 +3253,7 @@
           <a:p>
             <a:fld id="{FD2766A6-3C10-4AB8-86A1-BB1F0CDA7EFE}" type="datetimeFigureOut">
               <a:rPr lang="en-US" smtClean="0"/>
-              <a:t>9/12/2022</a:t>
+              <a:t>9/13/2022</a:t>
             </a:fld>
             <a:endParaRPr lang="en-US"/>
           </a:p>
@@ -3006,7 +3495,7 @@
             <a:fld id="{FD2766A6-3C10-4AB8-86A1-BB1F0CDA7EFE}" type="datetimeFigureOut">
               <a:rPr lang="en-US" smtClean="0"/>
               <a:pPr/>
-              <a:t>9/12/2022</a:t>
+              <a:t>9/13/2022</a:t>
             </a:fld>
             <a:endParaRPr lang="en-US" dirty="0"/>
           </a:p>
@@ -3723,9 +4212,9 @@
           <p:nvPr/>
         </p:nvSpPr>
         <p:spPr>
-          <a:xfrm>
-            <a:off x="0" y="2265680"/>
-            <a:ext cx="1310640" cy="1436370"/>
+          <a:xfrm rot="325130">
+            <a:off x="-63710" y="2373360"/>
+            <a:ext cx="1312204" cy="1378227"/>
           </a:xfrm>
           <a:prstGeom prst="rect">
             <a:avLst/>
@@ -3788,10 +4277,70 @@
       </p:grpSpPr>
       <p:pic>
         <p:nvPicPr>
-          <p:cNvPr id="2074" name="Picture 26" descr="red-brick-wall-tall - MCF Construction">
-            <a:extLst>
-              <a:ext uri="{FF2B5EF4-FFF2-40B4-BE49-F238E27FC236}">
-                <a16:creationId xmlns:a16="http://schemas.microsoft.com/office/drawing/2014/main" id="{F17D7F41-74A7-452D-28CF-AFBC4B52CB42}"/>
+          <p:cNvPr id="19" name="Picture 18">
+            <a:extLst>
+              <a:ext uri="{FF2B5EF4-FFF2-40B4-BE49-F238E27FC236}">
+                <a16:creationId xmlns:a16="http://schemas.microsoft.com/office/drawing/2014/main" id="{C9857FAE-FAA9-67C9-2D78-A69105D36603}"/>
+              </a:ext>
+            </a:extLst>
+          </p:cNvPr>
+          <p:cNvPicPr>
+            <a:picLocks noChangeAspect="1"/>
+          </p:cNvPicPr>
+          <p:nvPr/>
+        </p:nvPicPr>
+        <p:blipFill>
+          <a:blip r:embed="rId2"/>
+          <a:stretch>
+            <a:fillRect/>
+          </a:stretch>
+        </p:blipFill>
+        <p:spPr>
+          <a:xfrm rot="10800000">
+            <a:off x="9666" y="-12857"/>
+            <a:ext cx="12182334" cy="3253294"/>
+          </a:xfrm>
+          <a:prstGeom prst="rect">
+            <a:avLst/>
+          </a:prstGeom>
+        </p:spPr>
+      </p:pic>
+      <p:pic>
+        <p:nvPicPr>
+          <p:cNvPr id="17" name="Picture 16">
+            <a:extLst>
+              <a:ext uri="{FF2B5EF4-FFF2-40B4-BE49-F238E27FC236}">
+                <a16:creationId xmlns:a16="http://schemas.microsoft.com/office/drawing/2014/main" id="{F5240DBC-9482-9659-A0DB-98556F58CE36}"/>
+              </a:ext>
+            </a:extLst>
+          </p:cNvPr>
+          <p:cNvPicPr>
+            <a:picLocks noChangeAspect="1"/>
+          </p:cNvPicPr>
+          <p:nvPr/>
+        </p:nvPicPr>
+        <p:blipFill>
+          <a:blip r:embed="rId2"/>
+          <a:stretch>
+            <a:fillRect/>
+          </a:stretch>
+        </p:blipFill>
+        <p:spPr>
+          <a:xfrm>
+            <a:off x="0" y="3243243"/>
+            <a:ext cx="12192000" cy="3381875"/>
+          </a:xfrm>
+          <a:prstGeom prst="rect">
+            <a:avLst/>
+          </a:prstGeom>
+        </p:spPr>
+      </p:pic>
+      <p:pic>
+        <p:nvPicPr>
+          <p:cNvPr id="13" name="Picture 26" descr="Strip Of Wood Wood Border Wood Transparent Png Images – Free PNG Images  Vector, PSD, Clipart, Templates">
+            <a:extLst>
+              <a:ext uri="{FF2B5EF4-FFF2-40B4-BE49-F238E27FC236}">
+                <a16:creationId xmlns:a16="http://schemas.microsoft.com/office/drawing/2014/main" id="{A6D1A054-6DAC-3FF3-6FCB-05350FE8E551}"/>
               </a:ext>
             </a:extLst>
           </p:cNvPr>
@@ -3801,7 +4350,7 @@
           <p:nvPr/>
         </p:nvPicPr>
         <p:blipFill>
-          <a:blip r:embed="rId2">
+          <a:blip r:embed="rId3">
             <a:extLst>
               <a:ext uri="{28A0092B-C50C-407E-A947-70E740481C1C}">
                 <a14:useLocalDpi xmlns:a14="http://schemas.microsoft.com/office/drawing/2010/main" val="0"/>
@@ -3815,8 +4364,8 @@
         </p:blipFill>
         <p:spPr bwMode="auto">
           <a:xfrm>
-            <a:off x="-91440" y="-741515"/>
-            <a:ext cx="12462521" cy="8282783"/>
+            <a:off x="633414" y="-597540"/>
+            <a:ext cx="3066442" cy="1533221"/>
           </a:xfrm>
           <a:prstGeom prst="rect">
             <a:avLst/>
@@ -3854,11 +4403,13 @@
             <a:avLst/>
           </a:prstGeom>
           <a:solidFill>
-            <a:schemeClr val="bg1">
-              <a:lumMod val="65000"/>
-            </a:schemeClr>
+            <a:schemeClr val="accent1"/>
           </a:solidFill>
-          <a:ln w="76200"/>
+          <a:ln w="76200">
+            <a:solidFill>
+              <a:schemeClr val="accent1"/>
+            </a:solidFill>
+          </a:ln>
         </p:spPr>
         <p:style>
           <a:lnRef idx="2">
@@ -3906,11 +4457,13 @@
             <a:avLst/>
           </a:prstGeom>
           <a:solidFill>
-            <a:schemeClr val="bg1">
-              <a:lumMod val="65000"/>
-            </a:schemeClr>
+            <a:schemeClr val="accent1"/>
           </a:solidFill>
-          <a:ln w="76200"/>
+          <a:ln w="76200">
+            <a:solidFill>
+              <a:schemeClr val="accent1"/>
+            </a:solidFill>
+          </a:ln>
         </p:spPr>
         <p:style>
           <a:lnRef idx="2">
@@ -3958,11 +4511,13 @@
             <a:avLst/>
           </a:prstGeom>
           <a:solidFill>
-            <a:schemeClr val="bg1">
-              <a:lumMod val="65000"/>
-            </a:schemeClr>
+            <a:schemeClr val="accent1"/>
           </a:solidFill>
-          <a:ln w="76200"/>
+          <a:ln w="76200">
+            <a:solidFill>
+              <a:schemeClr val="accent1"/>
+            </a:solidFill>
+          </a:ln>
         </p:spPr>
         <p:style>
           <a:lnRef idx="2">
@@ -4010,11 +4565,13 @@
             <a:avLst/>
           </a:prstGeom>
           <a:solidFill>
-            <a:schemeClr val="bg1">
-              <a:lumMod val="65000"/>
-            </a:schemeClr>
+            <a:schemeClr val="accent1"/>
           </a:solidFill>
-          <a:ln w="76200"/>
+          <a:ln w="76200">
+            <a:solidFill>
+              <a:schemeClr val="accent1"/>
+            </a:solidFill>
+          </a:ln>
         </p:spPr>
         <p:style>
           <a:lnRef idx="2">
@@ -4047,57 +4604,10 @@
       </p:sp>
       <p:pic>
         <p:nvPicPr>
-          <p:cNvPr id="1054" name="Picture 30" descr="Download Paint Bucket Cartoon Creative Free Clipart HQ Clipart PNG Free |  FreePngClipart">
-            <a:extLst>
-              <a:ext uri="{FF2B5EF4-FFF2-40B4-BE49-F238E27FC236}">
-                <a16:creationId xmlns:a16="http://schemas.microsoft.com/office/drawing/2014/main" id="{07A16504-209B-3EC9-FA71-0BD0D4BA0F7F}"/>
-              </a:ext>
-            </a:extLst>
-          </p:cNvPr>
-          <p:cNvPicPr>
-            <a:picLocks noChangeAspect="1" noChangeArrowheads="1"/>
-          </p:cNvPicPr>
-          <p:nvPr/>
-        </p:nvPicPr>
-        <p:blipFill>
-          <a:blip r:embed="rId3">
-            <a:extLst>
-              <a:ext uri="{28A0092B-C50C-407E-A947-70E740481C1C}">
-                <a14:useLocalDpi xmlns:a14="http://schemas.microsoft.com/office/drawing/2010/main" val="0"/>
-              </a:ext>
-            </a:extLst>
-          </a:blip>
-          <a:srcRect/>
-          <a:stretch>
-            <a:fillRect/>
-          </a:stretch>
-        </p:blipFill>
-        <p:spPr bwMode="auto">
-          <a:xfrm>
-            <a:off x="2515245" y="5317489"/>
-            <a:ext cx="1533379" cy="1540511"/>
-          </a:xfrm>
-          <a:prstGeom prst="rect">
-            <a:avLst/>
-          </a:prstGeom>
-          <a:noFill/>
-          <a:extLst>
-            <a:ext uri="{909E8E84-426E-40DD-AFC4-6F175D3DCCD1}">
-              <a14:hiddenFill xmlns:a14="http://schemas.microsoft.com/office/drawing/2010/main">
-                <a:solidFill>
-                  <a:srgbClr val="FFFFFF"/>
-                </a:solidFill>
-              </a14:hiddenFill>
-            </a:ext>
-          </a:extLst>
-        </p:spPr>
-      </p:pic>
-      <p:pic>
-        <p:nvPicPr>
-          <p:cNvPr id="2054" name="Picture 6" descr="power tools manufacturer, electric drill, angle grinder, cordless tools,  rotary hammer – MEINENG">
-            <a:extLst>
-              <a:ext uri="{FF2B5EF4-FFF2-40B4-BE49-F238E27FC236}">
-                <a16:creationId xmlns:a16="http://schemas.microsoft.com/office/drawing/2014/main" id="{7E1B3FF8-B712-BD57-D2EC-E78B0CCE906D}"/>
+          <p:cNvPr id="3" name="Picture 26" descr="Wrench Tool Grey Transparent PNG &amp; SVG Vector">
+            <a:extLst>
+              <a:ext uri="{FF2B5EF4-FFF2-40B4-BE49-F238E27FC236}">
+                <a16:creationId xmlns:a16="http://schemas.microsoft.com/office/drawing/2014/main" id="{AC3C0BD0-46F9-B5A4-1F75-E365CDB7A234}"/>
               </a:ext>
             </a:extLst>
           </p:cNvPr>
@@ -4108,99 +4618,6 @@
         </p:nvPicPr>
         <p:blipFill>
           <a:blip r:embed="rId4">
-            <a:extLst>
-              <a:ext uri="{28A0092B-C50C-407E-A947-70E740481C1C}">
-                <a14:useLocalDpi xmlns:a14="http://schemas.microsoft.com/office/drawing/2010/main" val="0"/>
-              </a:ext>
-            </a:extLst>
-          </a:blip>
-          <a:srcRect/>
-          <a:stretch>
-            <a:fillRect/>
-          </a:stretch>
-        </p:blipFill>
-        <p:spPr bwMode="auto">
-          <a:xfrm>
-            <a:off x="6200141" y="598172"/>
-            <a:ext cx="1389379" cy="1389379"/>
-          </a:xfrm>
-          <a:prstGeom prst="rect">
-            <a:avLst/>
-          </a:prstGeom>
-          <a:noFill/>
-          <a:extLst>
-            <a:ext uri="{909E8E84-426E-40DD-AFC4-6F175D3DCCD1}">
-              <a14:hiddenFill xmlns:a14="http://schemas.microsoft.com/office/drawing/2010/main">
-                <a:solidFill>
-                  <a:srgbClr val="FFFFFF"/>
-                </a:solidFill>
-              </a14:hiddenFill>
-            </a:ext>
-          </a:extLst>
-        </p:spPr>
-      </p:pic>
-      <p:sp>
-        <p:nvSpPr>
-          <p:cNvPr id="2" name="Rectangle 1">
-            <a:extLst>
-              <a:ext uri="{FF2B5EF4-FFF2-40B4-BE49-F238E27FC236}">
-                <a16:creationId xmlns:a16="http://schemas.microsoft.com/office/drawing/2014/main" id="{2F444BB8-974F-2FFB-3891-72E2CA48B3CE}"/>
-              </a:ext>
-            </a:extLst>
-          </p:cNvPr>
-          <p:cNvSpPr/>
-          <p:nvPr/>
-        </p:nvSpPr>
-        <p:spPr>
-          <a:xfrm>
-            <a:off x="581641" y="0"/>
-            <a:ext cx="3384804" cy="232412"/>
-          </a:xfrm>
-          <a:prstGeom prst="rect">
-            <a:avLst/>
-          </a:prstGeom>
-        </p:spPr>
-        <p:style>
-          <a:lnRef idx="2">
-            <a:schemeClr val="dk1">
-              <a:shade val="50000"/>
-            </a:schemeClr>
-          </a:lnRef>
-          <a:fillRef idx="1">
-            <a:schemeClr val="dk1"/>
-          </a:fillRef>
-          <a:effectRef idx="0">
-            <a:schemeClr val="dk1"/>
-          </a:effectRef>
-          <a:fontRef idx="minor">
-            <a:schemeClr val="lt1"/>
-          </a:fontRef>
-        </p:style>
-        <p:txBody>
-          <a:bodyPr rtlCol="0" anchor="ctr"/>
-          <a:lstStyle/>
-          <a:p>
-            <a:pPr algn="ctr"/>
-            <a:endParaRPr lang="da-DK"/>
-          </a:p>
-        </p:txBody>
-      </p:sp>
-      <p:pic>
-        <p:nvPicPr>
-          <p:cNvPr id="3" name="Picture 26" descr="Wrench Tool Grey Transparent PNG &amp; SVG Vector">
-            <a:extLst>
-              <a:ext uri="{FF2B5EF4-FFF2-40B4-BE49-F238E27FC236}">
-                <a16:creationId xmlns:a16="http://schemas.microsoft.com/office/drawing/2014/main" id="{AC3C0BD0-46F9-B5A4-1F75-E365CDB7A234}"/>
-              </a:ext>
-            </a:extLst>
-          </p:cNvPr>
-          <p:cNvPicPr>
-            <a:picLocks noChangeAspect="1" noChangeArrowheads="1"/>
-          </p:cNvPicPr>
-          <p:nvPr/>
-        </p:nvPicPr>
-        <p:blipFill>
-          <a:blip r:embed="rId5">
             <a:extLst>
               <a:ext uri="{28A0092B-C50C-407E-A947-70E740481C1C}">
                 <a14:useLocalDpi xmlns:a14="http://schemas.microsoft.com/office/drawing/2010/main" val="0"/>
@@ -4247,7 +4664,7 @@
           <p:nvPr/>
         </p:nvPicPr>
         <p:blipFill>
-          <a:blip r:embed="rId6">
+          <a:blip r:embed="rId5">
             <a:extLst>
               <a:ext uri="{28A0092B-C50C-407E-A947-70E740481C1C}">
                 <a14:useLocalDpi xmlns:a14="http://schemas.microsoft.com/office/drawing/2010/main" val="0"/>
@@ -4294,7 +4711,7 @@
           <p:nvPr/>
         </p:nvPicPr>
         <p:blipFill>
-          <a:blip r:embed="rId7">
+          <a:blip r:embed="rId6">
             <a:extLst>
               <a:ext uri="{28A0092B-C50C-407E-A947-70E740481C1C}">
                 <a14:useLocalDpi xmlns:a14="http://schemas.microsoft.com/office/drawing/2010/main" val="0"/>
@@ -4341,7 +4758,7 @@
           <p:nvPr/>
         </p:nvPicPr>
         <p:blipFill>
-          <a:blip r:embed="rId8">
+          <a:blip r:embed="rId7">
             <a:extLst>
               <a:ext uri="{28A0092B-C50C-407E-A947-70E740481C1C}">
                 <a14:useLocalDpi xmlns:a14="http://schemas.microsoft.com/office/drawing/2010/main" val="0"/>
@@ -4355,7 +4772,7 @@
         </p:blipFill>
         <p:spPr bwMode="auto">
           <a:xfrm rot="8285875" flipH="1">
-            <a:off x="2214103" y="195675"/>
+            <a:off x="2090597" y="231309"/>
             <a:ext cx="1296108" cy="1148080"/>
           </a:xfrm>
           <a:prstGeom prst="rect">
@@ -4388,7 +4805,7 @@
           <p:nvPr/>
         </p:nvPicPr>
         <p:blipFill>
-          <a:blip r:embed="rId9">
+          <a:blip r:embed="rId8">
             <a:extLst>
               <a:ext uri="{28A0092B-C50C-407E-A947-70E740481C1C}">
                 <a14:useLocalDpi xmlns:a14="http://schemas.microsoft.com/office/drawing/2010/main" val="0"/>
@@ -4402,8 +4819,525 @@
         </p:blipFill>
         <p:spPr bwMode="auto">
           <a:xfrm rot="1872148" flipH="1">
-            <a:off x="3322570" y="109369"/>
+            <a:off x="3109020" y="140717"/>
             <a:ext cx="615596" cy="845589"/>
+          </a:xfrm>
+          <a:prstGeom prst="rect">
+            <a:avLst/>
+          </a:prstGeom>
+          <a:noFill/>
+          <a:extLst>
+            <a:ext uri="{909E8E84-426E-40DD-AFC4-6F175D3DCCD1}">
+              <a14:hiddenFill xmlns:a14="http://schemas.microsoft.com/office/drawing/2010/main">
+                <a:solidFill>
+                  <a:srgbClr val="FFFFFF"/>
+                </a:solidFill>
+              </a14:hiddenFill>
+            </a:ext>
+          </a:extLst>
+        </p:spPr>
+      </p:pic>
+      <p:pic>
+        <p:nvPicPr>
+          <p:cNvPr id="1048" name="Picture 24" descr="Strip Of Wood Wood Border Wood Transparent Png Images – Free PNG Images  Vector, PSD, Clipart, Templates">
+            <a:extLst>
+              <a:ext uri="{FF2B5EF4-FFF2-40B4-BE49-F238E27FC236}">
+                <a16:creationId xmlns:a16="http://schemas.microsoft.com/office/drawing/2014/main" id="{DE5A3D14-EC96-91EC-ADAB-A94B419C32B2}"/>
+              </a:ext>
+            </a:extLst>
+          </p:cNvPr>
+          <p:cNvPicPr>
+            <a:picLocks noChangeAspect="1" noChangeArrowheads="1"/>
+          </p:cNvPicPr>
+          <p:nvPr/>
+        </p:nvPicPr>
+        <p:blipFill>
+          <a:blip r:embed="rId3">
+            <a:extLst>
+              <a:ext uri="{28A0092B-C50C-407E-A947-70E740481C1C}">
+                <a14:useLocalDpi xmlns:a14="http://schemas.microsoft.com/office/drawing/2010/main" val="0"/>
+              </a:ext>
+            </a:extLst>
+          </a:blip>
+          <a:srcRect/>
+          <a:stretch>
+            <a:fillRect/>
+          </a:stretch>
+        </p:blipFill>
+        <p:spPr bwMode="auto">
+          <a:xfrm>
+            <a:off x="5991860" y="1239521"/>
+            <a:ext cx="3066440" cy="1533221"/>
+          </a:xfrm>
+          <a:prstGeom prst="rect">
+            <a:avLst/>
+          </a:prstGeom>
+          <a:noFill/>
+          <a:extLst>
+            <a:ext uri="{909E8E84-426E-40DD-AFC4-6F175D3DCCD1}">
+              <a14:hiddenFill xmlns:a14="http://schemas.microsoft.com/office/drawing/2010/main">
+                <a:solidFill>
+                  <a:srgbClr val="FFFFFF"/>
+                </a:solidFill>
+              </a14:hiddenFill>
+            </a:ext>
+          </a:extLst>
+        </p:spPr>
+      </p:pic>
+      <p:pic>
+        <p:nvPicPr>
+          <p:cNvPr id="1050" name="Picture 26" descr="Strip Of Wood Wood Border Wood Transparent Png Images – Free PNG Images  Vector, PSD, Clipart, Templates">
+            <a:extLst>
+              <a:ext uri="{FF2B5EF4-FFF2-40B4-BE49-F238E27FC236}">
+                <a16:creationId xmlns:a16="http://schemas.microsoft.com/office/drawing/2014/main" id="{68F50C16-2713-0F5A-EAA1-9166429CEF52}"/>
+              </a:ext>
+            </a:extLst>
+          </p:cNvPr>
+          <p:cNvPicPr>
+            <a:picLocks noChangeAspect="1" noChangeArrowheads="1"/>
+          </p:cNvPicPr>
+          <p:nvPr/>
+        </p:nvPicPr>
+        <p:blipFill>
+          <a:blip r:embed="rId3">
+            <a:extLst>
+              <a:ext uri="{28A0092B-C50C-407E-A947-70E740481C1C}">
+                <a14:useLocalDpi xmlns:a14="http://schemas.microsoft.com/office/drawing/2010/main" val="0"/>
+              </a:ext>
+            </a:extLst>
+          </a:blip>
+          <a:srcRect/>
+          <a:stretch>
+            <a:fillRect/>
+          </a:stretch>
+        </p:blipFill>
+        <p:spPr bwMode="auto">
+          <a:xfrm>
+            <a:off x="2925418" y="1241873"/>
+            <a:ext cx="3066442" cy="1533221"/>
+          </a:xfrm>
+          <a:prstGeom prst="rect">
+            <a:avLst/>
+          </a:prstGeom>
+          <a:noFill/>
+          <a:extLst>
+            <a:ext uri="{909E8E84-426E-40DD-AFC4-6F175D3DCCD1}">
+              <a14:hiddenFill xmlns:a14="http://schemas.microsoft.com/office/drawing/2010/main">
+                <a:solidFill>
+                  <a:srgbClr val="FFFFFF"/>
+                </a:solidFill>
+              </a14:hiddenFill>
+            </a:ext>
+          </a:extLst>
+        </p:spPr>
+      </p:pic>
+      <p:pic>
+        <p:nvPicPr>
+          <p:cNvPr id="4" name="Picture 26" descr="Strip Of Wood Wood Border Wood Transparent Png Images – Free PNG Images  Vector, PSD, Clipart, Templates">
+            <a:extLst>
+              <a:ext uri="{FF2B5EF4-FFF2-40B4-BE49-F238E27FC236}">
+                <a16:creationId xmlns:a16="http://schemas.microsoft.com/office/drawing/2014/main" id="{F7D70BF5-5FC5-18B6-DD5B-D22BADAE6E1E}"/>
+              </a:ext>
+            </a:extLst>
+          </p:cNvPr>
+          <p:cNvPicPr>
+            <a:picLocks noChangeAspect="1" noChangeArrowheads="1"/>
+          </p:cNvPicPr>
+          <p:nvPr/>
+        </p:nvPicPr>
+        <p:blipFill>
+          <a:blip r:embed="rId3">
+            <a:extLst>
+              <a:ext uri="{28A0092B-C50C-407E-A947-70E740481C1C}">
+                <a14:useLocalDpi xmlns:a14="http://schemas.microsoft.com/office/drawing/2010/main" val="0"/>
+              </a:ext>
+            </a:extLst>
+          </a:blip>
+          <a:srcRect/>
+          <a:stretch>
+            <a:fillRect/>
+          </a:stretch>
+        </p:blipFill>
+        <p:spPr bwMode="auto">
+          <a:xfrm>
+            <a:off x="9058300" y="1239520"/>
+            <a:ext cx="3124033" cy="1528491"/>
+          </a:xfrm>
+          <a:prstGeom prst="rect">
+            <a:avLst/>
+          </a:prstGeom>
+          <a:noFill/>
+          <a:extLst>
+            <a:ext uri="{909E8E84-426E-40DD-AFC4-6F175D3DCCD1}">
+              <a14:hiddenFill xmlns:a14="http://schemas.microsoft.com/office/drawing/2010/main">
+                <a:solidFill>
+                  <a:srgbClr val="FFFFFF"/>
+                </a:solidFill>
+              </a14:hiddenFill>
+            </a:ext>
+          </a:extLst>
+        </p:spPr>
+      </p:pic>
+      <p:pic>
+        <p:nvPicPr>
+          <p:cNvPr id="5" name="Picture 26" descr="Strip Of Wood Wood Border Wood Transparent Png Images – Free PNG Images  Vector, PSD, Clipart, Templates">
+            <a:extLst>
+              <a:ext uri="{FF2B5EF4-FFF2-40B4-BE49-F238E27FC236}">
+                <a16:creationId xmlns:a16="http://schemas.microsoft.com/office/drawing/2014/main" id="{5FE719CE-7E28-9DFB-D144-E96A5D9D7126}"/>
+              </a:ext>
+            </a:extLst>
+          </p:cNvPr>
+          <p:cNvPicPr>
+            <a:picLocks noChangeAspect="1" noChangeArrowheads="1"/>
+          </p:cNvPicPr>
+          <p:nvPr/>
+        </p:nvPicPr>
+        <p:blipFill>
+          <a:blip r:embed="rId3">
+            <a:extLst>
+              <a:ext uri="{28A0092B-C50C-407E-A947-70E740481C1C}">
+                <a14:useLocalDpi xmlns:a14="http://schemas.microsoft.com/office/drawing/2010/main" val="0"/>
+              </a:ext>
+            </a:extLst>
+          </a:blip>
+          <a:srcRect/>
+          <a:stretch>
+            <a:fillRect/>
+          </a:stretch>
+        </p:blipFill>
+        <p:spPr bwMode="auto">
+          <a:xfrm>
+            <a:off x="-1922349" y="3099269"/>
+            <a:ext cx="3066442" cy="1533221"/>
+          </a:xfrm>
+          <a:prstGeom prst="rect">
+            <a:avLst/>
+          </a:prstGeom>
+          <a:noFill/>
+          <a:extLst>
+            <a:ext uri="{909E8E84-426E-40DD-AFC4-6F175D3DCCD1}">
+              <a14:hiddenFill xmlns:a14="http://schemas.microsoft.com/office/drawing/2010/main">
+                <a:solidFill>
+                  <a:srgbClr val="FFFFFF"/>
+                </a:solidFill>
+              </a14:hiddenFill>
+            </a:ext>
+          </a:extLst>
+        </p:spPr>
+      </p:pic>
+      <p:pic>
+        <p:nvPicPr>
+          <p:cNvPr id="6" name="Picture 26" descr="Strip Of Wood Wood Border Wood Transparent Png Images – Free PNG Images  Vector, PSD, Clipart, Templates">
+            <a:extLst>
+              <a:ext uri="{FF2B5EF4-FFF2-40B4-BE49-F238E27FC236}">
+                <a16:creationId xmlns:a16="http://schemas.microsoft.com/office/drawing/2014/main" id="{B8E151BD-3D86-6977-179D-623F0DF9A264}"/>
+              </a:ext>
+            </a:extLst>
+          </p:cNvPr>
+          <p:cNvPicPr>
+            <a:picLocks noChangeAspect="1" noChangeArrowheads="1"/>
+          </p:cNvPicPr>
+          <p:nvPr/>
+        </p:nvPicPr>
+        <p:blipFill>
+          <a:blip r:embed="rId3">
+            <a:extLst>
+              <a:ext uri="{28A0092B-C50C-407E-A947-70E740481C1C}">
+                <a14:useLocalDpi xmlns:a14="http://schemas.microsoft.com/office/drawing/2010/main" val="0"/>
+              </a:ext>
+            </a:extLst>
+          </a:blip>
+          <a:srcRect/>
+          <a:stretch>
+            <a:fillRect/>
+          </a:stretch>
+        </p:blipFill>
+        <p:spPr bwMode="auto">
+          <a:xfrm>
+            <a:off x="10037587" y="4011130"/>
+            <a:ext cx="3066442" cy="1533221"/>
+          </a:xfrm>
+          <a:prstGeom prst="rect">
+            <a:avLst/>
+          </a:prstGeom>
+          <a:noFill/>
+          <a:extLst>
+            <a:ext uri="{909E8E84-426E-40DD-AFC4-6F175D3DCCD1}">
+              <a14:hiddenFill xmlns:a14="http://schemas.microsoft.com/office/drawing/2010/main">
+                <a:solidFill>
+                  <a:srgbClr val="FFFFFF"/>
+                </a:solidFill>
+              </a14:hiddenFill>
+            </a:ext>
+          </a:extLst>
+        </p:spPr>
+      </p:pic>
+      <p:pic>
+        <p:nvPicPr>
+          <p:cNvPr id="7" name="Picture 26" descr="Strip Of Wood Wood Border Wood Transparent Png Images – Free PNG Images  Vector, PSD, Clipart, Templates">
+            <a:extLst>
+              <a:ext uri="{FF2B5EF4-FFF2-40B4-BE49-F238E27FC236}">
+                <a16:creationId xmlns:a16="http://schemas.microsoft.com/office/drawing/2014/main" id="{F7119DA4-2C94-ED05-73D0-8133B3E94F7F}"/>
+              </a:ext>
+            </a:extLst>
+          </p:cNvPr>
+          <p:cNvPicPr>
+            <a:picLocks noChangeAspect="1" noChangeArrowheads="1"/>
+          </p:cNvPicPr>
+          <p:nvPr/>
+        </p:nvPicPr>
+        <p:blipFill>
+          <a:blip r:embed="rId3">
+            <a:extLst>
+              <a:ext uri="{28A0092B-C50C-407E-A947-70E740481C1C}">
+                <a14:useLocalDpi xmlns:a14="http://schemas.microsoft.com/office/drawing/2010/main" val="0"/>
+              </a:ext>
+            </a:extLst>
+          </a:blip>
+          <a:srcRect/>
+          <a:stretch>
+            <a:fillRect/>
+          </a:stretch>
+        </p:blipFill>
+        <p:spPr bwMode="auto">
+          <a:xfrm>
+            <a:off x="1116907" y="3121615"/>
+            <a:ext cx="3066442" cy="1533221"/>
+          </a:xfrm>
+          <a:prstGeom prst="rect">
+            <a:avLst/>
+          </a:prstGeom>
+          <a:noFill/>
+          <a:extLst>
+            <a:ext uri="{909E8E84-426E-40DD-AFC4-6F175D3DCCD1}">
+              <a14:hiddenFill xmlns:a14="http://schemas.microsoft.com/office/drawing/2010/main">
+                <a:solidFill>
+                  <a:srgbClr val="FFFFFF"/>
+                </a:solidFill>
+              </a14:hiddenFill>
+            </a:ext>
+          </a:extLst>
+        </p:spPr>
+      </p:pic>
+      <p:pic>
+        <p:nvPicPr>
+          <p:cNvPr id="8" name="Picture 26" descr="Strip Of Wood Wood Border Wood Transparent Png Images – Free PNG Images  Vector, PSD, Clipart, Templates">
+            <a:extLst>
+              <a:ext uri="{FF2B5EF4-FFF2-40B4-BE49-F238E27FC236}">
+                <a16:creationId xmlns:a16="http://schemas.microsoft.com/office/drawing/2014/main" id="{23675225-3AD6-2B48-33D5-84A18011BD8A}"/>
+              </a:ext>
+            </a:extLst>
+          </p:cNvPr>
+          <p:cNvPicPr>
+            <a:picLocks noChangeAspect="1" noChangeArrowheads="1"/>
+          </p:cNvPicPr>
+          <p:nvPr/>
+        </p:nvPicPr>
+        <p:blipFill>
+          <a:blip r:embed="rId3">
+            <a:extLst>
+              <a:ext uri="{28A0092B-C50C-407E-A947-70E740481C1C}">
+                <a14:useLocalDpi xmlns:a14="http://schemas.microsoft.com/office/drawing/2010/main" val="0"/>
+              </a:ext>
+            </a:extLst>
+          </a:blip>
+          <a:srcRect/>
+          <a:stretch>
+            <a:fillRect/>
+          </a:stretch>
+        </p:blipFill>
+        <p:spPr bwMode="auto">
+          <a:xfrm>
+            <a:off x="-79402" y="5920447"/>
+            <a:ext cx="3066442" cy="1533221"/>
+          </a:xfrm>
+          <a:prstGeom prst="rect">
+            <a:avLst/>
+          </a:prstGeom>
+          <a:noFill/>
+          <a:extLst>
+            <a:ext uri="{909E8E84-426E-40DD-AFC4-6F175D3DCCD1}">
+              <a14:hiddenFill xmlns:a14="http://schemas.microsoft.com/office/drawing/2010/main">
+                <a:solidFill>
+                  <a:srgbClr val="FFFFFF"/>
+                </a:solidFill>
+              </a14:hiddenFill>
+            </a:ext>
+          </a:extLst>
+        </p:spPr>
+      </p:pic>
+      <p:pic>
+        <p:nvPicPr>
+          <p:cNvPr id="9" name="Picture 26" descr="Strip Of Wood Wood Border Wood Transparent Png Images – Free PNG Images  Vector, PSD, Clipart, Templates">
+            <a:extLst>
+              <a:ext uri="{FF2B5EF4-FFF2-40B4-BE49-F238E27FC236}">
+                <a16:creationId xmlns:a16="http://schemas.microsoft.com/office/drawing/2014/main" id="{2C8CCB34-D6FC-E253-B1C5-F45BFF8F8F6A}"/>
+              </a:ext>
+            </a:extLst>
+          </p:cNvPr>
+          <p:cNvPicPr>
+            <a:picLocks noChangeAspect="1" noChangeArrowheads="1"/>
+          </p:cNvPicPr>
+          <p:nvPr/>
+        </p:nvPicPr>
+        <p:blipFill>
+          <a:blip r:embed="rId3">
+            <a:extLst>
+              <a:ext uri="{28A0092B-C50C-407E-A947-70E740481C1C}">
+                <a14:useLocalDpi xmlns:a14="http://schemas.microsoft.com/office/drawing/2010/main" val="0"/>
+              </a:ext>
+            </a:extLst>
+          </a:blip>
+          <a:srcRect/>
+          <a:stretch>
+            <a:fillRect/>
+          </a:stretch>
+        </p:blipFill>
+        <p:spPr bwMode="auto">
+          <a:xfrm>
+            <a:off x="2968427" y="5917641"/>
+            <a:ext cx="3066442" cy="1533221"/>
+          </a:xfrm>
+          <a:prstGeom prst="rect">
+            <a:avLst/>
+          </a:prstGeom>
+          <a:noFill/>
+          <a:extLst>
+            <a:ext uri="{909E8E84-426E-40DD-AFC4-6F175D3DCCD1}">
+              <a14:hiddenFill xmlns:a14="http://schemas.microsoft.com/office/drawing/2010/main">
+                <a:solidFill>
+                  <a:srgbClr val="FFFFFF"/>
+                </a:solidFill>
+              </a14:hiddenFill>
+            </a:ext>
+          </a:extLst>
+        </p:spPr>
+      </p:pic>
+      <p:pic>
+        <p:nvPicPr>
+          <p:cNvPr id="10" name="Picture 26" descr="Strip Of Wood Wood Border Wood Transparent Png Images – Free PNG Images  Vector, PSD, Clipart, Templates">
+            <a:extLst>
+              <a:ext uri="{FF2B5EF4-FFF2-40B4-BE49-F238E27FC236}">
+                <a16:creationId xmlns:a16="http://schemas.microsoft.com/office/drawing/2014/main" id="{175434BA-FDD0-4494-D7ED-12DAA1F2EE78}"/>
+              </a:ext>
+            </a:extLst>
+          </p:cNvPr>
+          <p:cNvPicPr>
+            <a:picLocks noChangeAspect="1" noChangeArrowheads="1"/>
+          </p:cNvPicPr>
+          <p:nvPr/>
+        </p:nvPicPr>
+        <p:blipFill>
+          <a:blip r:embed="rId3">
+            <a:extLst>
+              <a:ext uri="{28A0092B-C50C-407E-A947-70E740481C1C}">
+                <a14:useLocalDpi xmlns:a14="http://schemas.microsoft.com/office/drawing/2010/main" val="0"/>
+              </a:ext>
+            </a:extLst>
+          </a:blip>
+          <a:srcRect/>
+          <a:stretch>
+            <a:fillRect/>
+          </a:stretch>
+        </p:blipFill>
+        <p:spPr bwMode="auto">
+          <a:xfrm>
+            <a:off x="6016256" y="5908509"/>
+            <a:ext cx="3066442" cy="1533221"/>
+          </a:xfrm>
+          <a:prstGeom prst="rect">
+            <a:avLst/>
+          </a:prstGeom>
+          <a:noFill/>
+          <a:extLst>
+            <a:ext uri="{909E8E84-426E-40DD-AFC4-6F175D3DCCD1}">
+              <a14:hiddenFill xmlns:a14="http://schemas.microsoft.com/office/drawing/2010/main">
+                <a:solidFill>
+                  <a:srgbClr val="FFFFFF"/>
+                </a:solidFill>
+              </a14:hiddenFill>
+            </a:ext>
+          </a:extLst>
+        </p:spPr>
+      </p:pic>
+      <p:pic>
+        <p:nvPicPr>
+          <p:cNvPr id="11" name="Picture 26" descr="Strip Of Wood Wood Border Wood Transparent Png Images – Free PNG Images  Vector, PSD, Clipart, Templates">
+            <a:extLst>
+              <a:ext uri="{FF2B5EF4-FFF2-40B4-BE49-F238E27FC236}">
+                <a16:creationId xmlns:a16="http://schemas.microsoft.com/office/drawing/2014/main" id="{5F920E76-EBAE-5D52-9427-07209FEDFAB0}"/>
+              </a:ext>
+            </a:extLst>
+          </p:cNvPr>
+          <p:cNvPicPr>
+            <a:picLocks noChangeAspect="1" noChangeArrowheads="1"/>
+          </p:cNvPicPr>
+          <p:nvPr/>
+        </p:nvPicPr>
+        <p:blipFill>
+          <a:blip r:embed="rId3">
+            <a:extLst>
+              <a:ext uri="{28A0092B-C50C-407E-A947-70E740481C1C}">
+                <a14:useLocalDpi xmlns:a14="http://schemas.microsoft.com/office/drawing/2010/main" val="0"/>
+              </a:ext>
+            </a:extLst>
+          </a:blip>
+          <a:srcRect/>
+          <a:stretch>
+            <a:fillRect/>
+          </a:stretch>
+        </p:blipFill>
+        <p:spPr bwMode="auto">
+          <a:xfrm>
+            <a:off x="9058300" y="5918166"/>
+            <a:ext cx="3133700" cy="1533221"/>
+          </a:xfrm>
+          <a:prstGeom prst="rect">
+            <a:avLst/>
+          </a:prstGeom>
+          <a:noFill/>
+          <a:extLst>
+            <a:ext uri="{909E8E84-426E-40DD-AFC4-6F175D3DCCD1}">
+              <a14:hiddenFill xmlns:a14="http://schemas.microsoft.com/office/drawing/2010/main">
+                <a:solidFill>
+                  <a:srgbClr val="FFFFFF"/>
+                </a:solidFill>
+              </a14:hiddenFill>
+            </a:ext>
+          </a:extLst>
+        </p:spPr>
+      </p:pic>
+      <p:pic>
+        <p:nvPicPr>
+          <p:cNvPr id="23" name="Picture 30" descr="Drill Electric Screwdriver Tool drawing free image download">
+            <a:extLst>
+              <a:ext uri="{FF2B5EF4-FFF2-40B4-BE49-F238E27FC236}">
+                <a16:creationId xmlns:a16="http://schemas.microsoft.com/office/drawing/2014/main" id="{E60CA198-11B4-5B95-D4E7-F4BB94052518}"/>
+              </a:ext>
+            </a:extLst>
+          </p:cNvPr>
+          <p:cNvPicPr>
+            <a:picLocks noChangeAspect="1" noChangeArrowheads="1"/>
+          </p:cNvPicPr>
+          <p:nvPr/>
+        </p:nvPicPr>
+        <p:blipFill>
+          <a:blip r:embed="rId9">
+            <a:extLst>
+              <a:ext uri="{28A0092B-C50C-407E-A947-70E740481C1C}">
+                <a14:useLocalDpi xmlns:a14="http://schemas.microsoft.com/office/drawing/2010/main" val="0"/>
+              </a:ext>
+            </a:extLst>
+          </a:blip>
+          <a:srcRect/>
+          <a:stretch>
+            <a:fillRect/>
+          </a:stretch>
+        </p:blipFill>
+        <p:spPr bwMode="auto">
+          <a:xfrm>
+            <a:off x="0" y="2348483"/>
+            <a:ext cx="1310639" cy="1353567"/>
           </a:xfrm>
           <a:prstGeom prst="rect">
             <a:avLst/>
@@ -4424,6 +5358,133 @@
     <p:extLst>
       <p:ext uri="{BB962C8B-B14F-4D97-AF65-F5344CB8AC3E}">
         <p14:creationId xmlns:p14="http://schemas.microsoft.com/office/powerpoint/2010/main" val="3262991845"/>
+      </p:ext>
+    </p:extLst>
+  </p:cSld>
+  <p:clrMapOvr>
+    <a:masterClrMapping/>
+  </p:clrMapOvr>
+</p:sld>
+</file>
+
+<file path=ppt/slides/slide3.xml><?xml version="1.0" encoding="utf-8"?>
+<p:sld xmlns:a="http://schemas.openxmlformats.org/drawingml/2006/main" xmlns:r="http://schemas.openxmlformats.org/officeDocument/2006/relationships" xmlns:p="http://schemas.openxmlformats.org/presentationml/2006/main">
+  <p:cSld>
+    <p:spTree>
+      <p:nvGrpSpPr>
+        <p:cNvPr id="1" name=""/>
+        <p:cNvGrpSpPr/>
+        <p:nvPr/>
+      </p:nvGrpSpPr>
+      <p:grpSpPr>
+        <a:xfrm>
+          <a:off x="0" y="0"/>
+          <a:ext cx="0" cy="0"/>
+          <a:chOff x="0" y="0"/>
+          <a:chExt cx="0" cy="0"/>
+        </a:xfrm>
+      </p:grpSpPr>
+      <p:sp>
+        <p:nvSpPr>
+          <p:cNvPr id="2" name="Title 1">
+            <a:extLst>
+              <a:ext uri="{FF2B5EF4-FFF2-40B4-BE49-F238E27FC236}">
+                <a16:creationId xmlns:a16="http://schemas.microsoft.com/office/drawing/2014/main" id="{F6941F39-4F65-E2E5-10E0-DC335B608557}"/>
+              </a:ext>
+            </a:extLst>
+          </p:cNvPr>
+          <p:cNvSpPr>
+            <a:spLocks noGrp="1"/>
+          </p:cNvSpPr>
+          <p:nvPr>
+            <p:ph type="title"/>
+          </p:nvPr>
+        </p:nvSpPr>
+        <p:spPr/>
+        <p:txBody>
+          <a:bodyPr/>
+          <a:lstStyle/>
+          <a:p>
+            <a:endParaRPr lang="da-DK"/>
+          </a:p>
+        </p:txBody>
+      </p:sp>
+      <p:sp>
+        <p:nvSpPr>
+          <p:cNvPr id="3" name="Content Placeholder 2">
+            <a:extLst>
+              <a:ext uri="{FF2B5EF4-FFF2-40B4-BE49-F238E27FC236}">
+                <a16:creationId xmlns:a16="http://schemas.microsoft.com/office/drawing/2014/main" id="{BDD702B3-B087-907D-AFCE-57C282CA1D79}"/>
+              </a:ext>
+            </a:extLst>
+          </p:cNvPr>
+          <p:cNvSpPr>
+            <a:spLocks noGrp="1"/>
+          </p:cNvSpPr>
+          <p:nvPr>
+            <p:ph idx="1"/>
+          </p:nvPr>
+        </p:nvSpPr>
+        <p:spPr/>
+        <p:txBody>
+          <a:bodyPr/>
+          <a:lstStyle/>
+          <a:p>
+            <a:endParaRPr lang="da-DK"/>
+          </a:p>
+        </p:txBody>
+      </p:sp>
+      <p:pic>
+        <p:nvPicPr>
+          <p:cNvPr id="4" name="Picture 6" descr="Digitising, what is it good for? | Billboyheritagesurvey's Blog">
+            <a:extLst>
+              <a:ext uri="{FF2B5EF4-FFF2-40B4-BE49-F238E27FC236}">
+                <a16:creationId xmlns:a16="http://schemas.microsoft.com/office/drawing/2014/main" id="{20065C4F-61C7-6FF5-1EA0-29D779770C8D}"/>
+              </a:ext>
+            </a:extLst>
+          </p:cNvPr>
+          <p:cNvPicPr>
+            <a:picLocks noChangeAspect="1" noChangeArrowheads="1"/>
+          </p:cNvPicPr>
+          <p:nvPr/>
+        </p:nvPicPr>
+        <p:blipFill>
+          <a:blip r:embed="rId2">
+            <a:extLst>
+              <a:ext uri="{28A0092B-C50C-407E-A947-70E740481C1C}">
+                <a14:useLocalDpi xmlns:a14="http://schemas.microsoft.com/office/drawing/2010/main" val="0"/>
+              </a:ext>
+            </a:extLst>
+          </a:blip>
+          <a:srcRect/>
+          <a:stretch>
+            <a:fillRect/>
+          </a:stretch>
+        </p:blipFill>
+        <p:spPr bwMode="auto">
+          <a:xfrm>
+            <a:off x="-390742" y="-493578"/>
+            <a:ext cx="12893040" cy="7935308"/>
+          </a:xfrm>
+          <a:prstGeom prst="rect">
+            <a:avLst/>
+          </a:prstGeom>
+          <a:noFill/>
+          <a:extLst>
+            <a:ext uri="{909E8E84-426E-40DD-AFC4-6F175D3DCCD1}">
+              <a14:hiddenFill xmlns:a14="http://schemas.microsoft.com/office/drawing/2010/main">
+                <a:solidFill>
+                  <a:srgbClr val="FFFFFF"/>
+                </a:solidFill>
+              </a14:hiddenFill>
+            </a:ext>
+          </a:extLst>
+        </p:spPr>
+      </p:pic>
+    </p:spTree>
+    <p:extLst>
+      <p:ext uri="{BB962C8B-B14F-4D97-AF65-F5344CB8AC3E}">
+        <p14:creationId xmlns:p14="http://schemas.microsoft.com/office/powerpoint/2010/main" val="2862107733"/>
       </p:ext>
     </p:extLst>
   </p:cSld>

</xml_diff>

<commit_message>
Bilen er blevet flyttet
</commit_message>
<xml_diff>
--- a/Baggrund til myrespil (Powerpoint er bedre end gimp).pptx
+++ b/Baggrund til myrespil (Powerpoint er bedre end gimp).pptx
@@ -8,6 +8,7 @@
     <p:sldId id="256" r:id="rId2"/>
     <p:sldId id="258" r:id="rId3"/>
     <p:sldId id="259" r:id="rId4"/>
+    <p:sldId id="260" r:id="rId5"/>
   </p:sldIdLst>
   <p:sldSz cx="12192000" cy="6858000"/>
   <p:notesSz cx="6858000" cy="9144000"/>
@@ -117,7 +118,7 @@
 <file path=ppt/revisionInfo.xml><?xml version="1.0" encoding="utf-8"?>
 <p1510:revInfo xmlns:a="http://schemas.openxmlformats.org/drawingml/2006/main" xmlns:r="http://schemas.openxmlformats.org/officeDocument/2006/relationships" xmlns:p1510="http://schemas.microsoft.com/office/powerpoint/2015/10/main">
   <p1510:revLst>
-    <p1510:client id="{DC7B2068-E1F4-4E5C-877E-327DD41C7028}" v="249" dt="2022-09-13T08:27:24.376"/>
+    <p1510:client id="{DC7B2068-E1F4-4E5C-877E-327DD41C7028}" v="300" dt="2022-09-14T06:45:23.045"/>
   </p1510:revLst>
 </p1510:revInfo>
 </file>
@@ -126,13 +127,13 @@
 <pc:chgInfo xmlns:a="http://schemas.openxmlformats.org/drawingml/2006/main" xmlns:r="http://schemas.openxmlformats.org/officeDocument/2006/relationships" xmlns:ac="http://schemas.microsoft.com/office/drawing/2013/main/command" xmlns:pc="http://schemas.microsoft.com/office/powerpoint/2013/main/command">
   <pc:docChgLst>
     <pc:chgData name="Cathrine Duedahl-Olesen" userId="0f4ad920445e6980" providerId="LiveId" clId="{DC7B2068-E1F4-4E5C-877E-327DD41C7028}"/>
-    <pc:docChg chg="custSel addSld modSld">
-      <pc:chgData name="Cathrine Duedahl-Olesen" userId="0f4ad920445e6980" providerId="LiveId" clId="{DC7B2068-E1F4-4E5C-877E-327DD41C7028}" dt="2022-09-13T08:27:24.376" v="293" actId="478"/>
+    <pc:docChg chg="undo custSel addSld modSld">
+      <pc:chgData name="Cathrine Duedahl-Olesen" userId="0f4ad920445e6980" providerId="LiveId" clId="{DC7B2068-E1F4-4E5C-877E-327DD41C7028}" dt="2022-09-14T06:45:23.045" v="470"/>
       <pc:docMkLst>
         <pc:docMk/>
       </pc:docMkLst>
       <pc:sldChg chg="addSp delSp modSp mod">
-        <pc:chgData name="Cathrine Duedahl-Olesen" userId="0f4ad920445e6980" providerId="LiveId" clId="{DC7B2068-E1F4-4E5C-877E-327DD41C7028}" dt="2022-09-13T08:27:24.376" v="293" actId="478"/>
+        <pc:chgData name="Cathrine Duedahl-Olesen" userId="0f4ad920445e6980" providerId="LiveId" clId="{DC7B2068-E1F4-4E5C-877E-327DD41C7028}" dt="2022-09-14T06:44:57.457" v="468" actId="1076"/>
         <pc:sldMkLst>
           <pc:docMk/>
           <pc:sldMk cId="431311570" sldId="256"/>
@@ -153,9 +154,17 @@
             <ac:picMk id="2" creationId="{9EB95B74-1D1A-E4AD-FAFC-237598594844}"/>
           </ac:picMkLst>
         </pc:picChg>
+        <pc:picChg chg="mod">
+          <ac:chgData name="Cathrine Duedahl-Olesen" userId="0f4ad920445e6980" providerId="LiveId" clId="{DC7B2068-E1F4-4E5C-877E-327DD41C7028}" dt="2022-09-14T06:44:57.457" v="468" actId="1076"/>
+          <ac:picMkLst>
+            <pc:docMk/>
+            <pc:sldMk cId="431311570" sldId="256"/>
+            <ac:picMk id="1040" creationId="{2DD4BF01-EF19-6B37-D83A-6D0FEC6F09BB}"/>
+          </ac:picMkLst>
+        </pc:picChg>
       </pc:sldChg>
       <pc:sldChg chg="addSp delSp modSp mod">
-        <pc:chgData name="Cathrine Duedahl-Olesen" userId="0f4ad920445e6980" providerId="LiveId" clId="{DC7B2068-E1F4-4E5C-877E-327DD41C7028}" dt="2022-09-13T07:55:37.487" v="292" actId="478"/>
+        <pc:chgData name="Cathrine Duedahl-Olesen" userId="0f4ad920445e6980" providerId="LiveId" clId="{DC7B2068-E1F4-4E5C-877E-327DD41C7028}" dt="2022-09-14T06:45:23.045" v="470"/>
         <pc:sldMkLst>
           <pc:docMk/>
           <pc:sldMk cId="3262991845" sldId="258"/>
@@ -168,40 +177,56 @@
             <ac:spMk id="2" creationId="{2F444BB8-974F-2FFB-3891-72E2CA48B3CE}"/>
           </ac:spMkLst>
         </pc:spChg>
-        <pc:spChg chg="mod">
-          <ac:chgData name="Cathrine Duedahl-Olesen" userId="0f4ad920445e6980" providerId="LiveId" clId="{DC7B2068-E1F4-4E5C-877E-327DD41C7028}" dt="2022-09-13T06:58:08.910" v="34" actId="207"/>
+        <pc:spChg chg="del mod">
+          <ac:chgData name="Cathrine Duedahl-Olesen" userId="0f4ad920445e6980" providerId="LiveId" clId="{DC7B2068-E1F4-4E5C-877E-327DD41C7028}" dt="2022-09-13T08:46:51.853" v="315" actId="478"/>
           <ac:spMkLst>
             <pc:docMk/>
             <pc:sldMk cId="3262991845" sldId="258"/>
             <ac:spMk id="39" creationId="{29C78A60-6333-CEEC-E6CE-C677C85FD8CE}"/>
           </ac:spMkLst>
         </pc:spChg>
-        <pc:spChg chg="mod">
-          <ac:chgData name="Cathrine Duedahl-Olesen" userId="0f4ad920445e6980" providerId="LiveId" clId="{DC7B2068-E1F4-4E5C-877E-327DD41C7028}" dt="2022-09-13T06:58:03.788" v="32" actId="208"/>
+        <pc:spChg chg="del mod">
+          <ac:chgData name="Cathrine Duedahl-Olesen" userId="0f4ad920445e6980" providerId="LiveId" clId="{DC7B2068-E1F4-4E5C-877E-327DD41C7028}" dt="2022-09-13T08:46:34.412" v="312" actId="478"/>
           <ac:spMkLst>
             <pc:docMk/>
             <pc:sldMk cId="3262991845" sldId="258"/>
             <ac:spMk id="42" creationId="{ACCEFFC4-E204-ADC5-C152-2F92754A061C}"/>
           </ac:spMkLst>
         </pc:spChg>
-        <pc:spChg chg="mod">
-          <ac:chgData name="Cathrine Duedahl-Olesen" userId="0f4ad920445e6980" providerId="LiveId" clId="{DC7B2068-E1F4-4E5C-877E-327DD41C7028}" dt="2022-09-13T06:57:59.088" v="30" actId="208"/>
+        <pc:spChg chg="del mod">
+          <ac:chgData name="Cathrine Duedahl-Olesen" userId="0f4ad920445e6980" providerId="LiveId" clId="{DC7B2068-E1F4-4E5C-877E-327DD41C7028}" dt="2022-09-13T08:45:01.982" v="303" actId="478"/>
           <ac:spMkLst>
             <pc:docMk/>
             <pc:sldMk cId="3262991845" sldId="258"/>
             <ac:spMk id="45" creationId="{FAA02CC3-CCB9-C3AB-63F0-D71D0F875E2C}"/>
           </ac:spMkLst>
         </pc:spChg>
-        <pc:spChg chg="mod">
-          <ac:chgData name="Cathrine Duedahl-Olesen" userId="0f4ad920445e6980" providerId="LiveId" clId="{DC7B2068-E1F4-4E5C-877E-327DD41C7028}" dt="2022-09-13T06:59:44.477" v="47" actId="1076"/>
+        <pc:spChg chg="del mod">
+          <ac:chgData name="Cathrine Duedahl-Olesen" userId="0f4ad920445e6980" providerId="LiveId" clId="{DC7B2068-E1F4-4E5C-877E-327DD41C7028}" dt="2022-09-13T08:45:58.646" v="309" actId="478"/>
           <ac:spMkLst>
             <pc:docMk/>
             <pc:sldMk cId="3262991845" sldId="258"/>
             <ac:spMk id="49" creationId="{BE0DA540-BE5E-F9C9-040B-89BBC89A1116}"/>
           </ac:spMkLst>
         </pc:spChg>
+        <pc:picChg chg="add del mod">
+          <ac:chgData name="Cathrine Duedahl-Olesen" userId="0f4ad920445e6980" providerId="LiveId" clId="{DC7B2068-E1F4-4E5C-877E-327DD41C7028}" dt="2022-09-14T06:45:21.773" v="469" actId="478"/>
+          <ac:picMkLst>
+            <pc:docMk/>
+            <pc:sldMk cId="3262991845" sldId="258"/>
+            <ac:picMk id="2" creationId="{D4998649-44DD-EDB3-A059-091A90510875}"/>
+          </ac:picMkLst>
+        </pc:picChg>
+        <pc:picChg chg="mod">
+          <ac:chgData name="Cathrine Duedahl-Olesen" userId="0f4ad920445e6980" providerId="LiveId" clId="{DC7B2068-E1F4-4E5C-877E-327DD41C7028}" dt="2022-09-13T09:10:52.739" v="348" actId="1076"/>
+          <ac:picMkLst>
+            <pc:docMk/>
+            <pc:sldMk cId="3262991845" sldId="258"/>
+            <ac:picMk id="3" creationId="{AC3C0BD0-46F9-B5A4-1F75-E365CDB7A234}"/>
+          </ac:picMkLst>
+        </pc:picChg>
         <pc:picChg chg="add mod">
-          <ac:chgData name="Cathrine Duedahl-Olesen" userId="0f4ad920445e6980" providerId="LiveId" clId="{DC7B2068-E1F4-4E5C-877E-327DD41C7028}" dt="2022-09-13T07:47:55.967" v="258" actId="14100"/>
+          <ac:chgData name="Cathrine Duedahl-Olesen" userId="0f4ad920445e6980" providerId="LiveId" clId="{DC7B2068-E1F4-4E5C-877E-327DD41C7028}" dt="2022-09-13T08:44:27.693" v="301" actId="1037"/>
           <ac:picMkLst>
             <pc:docMk/>
             <pc:sldMk cId="3262991845" sldId="258"/>
@@ -209,7 +234,7 @@
           </ac:picMkLst>
         </pc:picChg>
         <pc:picChg chg="add mod">
-          <ac:chgData name="Cathrine Duedahl-Olesen" userId="0f4ad920445e6980" providerId="LiveId" clId="{DC7B2068-E1F4-4E5C-877E-327DD41C7028}" dt="2022-09-13T07:09:25.418" v="119" actId="1076"/>
+          <ac:chgData name="Cathrine Duedahl-Olesen" userId="0f4ad920445e6980" providerId="LiveId" clId="{DC7B2068-E1F4-4E5C-877E-327DD41C7028}" dt="2022-09-13T09:09:15.361" v="326" actId="166"/>
           <ac:picMkLst>
             <pc:docMk/>
             <pc:sldMk cId="3262991845" sldId="258"/>
@@ -217,7 +242,7 @@
           </ac:picMkLst>
         </pc:picChg>
         <pc:picChg chg="add mod">
-          <ac:chgData name="Cathrine Duedahl-Olesen" userId="0f4ad920445e6980" providerId="LiveId" clId="{DC7B2068-E1F4-4E5C-877E-327DD41C7028}" dt="2022-09-13T07:08:49.178" v="114" actId="1076"/>
+          <ac:chgData name="Cathrine Duedahl-Olesen" userId="0f4ad920445e6980" providerId="LiveId" clId="{DC7B2068-E1F4-4E5C-877E-327DD41C7028}" dt="2022-09-13T08:46:38.052" v="313" actId="1076"/>
           <ac:picMkLst>
             <pc:docMk/>
             <pc:sldMk cId="3262991845" sldId="258"/>
@@ -225,7 +250,7 @@
           </ac:picMkLst>
         </pc:picChg>
         <pc:picChg chg="add mod">
-          <ac:chgData name="Cathrine Duedahl-Olesen" userId="0f4ad920445e6980" providerId="LiveId" clId="{DC7B2068-E1F4-4E5C-877E-327DD41C7028}" dt="2022-09-13T07:09:10.781" v="118" actId="1076"/>
+          <ac:chgData name="Cathrine Duedahl-Olesen" userId="0f4ad920445e6980" providerId="LiveId" clId="{DC7B2068-E1F4-4E5C-877E-327DD41C7028}" dt="2022-09-13T08:45:24.494" v="307" actId="1076"/>
           <ac:picMkLst>
             <pc:docMk/>
             <pc:sldMk cId="3262991845" sldId="258"/>
@@ -233,7 +258,7 @@
           </ac:picMkLst>
         </pc:picChg>
         <pc:picChg chg="add mod">
-          <ac:chgData name="Cathrine Duedahl-Olesen" userId="0f4ad920445e6980" providerId="LiveId" clId="{DC7B2068-E1F4-4E5C-877E-327DD41C7028}" dt="2022-09-13T07:10:24.012" v="127" actId="1076"/>
+          <ac:chgData name="Cathrine Duedahl-Olesen" userId="0f4ad920445e6980" providerId="LiveId" clId="{DC7B2068-E1F4-4E5C-877E-327DD41C7028}" dt="2022-09-13T08:47:08.883" v="316" actId="1076"/>
           <ac:picMkLst>
             <pc:docMk/>
             <pc:sldMk cId="3262991845" sldId="258"/>
@@ -265,6 +290,14 @@
           </ac:picMkLst>
         </pc:picChg>
         <pc:picChg chg="add del mod">
+          <ac:chgData name="Cathrine Duedahl-Olesen" userId="0f4ad920445e6980" providerId="LiveId" clId="{DC7B2068-E1F4-4E5C-877E-327DD41C7028}" dt="2022-09-13T09:09:00.946" v="324" actId="478"/>
+          <ac:picMkLst>
+            <pc:docMk/>
+            <pc:sldMk cId="3262991845" sldId="258"/>
+            <ac:picMk id="12" creationId="{3A424EF6-9830-65BA-CFBC-B9506245A3E4}"/>
+          </ac:picMkLst>
+        </pc:picChg>
+        <pc:picChg chg="add del mod">
           <ac:chgData name="Cathrine Duedahl-Olesen" userId="0f4ad920445e6980" providerId="LiveId" clId="{DC7B2068-E1F4-4E5C-877E-327DD41C7028}" dt="2022-09-13T07:53:40.506" v="290" actId="478"/>
           <ac:picMkLst>
             <pc:docMk/>
@@ -273,7 +306,15 @@
           </ac:picMkLst>
         </pc:picChg>
         <pc:picChg chg="add mod">
-          <ac:chgData name="Cathrine Duedahl-Olesen" userId="0f4ad920445e6980" providerId="LiveId" clId="{DC7B2068-E1F4-4E5C-877E-327DD41C7028}" dt="2022-09-13T07:15:26.787" v="155" actId="1076"/>
+          <ac:chgData name="Cathrine Duedahl-Olesen" userId="0f4ad920445e6980" providerId="LiveId" clId="{DC7B2068-E1F4-4E5C-877E-327DD41C7028}" dt="2022-09-14T06:45:23.045" v="470"/>
+          <ac:picMkLst>
+            <pc:docMk/>
+            <pc:sldMk cId="3262991845" sldId="258"/>
+            <ac:picMk id="12" creationId="{FBC4B874-1996-313D-1F3D-A53BC5D8AE1D}"/>
+          </ac:picMkLst>
+        </pc:picChg>
+        <pc:picChg chg="add del mod">
+          <ac:chgData name="Cathrine Duedahl-Olesen" userId="0f4ad920445e6980" providerId="LiveId" clId="{DC7B2068-E1F4-4E5C-877E-327DD41C7028}" dt="2022-09-13T09:12:25.640" v="353" actId="478"/>
           <ac:picMkLst>
             <pc:docMk/>
             <pc:sldMk cId="3262991845" sldId="258"/>
@@ -297,7 +338,7 @@
           </ac:picMkLst>
         </pc:picChg>
         <pc:picChg chg="add mod ord">
-          <ac:chgData name="Cathrine Duedahl-Olesen" userId="0f4ad920445e6980" providerId="LiveId" clId="{DC7B2068-E1F4-4E5C-877E-327DD41C7028}" dt="2022-09-13T07:48:12.976" v="260" actId="14100"/>
+          <ac:chgData name="Cathrine Duedahl-Olesen" userId="0f4ad920445e6980" providerId="LiveId" clId="{DC7B2068-E1F4-4E5C-877E-327DD41C7028}" dt="2022-09-13T09:11:33.178" v="352" actId="14100"/>
           <ac:picMkLst>
             <pc:docMk/>
             <pc:sldMk cId="3262991845" sldId="258"/>
@@ -305,7 +346,7 @@
           </ac:picMkLst>
         </pc:picChg>
         <pc:picChg chg="add mod ord">
-          <ac:chgData name="Cathrine Duedahl-Olesen" userId="0f4ad920445e6980" providerId="LiveId" clId="{DC7B2068-E1F4-4E5C-877E-327DD41C7028}" dt="2022-09-13T07:48:22.266" v="261" actId="14100"/>
+          <ac:chgData name="Cathrine Duedahl-Olesen" userId="0f4ad920445e6980" providerId="LiveId" clId="{DC7B2068-E1F4-4E5C-877E-327DD41C7028}" dt="2022-09-13T09:11:05.726" v="350" actId="14100"/>
           <ac:picMkLst>
             <pc:docMk/>
             <pc:sldMk cId="3262991845" sldId="258"/>
@@ -433,7 +474,7 @@
           </ac:picMkLst>
         </pc:picChg>
         <pc:picChg chg="add mod">
-          <ac:chgData name="Cathrine Duedahl-Olesen" userId="0f4ad920445e6980" providerId="LiveId" clId="{DC7B2068-E1F4-4E5C-877E-327DD41C7028}" dt="2022-09-13T07:05:27.979" v="89" actId="1076"/>
+          <ac:chgData name="Cathrine Duedahl-Olesen" userId="0f4ad920445e6980" providerId="LiveId" clId="{DC7B2068-E1F4-4E5C-877E-327DD41C7028}" dt="2022-09-13T09:08:11.275" v="318" actId="1076"/>
           <ac:picMkLst>
             <pc:docMk/>
             <pc:sldMk cId="3262991845" sldId="258"/>
@@ -553,7 +594,23 @@
           </ac:picMkLst>
         </pc:picChg>
         <pc:picChg chg="mod">
-          <ac:chgData name="Cathrine Duedahl-Olesen" userId="0f4ad920445e6980" providerId="LiveId" clId="{DC7B2068-E1F4-4E5C-877E-327DD41C7028}" dt="2022-09-13T07:15:31.747" v="156" actId="1076"/>
+          <ac:chgData name="Cathrine Duedahl-Olesen" userId="0f4ad920445e6980" providerId="LiveId" clId="{DC7B2068-E1F4-4E5C-877E-327DD41C7028}" dt="2022-09-13T09:10:43.011" v="347" actId="1076"/>
+          <ac:picMkLst>
+            <pc:docMk/>
+            <pc:sldMk cId="3262991845" sldId="258"/>
+            <ac:picMk id="2058" creationId="{545AA019-E631-0E01-7BA9-5F031E22B1CB}"/>
+          </ac:picMkLst>
+        </pc:picChg>
+        <pc:picChg chg="mod">
+          <ac:chgData name="Cathrine Duedahl-Olesen" userId="0f4ad920445e6980" providerId="LiveId" clId="{DC7B2068-E1F4-4E5C-877E-327DD41C7028}" dt="2022-09-13T09:10:40.709" v="346" actId="14100"/>
+          <ac:picMkLst>
+            <pc:docMk/>
+            <pc:sldMk cId="3262991845" sldId="258"/>
+            <ac:picMk id="2062" creationId="{D293F865-BF8E-5B3D-98C1-19D5DDF9A2F3}"/>
+          </ac:picMkLst>
+        </pc:picChg>
+        <pc:picChg chg="mod">
+          <ac:chgData name="Cathrine Duedahl-Olesen" userId="0f4ad920445e6980" providerId="LiveId" clId="{DC7B2068-E1F4-4E5C-877E-327DD41C7028}" dt="2022-09-13T09:10:18.972" v="340" actId="1076"/>
           <ac:picMkLst>
             <pc:docMk/>
             <pc:sldMk cId="3262991845" sldId="258"/>
@@ -561,7 +618,7 @@
           </ac:picMkLst>
         </pc:picChg>
         <pc:picChg chg="mod">
-          <ac:chgData name="Cathrine Duedahl-Olesen" userId="0f4ad920445e6980" providerId="LiveId" clId="{DC7B2068-E1F4-4E5C-877E-327DD41C7028}" dt="2022-09-13T07:15:36.952" v="157" actId="1076"/>
+          <ac:chgData name="Cathrine Duedahl-Olesen" userId="0f4ad920445e6980" providerId="LiveId" clId="{DC7B2068-E1F4-4E5C-877E-327DD41C7028}" dt="2022-09-13T09:10:24.371" v="341" actId="1076"/>
           <ac:picMkLst>
             <pc:docMk/>
             <pc:sldMk cId="3262991845" sldId="258"/>
@@ -591,6 +648,77 @@
             <ac:picMk id="4" creationId="{20065C4F-61C7-6FF5-1EA0-29D779770C8D}"/>
           </ac:picMkLst>
         </pc:picChg>
+      </pc:sldChg>
+      <pc:sldChg chg="addSp delSp modSp new mod">
+        <pc:chgData name="Cathrine Duedahl-Olesen" userId="0f4ad920445e6980" providerId="LiveId" clId="{DC7B2068-E1F4-4E5C-877E-327DD41C7028}" dt="2022-09-13T09:39:33.148" v="467" actId="1076"/>
+        <pc:sldMkLst>
+          <pc:docMk/>
+          <pc:sldMk cId="264347067" sldId="260"/>
+        </pc:sldMkLst>
+        <pc:spChg chg="del">
+          <ac:chgData name="Cathrine Duedahl-Olesen" userId="0f4ad920445e6980" providerId="LiveId" clId="{DC7B2068-E1F4-4E5C-877E-327DD41C7028}" dt="2022-09-13T09:17:59.676" v="355" actId="478"/>
+          <ac:spMkLst>
+            <pc:docMk/>
+            <pc:sldMk cId="264347067" sldId="260"/>
+            <ac:spMk id="2" creationId="{28B23834-B447-49D3-041F-44D687B7975D}"/>
+          </ac:spMkLst>
+        </pc:spChg>
+        <pc:spChg chg="del">
+          <ac:chgData name="Cathrine Duedahl-Olesen" userId="0f4ad920445e6980" providerId="LiveId" clId="{DC7B2068-E1F4-4E5C-877E-327DD41C7028}" dt="2022-09-13T09:17:59.676" v="355" actId="478"/>
+          <ac:spMkLst>
+            <pc:docMk/>
+            <pc:sldMk cId="264347067" sldId="260"/>
+            <ac:spMk id="3" creationId="{2DE41FFA-85BB-CD82-258A-2E6CF0FD6DF1}"/>
+          </ac:spMkLst>
+        </pc:spChg>
+        <pc:spChg chg="add mod">
+          <ac:chgData name="Cathrine Duedahl-Olesen" userId="0f4ad920445e6980" providerId="LiveId" clId="{DC7B2068-E1F4-4E5C-877E-327DD41C7028}" dt="2022-09-13T09:33:39.412" v="405" actId="208"/>
+          <ac:spMkLst>
+            <pc:docMk/>
+            <pc:sldMk cId="264347067" sldId="260"/>
+            <ac:spMk id="4" creationId="{6D07A874-CD13-7E38-F0AC-C7011507F7A8}"/>
+          </ac:spMkLst>
+        </pc:spChg>
+        <pc:spChg chg="add mod">
+          <ac:chgData name="Cathrine Duedahl-Olesen" userId="0f4ad920445e6980" providerId="LiveId" clId="{DC7B2068-E1F4-4E5C-877E-327DD41C7028}" dt="2022-09-13T09:33:32.632" v="404" actId="208"/>
+          <ac:spMkLst>
+            <pc:docMk/>
+            <pc:sldMk cId="264347067" sldId="260"/>
+            <ac:spMk id="5" creationId="{E98906F2-BEBE-4F50-854F-282E3D8785BA}"/>
+          </ac:spMkLst>
+        </pc:spChg>
+        <pc:spChg chg="add mod">
+          <ac:chgData name="Cathrine Duedahl-Olesen" userId="0f4ad920445e6980" providerId="LiveId" clId="{DC7B2068-E1F4-4E5C-877E-327DD41C7028}" dt="2022-09-13T09:33:42.174" v="406" actId="208"/>
+          <ac:spMkLst>
+            <pc:docMk/>
+            <pc:sldMk cId="264347067" sldId="260"/>
+            <ac:spMk id="6" creationId="{FFD8ECC7-584A-5A6A-581E-C37F9C34ECB5}"/>
+          </ac:spMkLst>
+        </pc:spChg>
+        <pc:spChg chg="add del">
+          <ac:chgData name="Cathrine Duedahl-Olesen" userId="0f4ad920445e6980" providerId="LiveId" clId="{DC7B2068-E1F4-4E5C-877E-327DD41C7028}" dt="2022-09-13T09:35:37.105" v="408" actId="478"/>
+          <ac:spMkLst>
+            <pc:docMk/>
+            <pc:sldMk cId="264347067" sldId="260"/>
+            <ac:spMk id="9" creationId="{04EBD664-7C6F-FD19-1B31-7AE2FF05F40C}"/>
+          </ac:spMkLst>
+        </pc:spChg>
+        <pc:spChg chg="add mod">
+          <ac:chgData name="Cathrine Duedahl-Olesen" userId="0f4ad920445e6980" providerId="LiveId" clId="{DC7B2068-E1F4-4E5C-877E-327DD41C7028}" dt="2022-09-13T09:39:33.148" v="467" actId="1076"/>
+          <ac:spMkLst>
+            <pc:docMk/>
+            <pc:sldMk cId="264347067" sldId="260"/>
+            <ac:spMk id="10" creationId="{F390B754-0268-FC69-2855-39B66599BD4A}"/>
+          </ac:spMkLst>
+        </pc:spChg>
+        <pc:cxnChg chg="add del">
+          <ac:chgData name="Cathrine Duedahl-Olesen" userId="0f4ad920445e6980" providerId="LiveId" clId="{DC7B2068-E1F4-4E5C-877E-327DD41C7028}" dt="2022-09-13T09:31:55.098" v="397" actId="478"/>
+          <ac:cxnSpMkLst>
+            <pc:docMk/>
+            <pc:sldMk cId="264347067" sldId="260"/>
+            <ac:cxnSpMk id="8" creationId="{EA1982E3-B671-BB82-0294-ADF46F7C9202}"/>
+          </ac:cxnSpMkLst>
+        </pc:cxnChg>
       </pc:sldChg>
     </pc:docChg>
   </pc:docChgLst>
@@ -746,7 +874,7 @@
           <a:p>
             <a:fld id="{FD2766A6-3C10-4AB8-86A1-BB1F0CDA7EFE}" type="datetimeFigureOut">
               <a:rPr lang="en-US" smtClean="0"/>
-              <a:t>9/13/2022</a:t>
+              <a:t>9/14/2022</a:t>
             </a:fld>
             <a:endParaRPr lang="en-US"/>
           </a:p>
@@ -944,7 +1072,7 @@
           <a:p>
             <a:fld id="{FD2766A6-3C10-4AB8-86A1-BB1F0CDA7EFE}" type="datetimeFigureOut">
               <a:rPr lang="en-US" smtClean="0"/>
-              <a:t>9/13/2022</a:t>
+              <a:t>9/14/2022</a:t>
             </a:fld>
             <a:endParaRPr lang="en-US"/>
           </a:p>
@@ -1152,7 +1280,7 @@
           <a:p>
             <a:fld id="{FD2766A6-3C10-4AB8-86A1-BB1F0CDA7EFE}" type="datetimeFigureOut">
               <a:rPr lang="en-US" smtClean="0"/>
-              <a:t>9/13/2022</a:t>
+              <a:t>9/14/2022</a:t>
             </a:fld>
             <a:endParaRPr lang="en-US"/>
           </a:p>
@@ -1350,7 +1478,7 @@
           <a:p>
             <a:fld id="{FD2766A6-3C10-4AB8-86A1-BB1F0CDA7EFE}" type="datetimeFigureOut">
               <a:rPr lang="en-US" smtClean="0"/>
-              <a:t>9/13/2022</a:t>
+              <a:t>9/14/2022</a:t>
             </a:fld>
             <a:endParaRPr lang="en-US"/>
           </a:p>
@@ -1623,7 +1751,7 @@
           <a:p>
             <a:fld id="{FD2766A6-3C10-4AB8-86A1-BB1F0CDA7EFE}" type="datetimeFigureOut">
               <a:rPr lang="en-US" smtClean="0"/>
-              <a:t>9/13/2022</a:t>
+              <a:t>9/14/2022</a:t>
             </a:fld>
             <a:endParaRPr lang="en-US"/>
           </a:p>
@@ -1888,7 +2016,7 @@
           <a:p>
             <a:fld id="{FD2766A6-3C10-4AB8-86A1-BB1F0CDA7EFE}" type="datetimeFigureOut">
               <a:rPr lang="en-US" smtClean="0"/>
-              <a:t>9/13/2022</a:t>
+              <a:t>9/14/2022</a:t>
             </a:fld>
             <a:endParaRPr lang="en-US"/>
           </a:p>
@@ -2314,7 +2442,7 @@
           <a:p>
             <a:fld id="{FD2766A6-3C10-4AB8-86A1-BB1F0CDA7EFE}" type="datetimeFigureOut">
               <a:rPr lang="en-US" smtClean="0"/>
-              <a:t>9/13/2022</a:t>
+              <a:t>9/14/2022</a:t>
             </a:fld>
             <a:endParaRPr lang="en-US"/>
           </a:p>
@@ -2455,7 +2583,7 @@
           <a:p>
             <a:fld id="{FD2766A6-3C10-4AB8-86A1-BB1F0CDA7EFE}" type="datetimeFigureOut">
               <a:rPr lang="en-US" smtClean="0"/>
-              <a:t>9/13/2022</a:t>
+              <a:t>9/14/2022</a:t>
             </a:fld>
             <a:endParaRPr lang="en-US"/>
           </a:p>
@@ -2568,7 +2696,7 @@
           <a:p>
             <a:fld id="{FD2766A6-3C10-4AB8-86A1-BB1F0CDA7EFE}" type="datetimeFigureOut">
               <a:rPr lang="en-US" smtClean="0"/>
-              <a:t>9/13/2022</a:t>
+              <a:t>9/14/2022</a:t>
             </a:fld>
             <a:endParaRPr lang="en-US"/>
           </a:p>
@@ -2923,7 +3051,7 @@
           <a:p>
             <a:fld id="{FD2766A6-3C10-4AB8-86A1-BB1F0CDA7EFE}" type="datetimeFigureOut">
               <a:rPr lang="en-US" smtClean="0"/>
-              <a:t>9/13/2022</a:t>
+              <a:t>9/14/2022</a:t>
             </a:fld>
             <a:endParaRPr lang="en-US"/>
           </a:p>
@@ -3253,7 +3381,7 @@
           <a:p>
             <a:fld id="{FD2766A6-3C10-4AB8-86A1-BB1F0CDA7EFE}" type="datetimeFigureOut">
               <a:rPr lang="en-US" smtClean="0"/>
-              <a:t>9/13/2022</a:t>
+              <a:t>9/14/2022</a:t>
             </a:fld>
             <a:endParaRPr lang="en-US"/>
           </a:p>
@@ -3495,7 +3623,7 @@
             <a:fld id="{FD2766A6-3C10-4AB8-86A1-BB1F0CDA7EFE}" type="datetimeFigureOut">
               <a:rPr lang="en-US" smtClean="0"/>
               <a:pPr/>
-              <a:t>9/13/2022</a:t>
+              <a:t>9/14/2022</a:t>
             </a:fld>
             <a:endParaRPr lang="en-US" dirty="0"/>
           </a:p>
@@ -4181,7 +4309,7 @@
         </p:blipFill>
         <p:spPr bwMode="auto">
           <a:xfrm>
-            <a:off x="5758180" y="4239261"/>
+            <a:off x="5118100" y="4259581"/>
             <a:ext cx="2951480" cy="2951480"/>
           </a:xfrm>
           <a:prstGeom prst="rect">
@@ -4297,8 +4425,8 @@
         </p:blipFill>
         <p:spPr>
           <a:xfrm rot="10800000">
-            <a:off x="9666" y="-12857"/>
-            <a:ext cx="12182334" cy="3253294"/>
+            <a:off x="0" y="-6800"/>
+            <a:ext cx="12192000" cy="3255876"/>
           </a:xfrm>
           <a:prstGeom prst="rect">
             <a:avLst/>
@@ -4327,514 +4455,12 @@
         </p:blipFill>
         <p:spPr>
           <a:xfrm>
-            <a:off x="0" y="3243243"/>
+            <a:off x="0" y="3243024"/>
             <a:ext cx="12192000" cy="3381875"/>
           </a:xfrm>
           <a:prstGeom prst="rect">
             <a:avLst/>
           </a:prstGeom>
-        </p:spPr>
-      </p:pic>
-      <p:pic>
-        <p:nvPicPr>
-          <p:cNvPr id="13" name="Picture 26" descr="Strip Of Wood Wood Border Wood Transparent Png Images – Free PNG Images  Vector, PSD, Clipart, Templates">
-            <a:extLst>
-              <a:ext uri="{FF2B5EF4-FFF2-40B4-BE49-F238E27FC236}">
-                <a16:creationId xmlns:a16="http://schemas.microsoft.com/office/drawing/2014/main" id="{A6D1A054-6DAC-3FF3-6FCB-05350FE8E551}"/>
-              </a:ext>
-            </a:extLst>
-          </p:cNvPr>
-          <p:cNvPicPr>
-            <a:picLocks noChangeAspect="1" noChangeArrowheads="1"/>
-          </p:cNvPicPr>
-          <p:nvPr/>
-        </p:nvPicPr>
-        <p:blipFill>
-          <a:blip r:embed="rId3">
-            <a:extLst>
-              <a:ext uri="{28A0092B-C50C-407E-A947-70E740481C1C}">
-                <a14:useLocalDpi xmlns:a14="http://schemas.microsoft.com/office/drawing/2010/main" val="0"/>
-              </a:ext>
-            </a:extLst>
-          </a:blip>
-          <a:srcRect/>
-          <a:stretch>
-            <a:fillRect/>
-          </a:stretch>
-        </p:blipFill>
-        <p:spPr bwMode="auto">
-          <a:xfrm>
-            <a:off x="633414" y="-597540"/>
-            <a:ext cx="3066442" cy="1533221"/>
-          </a:xfrm>
-          <a:prstGeom prst="rect">
-            <a:avLst/>
-          </a:prstGeom>
-          <a:noFill/>
-          <a:extLst>
-            <a:ext uri="{909E8E84-426E-40DD-AFC4-6F175D3DCCD1}">
-              <a14:hiddenFill xmlns:a14="http://schemas.microsoft.com/office/drawing/2010/main">
-                <a:solidFill>
-                  <a:srgbClr val="FFFFFF"/>
-                </a:solidFill>
-              </a14:hiddenFill>
-            </a:ext>
-          </a:extLst>
-        </p:spPr>
-      </p:pic>
-      <p:sp>
-        <p:nvSpPr>
-          <p:cNvPr id="39" name="Rectangle 38">
-            <a:extLst>
-              <a:ext uri="{FF2B5EF4-FFF2-40B4-BE49-F238E27FC236}">
-                <a16:creationId xmlns:a16="http://schemas.microsoft.com/office/drawing/2014/main" id="{29C78A60-6333-CEEC-E6CE-C677C85FD8CE}"/>
-              </a:ext>
-            </a:extLst>
-          </p:cNvPr>
-          <p:cNvSpPr/>
-          <p:nvPr/>
-        </p:nvSpPr>
-        <p:spPr>
-          <a:xfrm>
-            <a:off x="3048" y="6492240"/>
-            <a:ext cx="12188952" cy="365760"/>
-          </a:xfrm>
-          <a:prstGeom prst="rect">
-            <a:avLst/>
-          </a:prstGeom>
-          <a:solidFill>
-            <a:schemeClr val="accent1"/>
-          </a:solidFill>
-          <a:ln w="76200">
-            <a:solidFill>
-              <a:schemeClr val="accent1"/>
-            </a:solidFill>
-          </a:ln>
-        </p:spPr>
-        <p:style>
-          <a:lnRef idx="2">
-            <a:schemeClr val="dk1">
-              <a:shade val="50000"/>
-            </a:schemeClr>
-          </a:lnRef>
-          <a:fillRef idx="1">
-            <a:schemeClr val="dk1"/>
-          </a:fillRef>
-          <a:effectRef idx="0">
-            <a:schemeClr val="dk1"/>
-          </a:effectRef>
-          <a:fontRef idx="minor">
-            <a:schemeClr val="lt1"/>
-          </a:fontRef>
-        </p:style>
-        <p:txBody>
-          <a:bodyPr rtlCol="0" anchor="ctr"/>
-          <a:lstStyle/>
-          <a:p>
-            <a:pPr algn="ctr"/>
-            <a:endParaRPr lang="da-DK"/>
-          </a:p>
-        </p:txBody>
-      </p:sp>
-      <p:sp>
-        <p:nvSpPr>
-          <p:cNvPr id="42" name="Rectangle 41">
-            <a:extLst>
-              <a:ext uri="{FF2B5EF4-FFF2-40B4-BE49-F238E27FC236}">
-                <a16:creationId xmlns:a16="http://schemas.microsoft.com/office/drawing/2014/main" id="{ACCEFFC4-E204-ADC5-C152-2F92754A061C}"/>
-              </a:ext>
-            </a:extLst>
-          </p:cNvPr>
-          <p:cNvSpPr/>
-          <p:nvPr/>
-        </p:nvSpPr>
-        <p:spPr>
-          <a:xfrm>
-            <a:off x="10055352" y="4594861"/>
-            <a:ext cx="2133600" cy="365760"/>
-          </a:xfrm>
-          <a:prstGeom prst="rect">
-            <a:avLst/>
-          </a:prstGeom>
-          <a:solidFill>
-            <a:schemeClr val="accent1"/>
-          </a:solidFill>
-          <a:ln w="76200">
-            <a:solidFill>
-              <a:schemeClr val="accent1"/>
-            </a:solidFill>
-          </a:ln>
-        </p:spPr>
-        <p:style>
-          <a:lnRef idx="2">
-            <a:schemeClr val="dk1">
-              <a:shade val="50000"/>
-            </a:schemeClr>
-          </a:lnRef>
-          <a:fillRef idx="1">
-            <a:schemeClr val="dk1"/>
-          </a:fillRef>
-          <a:effectRef idx="0">
-            <a:schemeClr val="dk1"/>
-          </a:effectRef>
-          <a:fontRef idx="minor">
-            <a:schemeClr val="lt1"/>
-          </a:fontRef>
-        </p:style>
-        <p:txBody>
-          <a:bodyPr rtlCol="0" anchor="ctr"/>
-          <a:lstStyle/>
-          <a:p>
-            <a:pPr algn="ctr"/>
-            <a:endParaRPr lang="da-DK"/>
-          </a:p>
-        </p:txBody>
-      </p:sp>
-      <p:sp>
-        <p:nvSpPr>
-          <p:cNvPr id="45" name="Rectangle 44">
-            <a:extLst>
-              <a:ext uri="{FF2B5EF4-FFF2-40B4-BE49-F238E27FC236}">
-                <a16:creationId xmlns:a16="http://schemas.microsoft.com/office/drawing/2014/main" id="{FAA02CC3-CCB9-C3AB-63F0-D71D0F875E2C}"/>
-              </a:ext>
-            </a:extLst>
-          </p:cNvPr>
-          <p:cNvSpPr/>
-          <p:nvPr/>
-        </p:nvSpPr>
-        <p:spPr>
-          <a:xfrm>
-            <a:off x="0" y="3702050"/>
-            <a:ext cx="4101592" cy="365760"/>
-          </a:xfrm>
-          <a:prstGeom prst="rect">
-            <a:avLst/>
-          </a:prstGeom>
-          <a:solidFill>
-            <a:schemeClr val="accent1"/>
-          </a:solidFill>
-          <a:ln w="76200">
-            <a:solidFill>
-              <a:schemeClr val="accent1"/>
-            </a:solidFill>
-          </a:ln>
-        </p:spPr>
-        <p:style>
-          <a:lnRef idx="2">
-            <a:schemeClr val="dk1">
-              <a:shade val="50000"/>
-            </a:schemeClr>
-          </a:lnRef>
-          <a:fillRef idx="1">
-            <a:schemeClr val="dk1"/>
-          </a:fillRef>
-          <a:effectRef idx="0">
-            <a:schemeClr val="dk1"/>
-          </a:effectRef>
-          <a:fontRef idx="minor">
-            <a:schemeClr val="lt1"/>
-          </a:fontRef>
-        </p:style>
-        <p:txBody>
-          <a:bodyPr rtlCol="0" anchor="ctr"/>
-          <a:lstStyle/>
-          <a:p>
-            <a:pPr algn="ctr"/>
-            <a:endParaRPr lang="da-DK"/>
-          </a:p>
-        </p:txBody>
-      </p:sp>
-      <p:sp>
-        <p:nvSpPr>
-          <p:cNvPr id="49" name="Rectangle 48">
-            <a:extLst>
-              <a:ext uri="{FF2B5EF4-FFF2-40B4-BE49-F238E27FC236}">
-                <a16:creationId xmlns:a16="http://schemas.microsoft.com/office/drawing/2014/main" id="{BE0DA540-BE5E-F9C9-040B-89BBC89A1116}"/>
-              </a:ext>
-            </a:extLst>
-          </p:cNvPr>
-          <p:cNvSpPr/>
-          <p:nvPr/>
-        </p:nvSpPr>
-        <p:spPr>
-          <a:xfrm>
-            <a:off x="2987040" y="1804671"/>
-            <a:ext cx="9204960" cy="365760"/>
-          </a:xfrm>
-          <a:prstGeom prst="rect">
-            <a:avLst/>
-          </a:prstGeom>
-          <a:solidFill>
-            <a:schemeClr val="accent1"/>
-          </a:solidFill>
-          <a:ln w="76200">
-            <a:solidFill>
-              <a:schemeClr val="accent1"/>
-            </a:solidFill>
-          </a:ln>
-        </p:spPr>
-        <p:style>
-          <a:lnRef idx="2">
-            <a:schemeClr val="dk1">
-              <a:shade val="50000"/>
-            </a:schemeClr>
-          </a:lnRef>
-          <a:fillRef idx="1">
-            <a:schemeClr val="dk1"/>
-          </a:fillRef>
-          <a:effectRef idx="0">
-            <a:schemeClr val="dk1"/>
-          </a:effectRef>
-          <a:fontRef idx="minor">
-            <a:schemeClr val="lt1"/>
-          </a:fontRef>
-        </p:style>
-        <p:txBody>
-          <a:bodyPr rtlCol="0" anchor="ctr"/>
-          <a:lstStyle/>
-          <a:p>
-            <a:pPr algn="ctr"/>
-            <a:endParaRPr lang="da-DK">
-              <a:solidFill>
-                <a:srgbClr val="FF0000"/>
-              </a:solidFill>
-            </a:endParaRPr>
-          </a:p>
-        </p:txBody>
-      </p:sp>
-      <p:pic>
-        <p:nvPicPr>
-          <p:cNvPr id="3" name="Picture 26" descr="Wrench Tool Grey Transparent PNG &amp; SVG Vector">
-            <a:extLst>
-              <a:ext uri="{FF2B5EF4-FFF2-40B4-BE49-F238E27FC236}">
-                <a16:creationId xmlns:a16="http://schemas.microsoft.com/office/drawing/2014/main" id="{AC3C0BD0-46F9-B5A4-1F75-E365CDB7A234}"/>
-              </a:ext>
-            </a:extLst>
-          </p:cNvPr>
-          <p:cNvPicPr>
-            <a:picLocks noChangeAspect="1" noChangeArrowheads="1"/>
-          </p:cNvPicPr>
-          <p:nvPr/>
-        </p:nvPicPr>
-        <p:blipFill>
-          <a:blip r:embed="rId4">
-            <a:extLst>
-              <a:ext uri="{28A0092B-C50C-407E-A947-70E740481C1C}">
-                <a14:useLocalDpi xmlns:a14="http://schemas.microsoft.com/office/drawing/2010/main" val="0"/>
-              </a:ext>
-            </a:extLst>
-          </a:blip>
-          <a:srcRect/>
-          <a:stretch>
-            <a:fillRect/>
-          </a:stretch>
-        </p:blipFill>
-        <p:spPr bwMode="auto">
-          <a:xfrm rot="10800000">
-            <a:off x="120650" y="0"/>
-            <a:ext cx="1239520" cy="1239520"/>
-          </a:xfrm>
-          <a:prstGeom prst="rect">
-            <a:avLst/>
-          </a:prstGeom>
-          <a:noFill/>
-          <a:extLst>
-            <a:ext uri="{909E8E84-426E-40DD-AFC4-6F175D3DCCD1}">
-              <a14:hiddenFill xmlns:a14="http://schemas.microsoft.com/office/drawing/2010/main">
-                <a:solidFill>
-                  <a:srgbClr val="FFFFFF"/>
-                </a:solidFill>
-              </a14:hiddenFill>
-            </a:ext>
-          </a:extLst>
-        </p:spPr>
-      </p:pic>
-      <p:pic>
-        <p:nvPicPr>
-          <p:cNvPr id="2058" name="Picture 10" descr="Pin on card">
-            <a:extLst>
-              <a:ext uri="{FF2B5EF4-FFF2-40B4-BE49-F238E27FC236}">
-                <a16:creationId xmlns:a16="http://schemas.microsoft.com/office/drawing/2014/main" id="{545AA019-E631-0E01-7BA9-5F031E22B1CB}"/>
-              </a:ext>
-            </a:extLst>
-          </p:cNvPr>
-          <p:cNvPicPr>
-            <a:picLocks noChangeAspect="1" noChangeArrowheads="1"/>
-          </p:cNvPicPr>
-          <p:nvPr/>
-        </p:nvPicPr>
-        <p:blipFill>
-          <a:blip r:embed="rId5">
-            <a:extLst>
-              <a:ext uri="{28A0092B-C50C-407E-A947-70E740481C1C}">
-                <a14:useLocalDpi xmlns:a14="http://schemas.microsoft.com/office/drawing/2010/main" val="0"/>
-              </a:ext>
-            </a:extLst>
-          </a:blip>
-          <a:srcRect/>
-          <a:stretch>
-            <a:fillRect/>
-          </a:stretch>
-        </p:blipFill>
-        <p:spPr bwMode="auto">
-          <a:xfrm rot="19006529" flipH="1">
-            <a:off x="1422479" y="20542"/>
-            <a:ext cx="1255616" cy="1345302"/>
-          </a:xfrm>
-          <a:prstGeom prst="rect">
-            <a:avLst/>
-          </a:prstGeom>
-          <a:noFill/>
-          <a:extLst>
-            <a:ext uri="{909E8E84-426E-40DD-AFC4-6F175D3DCCD1}">
-              <a14:hiddenFill xmlns:a14="http://schemas.microsoft.com/office/drawing/2010/main">
-                <a:solidFill>
-                  <a:srgbClr val="FFFFFF"/>
-                </a:solidFill>
-              </a14:hiddenFill>
-            </a:ext>
-          </a:extLst>
-        </p:spPr>
-      </p:pic>
-      <p:pic>
-        <p:nvPicPr>
-          <p:cNvPr id="2062" name="Picture 14" descr="Screwdriver 14 Clip Art at Clker.com - vector clip art online, royalty free  &amp; public domain">
-            <a:extLst>
-              <a:ext uri="{FF2B5EF4-FFF2-40B4-BE49-F238E27FC236}">
-                <a16:creationId xmlns:a16="http://schemas.microsoft.com/office/drawing/2014/main" id="{D293F865-BF8E-5B3D-98C1-19D5DDF9A2F3}"/>
-              </a:ext>
-            </a:extLst>
-          </p:cNvPr>
-          <p:cNvPicPr>
-            <a:picLocks noChangeAspect="1" noChangeArrowheads="1"/>
-          </p:cNvPicPr>
-          <p:nvPr/>
-        </p:nvPicPr>
-        <p:blipFill>
-          <a:blip r:embed="rId6">
-            <a:extLst>
-              <a:ext uri="{28A0092B-C50C-407E-A947-70E740481C1C}">
-                <a14:useLocalDpi xmlns:a14="http://schemas.microsoft.com/office/drawing/2010/main" val="0"/>
-              </a:ext>
-            </a:extLst>
-          </a:blip>
-          <a:srcRect/>
-          <a:stretch>
-            <a:fillRect/>
-          </a:stretch>
-        </p:blipFill>
-        <p:spPr bwMode="auto">
-          <a:xfrm rot="8813131">
-            <a:off x="982478" y="110296"/>
-            <a:ext cx="707693" cy="1022224"/>
-          </a:xfrm>
-          <a:prstGeom prst="rect">
-            <a:avLst/>
-          </a:prstGeom>
-          <a:noFill/>
-          <a:extLst>
-            <a:ext uri="{909E8E84-426E-40DD-AFC4-6F175D3DCCD1}">
-              <a14:hiddenFill xmlns:a14="http://schemas.microsoft.com/office/drawing/2010/main">
-                <a:solidFill>
-                  <a:srgbClr val="FFFFFF"/>
-                </a:solidFill>
-              </a14:hiddenFill>
-            </a:ext>
-          </a:extLst>
-        </p:spPr>
-      </p:pic>
-      <p:pic>
-        <p:nvPicPr>
-          <p:cNvPr id="2064" name="Picture 16" descr="Vintage Hammer Clipart PNG Transparent | OnlyGFX.com">
-            <a:extLst>
-              <a:ext uri="{FF2B5EF4-FFF2-40B4-BE49-F238E27FC236}">
-                <a16:creationId xmlns:a16="http://schemas.microsoft.com/office/drawing/2014/main" id="{2939920B-EA15-252B-07D3-C13FBB53BE5F}"/>
-              </a:ext>
-            </a:extLst>
-          </p:cNvPr>
-          <p:cNvPicPr>
-            <a:picLocks noChangeAspect="1" noChangeArrowheads="1"/>
-          </p:cNvPicPr>
-          <p:nvPr/>
-        </p:nvPicPr>
-        <p:blipFill>
-          <a:blip r:embed="rId7">
-            <a:extLst>
-              <a:ext uri="{28A0092B-C50C-407E-A947-70E740481C1C}">
-                <a14:useLocalDpi xmlns:a14="http://schemas.microsoft.com/office/drawing/2010/main" val="0"/>
-              </a:ext>
-            </a:extLst>
-          </a:blip>
-          <a:srcRect/>
-          <a:stretch>
-            <a:fillRect/>
-          </a:stretch>
-        </p:blipFill>
-        <p:spPr bwMode="auto">
-          <a:xfrm rot="8285875" flipH="1">
-            <a:off x="2090597" y="231309"/>
-            <a:ext cx="1296108" cy="1148080"/>
-          </a:xfrm>
-          <a:prstGeom prst="rect">
-            <a:avLst/>
-          </a:prstGeom>
-          <a:noFill/>
-          <a:extLst>
-            <a:ext uri="{909E8E84-426E-40DD-AFC4-6F175D3DCCD1}">
-              <a14:hiddenFill xmlns:a14="http://schemas.microsoft.com/office/drawing/2010/main">
-                <a:solidFill>
-                  <a:srgbClr val="FFFFFF"/>
-                </a:solidFill>
-              </a14:hiddenFill>
-            </a:ext>
-          </a:extLst>
-        </p:spPr>
-      </p:pic>
-      <p:pic>
-        <p:nvPicPr>
-          <p:cNvPr id="2066" name="Picture 18" descr="Line,Angle,Brush PNG Clipart - Royalty Free SVG / PNG">
-            <a:extLst>
-              <a:ext uri="{FF2B5EF4-FFF2-40B4-BE49-F238E27FC236}">
-                <a16:creationId xmlns:a16="http://schemas.microsoft.com/office/drawing/2014/main" id="{F811E012-932E-5535-B609-7459EE07C8E2}"/>
-              </a:ext>
-            </a:extLst>
-          </p:cNvPr>
-          <p:cNvPicPr>
-            <a:picLocks noChangeAspect="1" noChangeArrowheads="1"/>
-          </p:cNvPicPr>
-          <p:nvPr/>
-        </p:nvPicPr>
-        <p:blipFill>
-          <a:blip r:embed="rId8">
-            <a:extLst>
-              <a:ext uri="{28A0092B-C50C-407E-A947-70E740481C1C}">
-                <a14:useLocalDpi xmlns:a14="http://schemas.microsoft.com/office/drawing/2010/main" val="0"/>
-              </a:ext>
-            </a:extLst>
-          </a:blip>
-          <a:srcRect/>
-          <a:stretch>
-            <a:fillRect/>
-          </a:stretch>
-        </p:blipFill>
-        <p:spPr bwMode="auto">
-          <a:xfrm rot="1872148" flipH="1">
-            <a:off x="3109020" y="140717"/>
-            <a:ext cx="615596" cy="845589"/>
-          </a:xfrm>
-          <a:prstGeom prst="rect">
-            <a:avLst/>
-          </a:prstGeom>
-          <a:noFill/>
-          <a:extLst>
-            <a:ext uri="{909E8E84-426E-40DD-AFC4-6F175D3DCCD1}">
-              <a14:hiddenFill xmlns:a14="http://schemas.microsoft.com/office/drawing/2010/main">
-                <a:solidFill>
-                  <a:srgbClr val="FFFFFF"/>
-                </a:solidFill>
-              </a14:hiddenFill>
-            </a:ext>
-          </a:extLst>
         </p:spPr>
       </p:pic>
       <p:pic>
@@ -4913,7 +4539,7 @@
         </p:blipFill>
         <p:spPr bwMode="auto">
           <a:xfrm>
-            <a:off x="2925418" y="1241873"/>
+            <a:off x="2949814" y="1237154"/>
             <a:ext cx="3066442" cy="1533221"/>
           </a:xfrm>
           <a:prstGeom prst="rect">
@@ -4960,7 +4586,7 @@
         </p:blipFill>
         <p:spPr bwMode="auto">
           <a:xfrm>
-            <a:off x="9058300" y="1239520"/>
+            <a:off x="9048140" y="1239520"/>
             <a:ext cx="3124033" cy="1528491"/>
           </a:xfrm>
           <a:prstGeom prst="rect">
@@ -4980,10 +4606,10 @@
       </p:pic>
       <p:pic>
         <p:nvPicPr>
-          <p:cNvPr id="5" name="Picture 26" descr="Strip Of Wood Wood Border Wood Transparent Png Images – Free PNG Images  Vector, PSD, Clipart, Templates">
-            <a:extLst>
-              <a:ext uri="{FF2B5EF4-FFF2-40B4-BE49-F238E27FC236}">
-                <a16:creationId xmlns:a16="http://schemas.microsoft.com/office/drawing/2014/main" id="{5FE719CE-7E28-9DFB-D144-E96A5D9D7126}"/>
+          <p:cNvPr id="6" name="Picture 26" descr="Strip Of Wood Wood Border Wood Transparent Png Images – Free PNG Images  Vector, PSD, Clipart, Templates">
+            <a:extLst>
+              <a:ext uri="{FF2B5EF4-FFF2-40B4-BE49-F238E27FC236}">
+                <a16:creationId xmlns:a16="http://schemas.microsoft.com/office/drawing/2014/main" id="{B8E151BD-3D86-6977-179D-623F0DF9A264}"/>
               </a:ext>
             </a:extLst>
           </p:cNvPr>
@@ -5007,54 +4633,7 @@
         </p:blipFill>
         <p:spPr bwMode="auto">
           <a:xfrm>
-            <a:off x="-1922349" y="3099269"/>
-            <a:ext cx="3066442" cy="1533221"/>
-          </a:xfrm>
-          <a:prstGeom prst="rect">
-            <a:avLst/>
-          </a:prstGeom>
-          <a:noFill/>
-          <a:extLst>
-            <a:ext uri="{909E8E84-426E-40DD-AFC4-6F175D3DCCD1}">
-              <a14:hiddenFill xmlns:a14="http://schemas.microsoft.com/office/drawing/2010/main">
-                <a:solidFill>
-                  <a:srgbClr val="FFFFFF"/>
-                </a:solidFill>
-              </a14:hiddenFill>
-            </a:ext>
-          </a:extLst>
-        </p:spPr>
-      </p:pic>
-      <p:pic>
-        <p:nvPicPr>
-          <p:cNvPr id="6" name="Picture 26" descr="Strip Of Wood Wood Border Wood Transparent Png Images – Free PNG Images  Vector, PSD, Clipart, Templates">
-            <a:extLst>
-              <a:ext uri="{FF2B5EF4-FFF2-40B4-BE49-F238E27FC236}">
-                <a16:creationId xmlns:a16="http://schemas.microsoft.com/office/drawing/2014/main" id="{B8E151BD-3D86-6977-179D-623F0DF9A264}"/>
-              </a:ext>
-            </a:extLst>
-          </p:cNvPr>
-          <p:cNvPicPr>
-            <a:picLocks noChangeAspect="1" noChangeArrowheads="1"/>
-          </p:cNvPicPr>
-          <p:nvPr/>
-        </p:nvPicPr>
-        <p:blipFill>
-          <a:blip r:embed="rId3">
-            <a:extLst>
-              <a:ext uri="{28A0092B-C50C-407E-A947-70E740481C1C}">
-                <a14:useLocalDpi xmlns:a14="http://schemas.microsoft.com/office/drawing/2010/main" val="0"/>
-              </a:ext>
-            </a:extLst>
-          </a:blip>
-          <a:srcRect/>
-          <a:stretch>
-            <a:fillRect/>
-          </a:stretch>
-        </p:blipFill>
-        <p:spPr bwMode="auto">
-          <a:xfrm>
-            <a:off x="10037587" y="4011130"/>
+            <a:off x="9985665" y="4020389"/>
             <a:ext cx="3066442" cy="1533221"/>
           </a:xfrm>
           <a:prstGeom prst="rect">
@@ -5101,7 +4680,7 @@
         </p:blipFill>
         <p:spPr bwMode="auto">
           <a:xfrm>
-            <a:off x="1116907" y="3121615"/>
+            <a:off x="1093293" y="3099268"/>
             <a:ext cx="3066442" cy="1533221"/>
           </a:xfrm>
           <a:prstGeom prst="rect">
@@ -5148,7 +4727,7 @@
         </p:blipFill>
         <p:spPr bwMode="auto">
           <a:xfrm>
-            <a:off x="-79402" y="5920447"/>
+            <a:off x="-98015" y="5917640"/>
             <a:ext cx="3066442" cy="1533221"/>
           </a:xfrm>
           <a:prstGeom prst="rect">
@@ -5322,7 +4901,7 @@
           <p:nvPr/>
         </p:nvPicPr>
         <p:blipFill>
-          <a:blip r:embed="rId9">
+          <a:blip r:embed="rId4">
             <a:extLst>
               <a:ext uri="{28A0092B-C50C-407E-A947-70E740481C1C}">
                 <a14:useLocalDpi xmlns:a14="http://schemas.microsoft.com/office/drawing/2010/main" val="0"/>
@@ -5338,6 +4917,335 @@
           <a:xfrm>
             <a:off x="0" y="2348483"/>
             <a:ext cx="1310639" cy="1353567"/>
+          </a:xfrm>
+          <a:prstGeom prst="rect">
+            <a:avLst/>
+          </a:prstGeom>
+          <a:noFill/>
+          <a:extLst>
+            <a:ext uri="{909E8E84-426E-40DD-AFC4-6F175D3DCCD1}">
+              <a14:hiddenFill xmlns:a14="http://schemas.microsoft.com/office/drawing/2010/main">
+                <a:solidFill>
+                  <a:srgbClr val="FFFFFF"/>
+                </a:solidFill>
+              </a14:hiddenFill>
+            </a:ext>
+          </a:extLst>
+        </p:spPr>
+      </p:pic>
+      <p:pic>
+        <p:nvPicPr>
+          <p:cNvPr id="5" name="Picture 26" descr="Strip Of Wood Wood Border Wood Transparent Png Images – Free PNG Images  Vector, PSD, Clipart, Templates">
+            <a:extLst>
+              <a:ext uri="{FF2B5EF4-FFF2-40B4-BE49-F238E27FC236}">
+                <a16:creationId xmlns:a16="http://schemas.microsoft.com/office/drawing/2014/main" id="{5FE719CE-7E28-9DFB-D144-E96A5D9D7126}"/>
+              </a:ext>
+            </a:extLst>
+          </p:cNvPr>
+          <p:cNvPicPr>
+            <a:picLocks noChangeAspect="1" noChangeArrowheads="1"/>
+          </p:cNvPicPr>
+          <p:nvPr/>
+        </p:nvPicPr>
+        <p:blipFill>
+          <a:blip r:embed="rId3">
+            <a:extLst>
+              <a:ext uri="{28A0092B-C50C-407E-A947-70E740481C1C}">
+                <a14:useLocalDpi xmlns:a14="http://schemas.microsoft.com/office/drawing/2010/main" val="0"/>
+              </a:ext>
+            </a:extLst>
+          </a:blip>
+          <a:srcRect/>
+          <a:stretch>
+            <a:fillRect/>
+          </a:stretch>
+        </p:blipFill>
+        <p:spPr bwMode="auto">
+          <a:xfrm>
+            <a:off x="-1973149" y="3099269"/>
+            <a:ext cx="3066442" cy="1533221"/>
+          </a:xfrm>
+          <a:prstGeom prst="rect">
+            <a:avLst/>
+          </a:prstGeom>
+          <a:noFill/>
+          <a:extLst>
+            <a:ext uri="{909E8E84-426E-40DD-AFC4-6F175D3DCCD1}">
+              <a14:hiddenFill xmlns:a14="http://schemas.microsoft.com/office/drawing/2010/main">
+                <a:solidFill>
+                  <a:srgbClr val="FFFFFF"/>
+                </a:solidFill>
+              </a14:hiddenFill>
+            </a:ext>
+          </a:extLst>
+        </p:spPr>
+      </p:pic>
+      <p:pic>
+        <p:nvPicPr>
+          <p:cNvPr id="3" name="Picture 26" descr="Wrench Tool Grey Transparent PNG &amp; SVG Vector">
+            <a:extLst>
+              <a:ext uri="{FF2B5EF4-FFF2-40B4-BE49-F238E27FC236}">
+                <a16:creationId xmlns:a16="http://schemas.microsoft.com/office/drawing/2014/main" id="{AC3C0BD0-46F9-B5A4-1F75-E365CDB7A234}"/>
+              </a:ext>
+            </a:extLst>
+          </p:cNvPr>
+          <p:cNvPicPr>
+            <a:picLocks noChangeAspect="1" noChangeArrowheads="1"/>
+          </p:cNvPicPr>
+          <p:nvPr/>
+        </p:nvPicPr>
+        <p:blipFill>
+          <a:blip r:embed="rId5">
+            <a:extLst>
+              <a:ext uri="{28A0092B-C50C-407E-A947-70E740481C1C}">
+                <a14:useLocalDpi xmlns:a14="http://schemas.microsoft.com/office/drawing/2010/main" val="0"/>
+              </a:ext>
+            </a:extLst>
+          </a:blip>
+          <a:srcRect/>
+          <a:stretch>
+            <a:fillRect/>
+          </a:stretch>
+        </p:blipFill>
+        <p:spPr bwMode="auto">
+          <a:xfrm rot="10800000">
+            <a:off x="868507" y="3674150"/>
+            <a:ext cx="1239520" cy="1239520"/>
+          </a:xfrm>
+          <a:prstGeom prst="rect">
+            <a:avLst/>
+          </a:prstGeom>
+          <a:noFill/>
+          <a:extLst>
+            <a:ext uri="{909E8E84-426E-40DD-AFC4-6F175D3DCCD1}">
+              <a14:hiddenFill xmlns:a14="http://schemas.microsoft.com/office/drawing/2010/main">
+                <a:solidFill>
+                  <a:srgbClr val="FFFFFF"/>
+                </a:solidFill>
+              </a14:hiddenFill>
+            </a:ext>
+          </a:extLst>
+        </p:spPr>
+      </p:pic>
+      <p:pic>
+        <p:nvPicPr>
+          <p:cNvPr id="2062" name="Picture 14" descr="Screwdriver 14 Clip Art at Clker.com - vector clip art online, royalty free  &amp; public domain">
+            <a:extLst>
+              <a:ext uri="{FF2B5EF4-FFF2-40B4-BE49-F238E27FC236}">
+                <a16:creationId xmlns:a16="http://schemas.microsoft.com/office/drawing/2014/main" id="{D293F865-BF8E-5B3D-98C1-19D5DDF9A2F3}"/>
+              </a:ext>
+            </a:extLst>
+          </p:cNvPr>
+          <p:cNvPicPr>
+            <a:picLocks noChangeAspect="1" noChangeArrowheads="1"/>
+          </p:cNvPicPr>
+          <p:nvPr/>
+        </p:nvPicPr>
+        <p:blipFill>
+          <a:blip r:embed="rId6">
+            <a:extLst>
+              <a:ext uri="{28A0092B-C50C-407E-A947-70E740481C1C}">
+                <a14:useLocalDpi xmlns:a14="http://schemas.microsoft.com/office/drawing/2010/main" val="0"/>
+              </a:ext>
+            </a:extLst>
+          </a:blip>
+          <a:srcRect/>
+          <a:stretch>
+            <a:fillRect/>
+          </a:stretch>
+        </p:blipFill>
+        <p:spPr bwMode="auto">
+          <a:xfrm rot="8813131">
+            <a:off x="1621966" y="3778178"/>
+            <a:ext cx="632961" cy="914278"/>
+          </a:xfrm>
+          <a:prstGeom prst="rect">
+            <a:avLst/>
+          </a:prstGeom>
+          <a:noFill/>
+          <a:extLst>
+            <a:ext uri="{909E8E84-426E-40DD-AFC4-6F175D3DCCD1}">
+              <a14:hiddenFill xmlns:a14="http://schemas.microsoft.com/office/drawing/2010/main">
+                <a:solidFill>
+                  <a:srgbClr val="FFFFFF"/>
+                </a:solidFill>
+              </a14:hiddenFill>
+            </a:ext>
+          </a:extLst>
+        </p:spPr>
+      </p:pic>
+      <p:pic>
+        <p:nvPicPr>
+          <p:cNvPr id="2064" name="Picture 16" descr="Vintage Hammer Clipart PNG Transparent | OnlyGFX.com">
+            <a:extLst>
+              <a:ext uri="{FF2B5EF4-FFF2-40B4-BE49-F238E27FC236}">
+                <a16:creationId xmlns:a16="http://schemas.microsoft.com/office/drawing/2014/main" id="{2939920B-EA15-252B-07D3-C13FBB53BE5F}"/>
+              </a:ext>
+            </a:extLst>
+          </p:cNvPr>
+          <p:cNvPicPr>
+            <a:picLocks noChangeAspect="1" noChangeArrowheads="1"/>
+          </p:cNvPicPr>
+          <p:nvPr/>
+        </p:nvPicPr>
+        <p:blipFill>
+          <a:blip r:embed="rId7">
+            <a:extLst>
+              <a:ext uri="{28A0092B-C50C-407E-A947-70E740481C1C}">
+                <a14:useLocalDpi xmlns:a14="http://schemas.microsoft.com/office/drawing/2010/main" val="0"/>
+              </a:ext>
+            </a:extLst>
+          </a:blip>
+          <a:srcRect/>
+          <a:stretch>
+            <a:fillRect/>
+          </a:stretch>
+        </p:blipFill>
+        <p:spPr bwMode="auto">
+          <a:xfrm rot="8285875" flipH="1">
+            <a:off x="2576086" y="3895872"/>
+            <a:ext cx="1089193" cy="964797"/>
+          </a:xfrm>
+          <a:prstGeom prst="rect">
+            <a:avLst/>
+          </a:prstGeom>
+          <a:noFill/>
+          <a:extLst>
+            <a:ext uri="{909E8E84-426E-40DD-AFC4-6F175D3DCCD1}">
+              <a14:hiddenFill xmlns:a14="http://schemas.microsoft.com/office/drawing/2010/main">
+                <a:solidFill>
+                  <a:srgbClr val="FFFFFF"/>
+                </a:solidFill>
+              </a14:hiddenFill>
+            </a:ext>
+          </a:extLst>
+        </p:spPr>
+      </p:pic>
+      <p:pic>
+        <p:nvPicPr>
+          <p:cNvPr id="2058" name="Picture 10" descr="Pin on card">
+            <a:extLst>
+              <a:ext uri="{FF2B5EF4-FFF2-40B4-BE49-F238E27FC236}">
+                <a16:creationId xmlns:a16="http://schemas.microsoft.com/office/drawing/2014/main" id="{545AA019-E631-0E01-7BA9-5F031E22B1CB}"/>
+              </a:ext>
+            </a:extLst>
+          </p:cNvPr>
+          <p:cNvPicPr>
+            <a:picLocks noChangeAspect="1" noChangeArrowheads="1"/>
+          </p:cNvPicPr>
+          <p:nvPr/>
+        </p:nvPicPr>
+        <p:blipFill>
+          <a:blip r:embed="rId8">
+            <a:extLst>
+              <a:ext uri="{28A0092B-C50C-407E-A947-70E740481C1C}">
+                <a14:useLocalDpi xmlns:a14="http://schemas.microsoft.com/office/drawing/2010/main" val="0"/>
+              </a:ext>
+            </a:extLst>
+          </a:blip>
+          <a:srcRect/>
+          <a:stretch>
+            <a:fillRect/>
+          </a:stretch>
+        </p:blipFill>
+        <p:spPr bwMode="auto">
+          <a:xfrm rot="19006529" flipH="1">
+            <a:off x="1975639" y="3713737"/>
+            <a:ext cx="1138004" cy="1219289"/>
+          </a:xfrm>
+          <a:prstGeom prst="rect">
+            <a:avLst/>
+          </a:prstGeom>
+          <a:noFill/>
+          <a:extLst>
+            <a:ext uri="{909E8E84-426E-40DD-AFC4-6F175D3DCCD1}">
+              <a14:hiddenFill xmlns:a14="http://schemas.microsoft.com/office/drawing/2010/main">
+                <a:solidFill>
+                  <a:srgbClr val="FFFFFF"/>
+                </a:solidFill>
+              </a14:hiddenFill>
+            </a:ext>
+          </a:extLst>
+        </p:spPr>
+      </p:pic>
+      <p:pic>
+        <p:nvPicPr>
+          <p:cNvPr id="2066" name="Picture 18" descr="Line,Angle,Brush PNG Clipart - Royalty Free SVG / PNG">
+            <a:extLst>
+              <a:ext uri="{FF2B5EF4-FFF2-40B4-BE49-F238E27FC236}">
+                <a16:creationId xmlns:a16="http://schemas.microsoft.com/office/drawing/2014/main" id="{F811E012-932E-5535-B609-7459EE07C8E2}"/>
+              </a:ext>
+            </a:extLst>
+          </p:cNvPr>
+          <p:cNvPicPr>
+            <a:picLocks noChangeAspect="1" noChangeArrowheads="1"/>
+          </p:cNvPicPr>
+          <p:nvPr/>
+        </p:nvPicPr>
+        <p:blipFill>
+          <a:blip r:embed="rId9">
+            <a:extLst>
+              <a:ext uri="{28A0092B-C50C-407E-A947-70E740481C1C}">
+                <a14:useLocalDpi xmlns:a14="http://schemas.microsoft.com/office/drawing/2010/main" val="0"/>
+              </a:ext>
+            </a:extLst>
+          </a:blip>
+          <a:srcRect/>
+          <a:stretch>
+            <a:fillRect/>
+          </a:stretch>
+        </p:blipFill>
+        <p:spPr bwMode="auto">
+          <a:xfrm rot="1872148" flipH="1">
+            <a:off x="3433497" y="3781135"/>
+            <a:ext cx="615596" cy="845589"/>
+          </a:xfrm>
+          <a:prstGeom prst="rect">
+            <a:avLst/>
+          </a:prstGeom>
+          <a:noFill/>
+          <a:extLst>
+            <a:ext uri="{909E8E84-426E-40DD-AFC4-6F175D3DCCD1}">
+              <a14:hiddenFill xmlns:a14="http://schemas.microsoft.com/office/drawing/2010/main">
+                <a:solidFill>
+                  <a:srgbClr val="FFFFFF"/>
+                </a:solidFill>
+              </a14:hiddenFill>
+            </a:ext>
+          </a:extLst>
+        </p:spPr>
+      </p:pic>
+      <p:pic>
+        <p:nvPicPr>
+          <p:cNvPr id="12" name="Picture 16" descr="Vehicle Outline Images | Free Vectors, Stock Photos &amp; PSD | Page 2">
+            <a:extLst>
+              <a:ext uri="{FF2B5EF4-FFF2-40B4-BE49-F238E27FC236}">
+                <a16:creationId xmlns:a16="http://schemas.microsoft.com/office/drawing/2014/main" id="{FBC4B874-1996-313D-1F3D-A53BC5D8AE1D}"/>
+              </a:ext>
+            </a:extLst>
+          </p:cNvPr>
+          <p:cNvPicPr>
+            <a:picLocks noChangeAspect="1" noChangeArrowheads="1"/>
+          </p:cNvPicPr>
+          <p:nvPr/>
+        </p:nvPicPr>
+        <p:blipFill>
+          <a:blip r:embed="rId10">
+            <a:extLst>
+              <a:ext uri="{28A0092B-C50C-407E-A947-70E740481C1C}">
+                <a14:useLocalDpi xmlns:a14="http://schemas.microsoft.com/office/drawing/2010/main" val="0"/>
+              </a:ext>
+            </a:extLst>
+          </a:blip>
+          <a:srcRect/>
+          <a:stretch>
+            <a:fillRect/>
+          </a:stretch>
+        </p:blipFill>
+        <p:spPr bwMode="auto">
+          <a:xfrm>
+            <a:off x="5118100" y="4259581"/>
+            <a:ext cx="2951480" cy="2951480"/>
           </a:xfrm>
           <a:prstGeom prst="rect">
             <a:avLst/>
@@ -5485,6 +5393,249 @@
     <p:extLst>
       <p:ext uri="{BB962C8B-B14F-4D97-AF65-F5344CB8AC3E}">
         <p14:creationId xmlns:p14="http://schemas.microsoft.com/office/powerpoint/2010/main" val="2862107733"/>
+      </p:ext>
+    </p:extLst>
+  </p:cSld>
+  <p:clrMapOvr>
+    <a:masterClrMapping/>
+  </p:clrMapOvr>
+</p:sld>
+</file>
+
+<file path=ppt/slides/slide4.xml><?xml version="1.0" encoding="utf-8"?>
+<p:sld xmlns:a="http://schemas.openxmlformats.org/drawingml/2006/main" xmlns:r="http://schemas.openxmlformats.org/officeDocument/2006/relationships" xmlns:p="http://schemas.openxmlformats.org/presentationml/2006/main">
+  <p:cSld>
+    <p:spTree>
+      <p:nvGrpSpPr>
+        <p:cNvPr id="1" name=""/>
+        <p:cNvGrpSpPr/>
+        <p:nvPr/>
+      </p:nvGrpSpPr>
+      <p:grpSpPr>
+        <a:xfrm>
+          <a:off x="0" y="0"/>
+          <a:ext cx="0" cy="0"/>
+          <a:chOff x="0" y="0"/>
+          <a:chExt cx="0" cy="0"/>
+        </a:xfrm>
+      </p:grpSpPr>
+      <p:sp>
+        <p:nvSpPr>
+          <p:cNvPr id="4" name="Oval 3">
+            <a:extLst>
+              <a:ext uri="{FF2B5EF4-FFF2-40B4-BE49-F238E27FC236}">
+                <a16:creationId xmlns:a16="http://schemas.microsoft.com/office/drawing/2014/main" id="{6D07A874-CD13-7E38-F0AC-C7011507F7A8}"/>
+              </a:ext>
+            </a:extLst>
+          </p:cNvPr>
+          <p:cNvSpPr/>
+          <p:nvPr/>
+        </p:nvSpPr>
+        <p:spPr>
+          <a:xfrm rot="17159783">
+            <a:off x="5341953" y="2956926"/>
+            <a:ext cx="985156" cy="1348565"/>
+          </a:xfrm>
+          <a:prstGeom prst="ellipse">
+            <a:avLst/>
+          </a:prstGeom>
+          <a:solidFill>
+            <a:schemeClr val="accent1"/>
+          </a:solidFill>
+          <a:ln>
+            <a:solidFill>
+              <a:schemeClr val="tx1"/>
+            </a:solidFill>
+          </a:ln>
+        </p:spPr>
+        <p:style>
+          <a:lnRef idx="2">
+            <a:schemeClr val="accent1">
+              <a:shade val="50000"/>
+            </a:schemeClr>
+          </a:lnRef>
+          <a:fillRef idx="1">
+            <a:schemeClr val="accent1"/>
+          </a:fillRef>
+          <a:effectRef idx="0">
+            <a:schemeClr val="accent1"/>
+          </a:effectRef>
+          <a:fontRef idx="minor">
+            <a:schemeClr val="lt1"/>
+          </a:fontRef>
+        </p:style>
+        <p:txBody>
+          <a:bodyPr rtlCol="0" anchor="ctr"/>
+          <a:lstStyle/>
+          <a:p>
+            <a:pPr algn="ctr"/>
+            <a:endParaRPr lang="da-DK"/>
+          </a:p>
+        </p:txBody>
+      </p:sp>
+      <p:sp>
+        <p:nvSpPr>
+          <p:cNvPr id="5" name="Oval 4">
+            <a:extLst>
+              <a:ext uri="{FF2B5EF4-FFF2-40B4-BE49-F238E27FC236}">
+                <a16:creationId xmlns:a16="http://schemas.microsoft.com/office/drawing/2014/main" id="{E98906F2-BEBE-4F50-854F-282E3D8785BA}"/>
+              </a:ext>
+            </a:extLst>
+          </p:cNvPr>
+          <p:cNvSpPr/>
+          <p:nvPr/>
+        </p:nvSpPr>
+        <p:spPr>
+          <a:xfrm>
+            <a:off x="5062846" y="2438400"/>
+            <a:ext cx="942026" cy="1341120"/>
+          </a:xfrm>
+          <a:prstGeom prst="ellipse">
+            <a:avLst/>
+          </a:prstGeom>
+          <a:solidFill>
+            <a:schemeClr val="accent1"/>
+          </a:solidFill>
+          <a:ln>
+            <a:solidFill>
+              <a:schemeClr val="tx1"/>
+            </a:solidFill>
+          </a:ln>
+        </p:spPr>
+        <p:style>
+          <a:lnRef idx="2">
+            <a:schemeClr val="accent1">
+              <a:shade val="50000"/>
+            </a:schemeClr>
+          </a:lnRef>
+          <a:fillRef idx="1">
+            <a:schemeClr val="accent1"/>
+          </a:fillRef>
+          <a:effectRef idx="0">
+            <a:schemeClr val="accent1"/>
+          </a:effectRef>
+          <a:fontRef idx="minor">
+            <a:schemeClr val="lt1"/>
+          </a:fontRef>
+        </p:style>
+        <p:txBody>
+          <a:bodyPr rtlCol="0" anchor="ctr"/>
+          <a:lstStyle/>
+          <a:p>
+            <a:pPr algn="ctr"/>
+            <a:endParaRPr lang="da-DK"/>
+          </a:p>
+        </p:txBody>
+      </p:sp>
+      <p:sp>
+        <p:nvSpPr>
+          <p:cNvPr id="6" name="Oval 5">
+            <a:extLst>
+              <a:ext uri="{FF2B5EF4-FFF2-40B4-BE49-F238E27FC236}">
+                <a16:creationId xmlns:a16="http://schemas.microsoft.com/office/drawing/2014/main" id="{FFD8ECC7-584A-5A6A-581E-C37F9C34ECB5}"/>
+              </a:ext>
+            </a:extLst>
+          </p:cNvPr>
+          <p:cNvSpPr/>
+          <p:nvPr/>
+        </p:nvSpPr>
+        <p:spPr>
+          <a:xfrm>
+            <a:off x="5050614" y="1772921"/>
+            <a:ext cx="942026" cy="960119"/>
+          </a:xfrm>
+          <a:prstGeom prst="ellipse">
+            <a:avLst/>
+          </a:prstGeom>
+          <a:solidFill>
+            <a:schemeClr val="accent1"/>
+          </a:solidFill>
+          <a:ln>
+            <a:solidFill>
+              <a:schemeClr val="tx1"/>
+            </a:solidFill>
+          </a:ln>
+        </p:spPr>
+        <p:style>
+          <a:lnRef idx="2">
+            <a:schemeClr val="accent1">
+              <a:shade val="50000"/>
+            </a:schemeClr>
+          </a:lnRef>
+          <a:fillRef idx="1">
+            <a:schemeClr val="accent1"/>
+          </a:fillRef>
+          <a:effectRef idx="0">
+            <a:schemeClr val="accent1"/>
+          </a:effectRef>
+          <a:fontRef idx="minor">
+            <a:schemeClr val="lt1"/>
+          </a:fontRef>
+        </p:style>
+        <p:txBody>
+          <a:bodyPr rtlCol="0" anchor="ctr"/>
+          <a:lstStyle/>
+          <a:p>
+            <a:pPr algn="ctr"/>
+            <a:endParaRPr lang="da-DK"/>
+          </a:p>
+        </p:txBody>
+      </p:sp>
+      <p:sp>
+        <p:nvSpPr>
+          <p:cNvPr id="10" name="Rectangle 9">
+            <a:extLst>
+              <a:ext uri="{FF2B5EF4-FFF2-40B4-BE49-F238E27FC236}">
+                <a16:creationId xmlns:a16="http://schemas.microsoft.com/office/drawing/2014/main" id="{F390B754-0268-FC69-2855-39B66599BD4A}"/>
+              </a:ext>
+            </a:extLst>
+          </p:cNvPr>
+          <p:cNvSpPr/>
+          <p:nvPr/>
+        </p:nvSpPr>
+        <p:spPr>
+          <a:xfrm rot="16200000">
+            <a:off x="5576011" y="1648074"/>
+            <a:ext cx="398131" cy="118910"/>
+          </a:xfrm>
+          <a:prstGeom prst="rect">
+            <a:avLst/>
+          </a:prstGeom>
+          <a:ln>
+            <a:solidFill>
+              <a:schemeClr val="tx1"/>
+            </a:solidFill>
+          </a:ln>
+        </p:spPr>
+        <p:style>
+          <a:lnRef idx="2">
+            <a:schemeClr val="accent1">
+              <a:shade val="50000"/>
+            </a:schemeClr>
+          </a:lnRef>
+          <a:fillRef idx="1">
+            <a:schemeClr val="accent1"/>
+          </a:fillRef>
+          <a:effectRef idx="0">
+            <a:schemeClr val="accent1"/>
+          </a:effectRef>
+          <a:fontRef idx="minor">
+            <a:schemeClr val="lt1"/>
+          </a:fontRef>
+        </p:style>
+        <p:txBody>
+          <a:bodyPr rtlCol="0" anchor="ctr"/>
+          <a:lstStyle/>
+          <a:p>
+            <a:pPr algn="ctr"/>
+            <a:endParaRPr lang="da-DK" dirty="0"/>
+          </a:p>
+        </p:txBody>
+      </p:sp>
+    </p:spTree>
+    <p:extLst>
+      <p:ext uri="{BB962C8B-B14F-4D97-AF65-F5344CB8AC3E}">
+        <p14:creationId xmlns:p14="http://schemas.microsoft.com/office/powerpoint/2010/main" val="264347067"/>
       </p:ext>
     </p:extLst>
   </p:cSld>

</xml_diff>

<commit_message>
Meget lille ændring i forgrunden
</commit_message>
<xml_diff>
--- a/Baggrund til myrespil (Powerpoint er bedre end gimp).pptx
+++ b/Baggrund til myrespil (Powerpoint er bedre end gimp).pptx
@@ -120,7 +120,7 @@
 <file path=ppt/revisionInfo.xml><?xml version="1.0" encoding="utf-8"?>
 <p1510:revInfo xmlns:a="http://schemas.openxmlformats.org/drawingml/2006/main" xmlns:r="http://schemas.openxmlformats.org/officeDocument/2006/relationships" xmlns:p1510="http://schemas.microsoft.com/office/powerpoint/2015/10/main">
   <p1510:revLst>
-    <p1510:client id="{DC7B2068-E1F4-4E5C-877E-327DD41C7028}" v="690" dt="2022-09-14T08:17:52.589"/>
+    <p1510:client id="{DC7B2068-E1F4-4E5C-877E-327DD41C7028}" v="696" dt="2022-09-14T08:29:21.191"/>
   </p1510:revLst>
 </p1510:revInfo>
 </file>
@@ -130,7 +130,7 @@
   <pc:docChgLst>
     <pc:chgData name="Cathrine Duedahl-Olesen" userId="0f4ad920445e6980" providerId="LiveId" clId="{DC7B2068-E1F4-4E5C-877E-327DD41C7028}"/>
     <pc:docChg chg="undo custSel addSld modSld modMainMaster">
-      <pc:chgData name="Cathrine Duedahl-Olesen" userId="0f4ad920445e6980" providerId="LiveId" clId="{DC7B2068-E1F4-4E5C-877E-327DD41C7028}" dt="2022-09-14T08:22:32.916" v="1007" actId="478"/>
+      <pc:chgData name="Cathrine Duedahl-Olesen" userId="0f4ad920445e6980" providerId="LiveId" clId="{DC7B2068-E1F4-4E5C-877E-327DD41C7028}" dt="2022-09-14T08:29:30.982" v="1021" actId="478"/>
       <pc:docMkLst>
         <pc:docMk/>
       </pc:docMkLst>
@@ -166,7 +166,7 @@
         </pc:picChg>
       </pc:sldChg>
       <pc:sldChg chg="addSp delSp modSp mod">
-        <pc:chgData name="Cathrine Duedahl-Olesen" userId="0f4ad920445e6980" providerId="LiveId" clId="{DC7B2068-E1F4-4E5C-877E-327DD41C7028}" dt="2022-09-14T06:45:23.045" v="470"/>
+        <pc:chgData name="Cathrine Duedahl-Olesen" userId="0f4ad920445e6980" providerId="LiveId" clId="{DC7B2068-E1F4-4E5C-877E-327DD41C7028}" dt="2022-09-14T08:29:30.982" v="1021" actId="478"/>
         <pc:sldMkLst>
           <pc:docMk/>
           <pc:sldMk cId="3262991845" sldId="258"/>
@@ -179,6 +179,30 @@
             <ac:spMk id="2" creationId="{2F444BB8-974F-2FFB-3891-72E2CA48B3CE}"/>
           </ac:spMkLst>
         </pc:spChg>
+        <pc:spChg chg="add del mod">
+          <ac:chgData name="Cathrine Duedahl-Olesen" userId="0f4ad920445e6980" providerId="LiveId" clId="{DC7B2068-E1F4-4E5C-877E-327DD41C7028}" dt="2022-09-14T08:29:19.260" v="1019" actId="478"/>
+          <ac:spMkLst>
+            <pc:docMk/>
+            <pc:sldMk cId="3262991845" sldId="258"/>
+            <ac:spMk id="2" creationId="{D559C994-63B5-CE25-8ABB-B4DAEC0688C3}"/>
+          </ac:spMkLst>
+        </pc:spChg>
+        <pc:spChg chg="add del mod">
+          <ac:chgData name="Cathrine Duedahl-Olesen" userId="0f4ad920445e6980" providerId="LiveId" clId="{DC7B2068-E1F4-4E5C-877E-327DD41C7028}" dt="2022-09-14T08:28:36.361" v="1017" actId="478"/>
+          <ac:spMkLst>
+            <pc:docMk/>
+            <pc:sldMk cId="3262991845" sldId="258"/>
+            <ac:spMk id="13" creationId="{E2A5D2ED-D90A-3A08-2019-09BC247ED20D}"/>
+          </ac:spMkLst>
+        </pc:spChg>
+        <pc:spChg chg="add del mod">
+          <ac:chgData name="Cathrine Duedahl-Olesen" userId="0f4ad920445e6980" providerId="LiveId" clId="{DC7B2068-E1F4-4E5C-877E-327DD41C7028}" dt="2022-09-14T08:29:30.982" v="1021" actId="478"/>
+          <ac:spMkLst>
+            <pc:docMk/>
+            <pc:sldMk cId="3262991845" sldId="258"/>
+            <ac:spMk id="14" creationId="{C59C2071-E052-1706-3600-C06C66FF5EDD}"/>
+          </ac:spMkLst>
+        </pc:spChg>
         <pc:spChg chg="del mod">
           <ac:chgData name="Cathrine Duedahl-Olesen" userId="0f4ad920445e6980" providerId="LiveId" clId="{DC7B2068-E1F4-4E5C-877E-327DD41C7028}" dt="2022-09-13T08:46:51.853" v="315" actId="478"/>
           <ac:spMkLst>
@@ -220,7 +244,7 @@
           </ac:picMkLst>
         </pc:picChg>
         <pc:picChg chg="mod">
-          <ac:chgData name="Cathrine Duedahl-Olesen" userId="0f4ad920445e6980" providerId="LiveId" clId="{DC7B2068-E1F4-4E5C-877E-327DD41C7028}" dt="2022-09-13T09:10:52.739" v="348" actId="1076"/>
+          <ac:chgData name="Cathrine Duedahl-Olesen" userId="0f4ad920445e6980" providerId="LiveId" clId="{DC7B2068-E1F4-4E5C-877E-327DD41C7028}" dt="2022-09-14T08:29:15.663" v="1018" actId="1076"/>
           <ac:picMkLst>
             <pc:docMk/>
             <pc:sldMk cId="3262991845" sldId="258"/>
@@ -236,7 +260,7 @@
           </ac:picMkLst>
         </pc:picChg>
         <pc:picChg chg="add mod">
-          <ac:chgData name="Cathrine Duedahl-Olesen" userId="0f4ad920445e6980" providerId="LiveId" clId="{DC7B2068-E1F4-4E5C-877E-327DD41C7028}" dt="2022-09-13T09:09:15.361" v="326" actId="166"/>
+          <ac:chgData name="Cathrine Duedahl-Olesen" userId="0f4ad920445e6980" providerId="LiveId" clId="{DC7B2068-E1F4-4E5C-877E-327DD41C7028}" dt="2022-09-14T08:29:15.663" v="1018" actId="1076"/>
           <ac:picMkLst>
             <pc:docMk/>
             <pc:sldMk cId="3262991845" sldId="258"/>
@@ -252,7 +276,7 @@
           </ac:picMkLst>
         </pc:picChg>
         <pc:picChg chg="add mod">
-          <ac:chgData name="Cathrine Duedahl-Olesen" userId="0f4ad920445e6980" providerId="LiveId" clId="{DC7B2068-E1F4-4E5C-877E-327DD41C7028}" dt="2022-09-13T08:45:24.494" v="307" actId="1076"/>
+          <ac:chgData name="Cathrine Duedahl-Olesen" userId="0f4ad920445e6980" providerId="LiveId" clId="{DC7B2068-E1F4-4E5C-877E-327DD41C7028}" dt="2022-09-14T08:29:15.663" v="1018" actId="1076"/>
           <ac:picMkLst>
             <pc:docMk/>
             <pc:sldMk cId="3262991845" sldId="258"/>
@@ -372,7 +396,7 @@
           </ac:picMkLst>
         </pc:picChg>
         <pc:picChg chg="add mod">
-          <ac:chgData name="Cathrine Duedahl-Olesen" userId="0f4ad920445e6980" providerId="LiveId" clId="{DC7B2068-E1F4-4E5C-877E-327DD41C7028}" dt="2022-09-13T07:53:42.184" v="291"/>
+          <ac:chgData name="Cathrine Duedahl-Olesen" userId="0f4ad920445e6980" providerId="LiveId" clId="{DC7B2068-E1F4-4E5C-877E-327DD41C7028}" dt="2022-09-14T08:29:15.663" v="1018" actId="1076"/>
           <ac:picMkLst>
             <pc:docMk/>
             <pc:sldMk cId="3262991845" sldId="258"/>
@@ -596,7 +620,7 @@
           </ac:picMkLst>
         </pc:picChg>
         <pc:picChg chg="mod">
-          <ac:chgData name="Cathrine Duedahl-Olesen" userId="0f4ad920445e6980" providerId="LiveId" clId="{DC7B2068-E1F4-4E5C-877E-327DD41C7028}" dt="2022-09-13T09:10:43.011" v="347" actId="1076"/>
+          <ac:chgData name="Cathrine Duedahl-Olesen" userId="0f4ad920445e6980" providerId="LiveId" clId="{DC7B2068-E1F4-4E5C-877E-327DD41C7028}" dt="2022-09-14T08:29:15.663" v="1018" actId="1076"/>
           <ac:picMkLst>
             <pc:docMk/>
             <pc:sldMk cId="3262991845" sldId="258"/>
@@ -604,7 +628,7 @@
           </ac:picMkLst>
         </pc:picChg>
         <pc:picChg chg="mod">
-          <ac:chgData name="Cathrine Duedahl-Olesen" userId="0f4ad920445e6980" providerId="LiveId" clId="{DC7B2068-E1F4-4E5C-877E-327DD41C7028}" dt="2022-09-13T09:10:40.709" v="346" actId="14100"/>
+          <ac:chgData name="Cathrine Duedahl-Olesen" userId="0f4ad920445e6980" providerId="LiveId" clId="{DC7B2068-E1F4-4E5C-877E-327DD41C7028}" dt="2022-09-14T08:29:15.663" v="1018" actId="1076"/>
           <ac:picMkLst>
             <pc:docMk/>
             <pc:sldMk cId="3262991845" sldId="258"/>
@@ -612,7 +636,7 @@
           </ac:picMkLst>
         </pc:picChg>
         <pc:picChg chg="mod">
-          <ac:chgData name="Cathrine Duedahl-Olesen" userId="0f4ad920445e6980" providerId="LiveId" clId="{DC7B2068-E1F4-4E5C-877E-327DD41C7028}" dt="2022-09-13T09:10:18.972" v="340" actId="1076"/>
+          <ac:chgData name="Cathrine Duedahl-Olesen" userId="0f4ad920445e6980" providerId="LiveId" clId="{DC7B2068-E1F4-4E5C-877E-327DD41C7028}" dt="2022-09-14T08:29:15.663" v="1018" actId="1076"/>
           <ac:picMkLst>
             <pc:docMk/>
             <pc:sldMk cId="3262991845" sldId="258"/>
@@ -5356,7 +5380,7 @@
         </p:blipFill>
         <p:spPr bwMode="auto">
           <a:xfrm>
-            <a:off x="1093293" y="3099268"/>
+            <a:off x="1116008" y="3150312"/>
             <a:ext cx="3066442" cy="1533221"/>
           </a:xfrm>
           <a:prstGeom prst="rect">
@@ -5591,7 +5615,7 @@
         </p:blipFill>
         <p:spPr bwMode="auto">
           <a:xfrm>
-            <a:off x="0" y="2348483"/>
+            <a:off x="22715" y="2399527"/>
             <a:ext cx="1310639" cy="1353567"/>
           </a:xfrm>
           <a:prstGeom prst="rect">
@@ -5638,7 +5662,7 @@
         </p:blipFill>
         <p:spPr bwMode="auto">
           <a:xfrm>
-            <a:off x="-1973149" y="3099269"/>
+            <a:off x="-1950434" y="3150313"/>
             <a:ext cx="3066442" cy="1533221"/>
           </a:xfrm>
           <a:prstGeom prst="rect">
@@ -5685,7 +5709,7 @@
         </p:blipFill>
         <p:spPr bwMode="auto">
           <a:xfrm rot="10800000">
-            <a:off x="868507" y="3674150"/>
+            <a:off x="891222" y="3725194"/>
             <a:ext cx="1239520" cy="1239520"/>
           </a:xfrm>
           <a:prstGeom prst="rect">
@@ -5732,7 +5756,7 @@
         </p:blipFill>
         <p:spPr bwMode="auto">
           <a:xfrm rot="8813131">
-            <a:off x="1621966" y="3778178"/>
+            <a:off x="1644681" y="3829222"/>
             <a:ext cx="632961" cy="914278"/>
           </a:xfrm>
           <a:prstGeom prst="rect">
@@ -5779,7 +5803,7 @@
         </p:blipFill>
         <p:spPr bwMode="auto">
           <a:xfrm rot="8285875" flipH="1">
-            <a:off x="2576086" y="3895872"/>
+            <a:off x="2598801" y="3946916"/>
             <a:ext cx="1089193" cy="964797"/>
           </a:xfrm>
           <a:prstGeom prst="rect">
@@ -5826,7 +5850,7 @@
         </p:blipFill>
         <p:spPr bwMode="auto">
           <a:xfrm rot="19006529" flipH="1">
-            <a:off x="1975639" y="3713737"/>
+            <a:off x="1998354" y="3764781"/>
             <a:ext cx="1138004" cy="1219289"/>
           </a:xfrm>
           <a:prstGeom prst="rect">

</xml_diff>

<commit_message>
myre og skrqldeoversigt (ikke færdig) og noget af knappen men ik funktionen
</commit_message>
<xml_diff>
--- a/Baggrund til myrespil (Powerpoint er bedre end gimp).pptx
+++ b/Baggrund til myrespil (Powerpoint er bedre end gimp).pptx
@@ -120,7 +120,7 @@
 <file path=ppt/revisionInfo.xml><?xml version="1.0" encoding="utf-8"?>
 <p1510:revInfo xmlns:a="http://schemas.openxmlformats.org/drawingml/2006/main" xmlns:r="http://schemas.openxmlformats.org/officeDocument/2006/relationships" xmlns:p1510="http://schemas.microsoft.com/office/powerpoint/2015/10/main">
   <p1510:revLst>
-    <p1510:client id="{DC7B2068-E1F4-4E5C-877E-327DD41C7028}" v="696" dt="2022-09-14T08:29:21.191"/>
+    <p1510:client id="{DC7B2068-E1F4-4E5C-877E-327DD41C7028}" v="819" dt="2022-09-14T12:33:34.146"/>
   </p1510:revLst>
 </p1510:revInfo>
 </file>
@@ -130,18 +130,26 @@
   <pc:docChgLst>
     <pc:chgData name="Cathrine Duedahl-Olesen" userId="0f4ad920445e6980" providerId="LiveId" clId="{DC7B2068-E1F4-4E5C-877E-327DD41C7028}"/>
     <pc:docChg chg="undo custSel addSld modSld modMainMaster">
-      <pc:chgData name="Cathrine Duedahl-Olesen" userId="0f4ad920445e6980" providerId="LiveId" clId="{DC7B2068-E1F4-4E5C-877E-327DD41C7028}" dt="2022-09-14T08:29:30.982" v="1021" actId="478"/>
+      <pc:chgData name="Cathrine Duedahl-Olesen" userId="0f4ad920445e6980" providerId="LiveId" clId="{DC7B2068-E1F4-4E5C-877E-327DD41C7028}" dt="2022-09-14T12:34:34.864" v="1164" actId="207"/>
       <pc:docMkLst>
         <pc:docMk/>
       </pc:docMkLst>
       <pc:sldChg chg="addSp delSp modSp mod setBg">
-        <pc:chgData name="Cathrine Duedahl-Olesen" userId="0f4ad920445e6980" providerId="LiveId" clId="{DC7B2068-E1F4-4E5C-877E-327DD41C7028}" dt="2022-09-14T07:56:15.457" v="870"/>
+        <pc:chgData name="Cathrine Duedahl-Olesen" userId="0f4ad920445e6980" providerId="LiveId" clId="{DC7B2068-E1F4-4E5C-877E-327DD41C7028}" dt="2022-09-14T08:37:26.856" v="1040" actId="478"/>
         <pc:sldMkLst>
           <pc:docMk/>
           <pc:sldMk cId="431311570" sldId="256"/>
         </pc:sldMkLst>
         <pc:spChg chg="mod">
-          <ac:chgData name="Cathrine Duedahl-Olesen" userId="0f4ad920445e6980" providerId="LiveId" clId="{DC7B2068-E1F4-4E5C-877E-327DD41C7028}" dt="2022-09-13T07:52:49.628" v="287" actId="14100"/>
+          <ac:chgData name="Cathrine Duedahl-Olesen" userId="0f4ad920445e6980" providerId="LiveId" clId="{DC7B2068-E1F4-4E5C-877E-327DD41C7028}" dt="2022-09-14T08:37:20.331" v="1039" actId="1035"/>
+          <ac:spMkLst>
+            <pc:docMk/>
+            <pc:sldMk cId="431311570" sldId="256"/>
+            <ac:spMk id="45" creationId="{FAA02CC3-CCB9-C3AB-63F0-D71D0F875E2C}"/>
+          </ac:spMkLst>
+        </pc:spChg>
+        <pc:spChg chg="mod">
+          <ac:chgData name="Cathrine Duedahl-Olesen" userId="0f4ad920445e6980" providerId="LiveId" clId="{DC7B2068-E1F4-4E5C-877E-327DD41C7028}" dt="2022-09-14T08:36:14.410" v="1029" actId="1076"/>
           <ac:spMkLst>
             <pc:docMk/>
             <pc:sldMk cId="431311570" sldId="256"/>
@@ -149,11 +157,27 @@
           </ac:spMkLst>
         </pc:spChg>
         <pc:picChg chg="add del mod">
+          <ac:chgData name="Cathrine Duedahl-Olesen" userId="0f4ad920445e6980" providerId="LiveId" clId="{DC7B2068-E1F4-4E5C-877E-327DD41C7028}" dt="2022-09-14T08:35:47.523" v="1025"/>
+          <ac:picMkLst>
+            <pc:docMk/>
+            <pc:sldMk cId="431311570" sldId="256"/>
+            <ac:picMk id="2" creationId="{1E043EC3-D543-C428-875E-268C7B817FA8}"/>
+          </ac:picMkLst>
+        </pc:picChg>
+        <pc:picChg chg="add del mod">
           <ac:chgData name="Cathrine Duedahl-Olesen" userId="0f4ad920445e6980" providerId="LiveId" clId="{DC7B2068-E1F4-4E5C-877E-327DD41C7028}" dt="2022-09-13T08:27:24.376" v="293" actId="478"/>
           <ac:picMkLst>
             <pc:docMk/>
             <pc:sldMk cId="431311570" sldId="256"/>
             <ac:picMk id="2" creationId="{9EB95B74-1D1A-E4AD-FAFC-237598594844}"/>
+          </ac:picMkLst>
+        </pc:picChg>
+        <pc:picChg chg="add del mod">
+          <ac:chgData name="Cathrine Duedahl-Olesen" userId="0f4ad920445e6980" providerId="LiveId" clId="{DC7B2068-E1F4-4E5C-877E-327DD41C7028}" dt="2022-09-14T08:37:26.856" v="1040" actId="478"/>
+          <ac:picMkLst>
+            <pc:docMk/>
+            <pc:sldMk cId="431311570" sldId="256"/>
+            <ac:picMk id="3" creationId="{BD1E9A0F-2D04-8975-5F06-B144B23FA52C}"/>
           </ac:picMkLst>
         </pc:picChg>
         <pc:picChg chg="mod">
@@ -166,7 +190,7 @@
         </pc:picChg>
       </pc:sldChg>
       <pc:sldChg chg="addSp delSp modSp mod">
-        <pc:chgData name="Cathrine Duedahl-Olesen" userId="0f4ad920445e6980" providerId="LiveId" clId="{DC7B2068-E1F4-4E5C-877E-327DD41C7028}" dt="2022-09-14T08:29:30.982" v="1021" actId="478"/>
+        <pc:chgData name="Cathrine Duedahl-Olesen" userId="0f4ad920445e6980" providerId="LiveId" clId="{DC7B2068-E1F4-4E5C-877E-327DD41C7028}" dt="2022-09-14T08:37:16.191" v="1036"/>
         <pc:sldMkLst>
           <pc:docMk/>
           <pc:sldMk cId="3262991845" sldId="258"/>
@@ -177,6 +201,14 @@
             <pc:docMk/>
             <pc:sldMk cId="3262991845" sldId="258"/>
             <ac:spMk id="2" creationId="{2F444BB8-974F-2FFB-3891-72E2CA48B3CE}"/>
+          </ac:spMkLst>
+        </pc:spChg>
+        <pc:spChg chg="add del mod">
+          <ac:chgData name="Cathrine Duedahl-Olesen" userId="0f4ad920445e6980" providerId="LiveId" clId="{DC7B2068-E1F4-4E5C-877E-327DD41C7028}" dt="2022-09-14T08:37:16.191" v="1036"/>
+          <ac:spMkLst>
+            <pc:docMk/>
+            <pc:sldMk cId="3262991845" sldId="258"/>
+            <ac:spMk id="2" creationId="{BADA18FC-3EA7-F38E-7067-260A8A2307C7}"/>
           </ac:spMkLst>
         </pc:spChg>
         <pc:spChg chg="add del mod">
@@ -1298,11 +1330,19 @@
         </pc:cxnChg>
       </pc:sldChg>
       <pc:sldChg chg="addSp delSp modSp new mod">
-        <pc:chgData name="Cathrine Duedahl-Olesen" userId="0f4ad920445e6980" providerId="LiveId" clId="{DC7B2068-E1F4-4E5C-877E-327DD41C7028}" dt="2022-09-14T08:22:32.916" v="1007" actId="478"/>
+        <pc:chgData name="Cathrine Duedahl-Olesen" userId="0f4ad920445e6980" providerId="LiveId" clId="{DC7B2068-E1F4-4E5C-877E-327DD41C7028}" dt="2022-09-14T12:34:34.864" v="1164" actId="207"/>
         <pc:sldMkLst>
           <pc:docMk/>
           <pc:sldMk cId="245590996" sldId="262"/>
         </pc:sldMkLst>
+        <pc:spChg chg="add mod ord">
+          <ac:chgData name="Cathrine Duedahl-Olesen" userId="0f4ad920445e6980" providerId="LiveId" clId="{DC7B2068-E1F4-4E5C-877E-327DD41C7028}" dt="2022-09-14T12:30:41.711" v="1149" actId="207"/>
+          <ac:spMkLst>
+            <pc:docMk/>
+            <pc:sldMk cId="245590996" sldId="262"/>
+            <ac:spMk id="2" creationId="{544620E1-820B-CCA4-0A77-445ED2507882}"/>
+          </ac:spMkLst>
+        </pc:spChg>
         <pc:spChg chg="del">
           <ac:chgData name="Cathrine Duedahl-Olesen" userId="0f4ad920445e6980" providerId="LiveId" clId="{DC7B2068-E1F4-4E5C-877E-327DD41C7028}" dt="2022-09-14T08:00:58.604" v="980" actId="478"/>
           <ac:spMkLst>
@@ -1319,12 +1359,92 @@
             <ac:spMk id="3" creationId="{0704C96A-78F6-D0DE-5E94-F8F91678A25E}"/>
           </ac:spMkLst>
         </pc:spChg>
+        <pc:spChg chg="add mod ord">
+          <ac:chgData name="Cathrine Duedahl-Olesen" userId="0f4ad920445e6980" providerId="LiveId" clId="{DC7B2068-E1F4-4E5C-877E-327DD41C7028}" dt="2022-09-14T12:32:15.313" v="1157" actId="1076"/>
+          <ac:spMkLst>
+            <pc:docMk/>
+            <pc:sldMk cId="245590996" sldId="262"/>
+            <ac:spMk id="3" creationId="{232A40D1-99CE-8721-9766-D1FCFF542364}"/>
+          </ac:spMkLst>
+        </pc:spChg>
+        <pc:spChg chg="add mod ord">
+          <ac:chgData name="Cathrine Duedahl-Olesen" userId="0f4ad920445e6980" providerId="LiveId" clId="{DC7B2068-E1F4-4E5C-877E-327DD41C7028}" dt="2022-09-14T12:34:34.864" v="1164" actId="207"/>
+          <ac:spMkLst>
+            <pc:docMk/>
+            <pc:sldMk cId="245590996" sldId="262"/>
+            <ac:spMk id="4" creationId="{35FCD2C6-E5A3-4DA5-2B12-FF26B9AA88BE}"/>
+          </ac:spMkLst>
+        </pc:spChg>
         <pc:picChg chg="add del mod">
           <ac:chgData name="Cathrine Duedahl-Olesen" userId="0f4ad920445e6980" providerId="LiveId" clId="{DC7B2068-E1F4-4E5C-877E-327DD41C7028}" dt="2022-09-14T08:22:32.916" v="1007" actId="478"/>
           <ac:picMkLst>
             <pc:docMk/>
             <pc:sldMk cId="245590996" sldId="262"/>
             <ac:picMk id="5" creationId="{2A64D8BC-424A-B5D0-090B-89B4F0575AB5}"/>
+          </ac:picMkLst>
+        </pc:picChg>
+        <pc:picChg chg="add del mod">
+          <ac:chgData name="Cathrine Duedahl-Olesen" userId="0f4ad920445e6980" providerId="LiveId" clId="{DC7B2068-E1F4-4E5C-877E-327DD41C7028}" dt="2022-09-14T12:13:55.470" v="1067" actId="1076"/>
+          <ac:picMkLst>
+            <pc:docMk/>
+            <pc:sldMk cId="245590996" sldId="262"/>
+            <ac:picMk id="1026" creationId="{FEAB18A7-8AF8-C3F0-DD4D-DF1C48C854D8}"/>
+          </ac:picMkLst>
+        </pc:picChg>
+        <pc:picChg chg="add mod">
+          <ac:chgData name="Cathrine Duedahl-Olesen" userId="0f4ad920445e6980" providerId="LiveId" clId="{DC7B2068-E1F4-4E5C-877E-327DD41C7028}" dt="2022-09-14T12:30:57.832" v="1151" actId="1076"/>
+          <ac:picMkLst>
+            <pc:docMk/>
+            <pc:sldMk cId="245590996" sldId="262"/>
+            <ac:picMk id="1028" creationId="{E0DA57E9-21CA-99EA-B25B-86EEAE999903}"/>
+          </ac:picMkLst>
+        </pc:picChg>
+        <pc:picChg chg="add mod">
+          <ac:chgData name="Cathrine Duedahl-Olesen" userId="0f4ad920445e6980" providerId="LiveId" clId="{DC7B2068-E1F4-4E5C-877E-327DD41C7028}" dt="2022-09-14T12:23:24.724" v="1118" actId="1076"/>
+          <ac:picMkLst>
+            <pc:docMk/>
+            <pc:sldMk cId="245590996" sldId="262"/>
+            <ac:picMk id="1030" creationId="{CC60FBF3-A344-E2DF-45B5-F2F4A4B5DBE4}"/>
+          </ac:picMkLst>
+        </pc:picChg>
+        <pc:picChg chg="add mod">
+          <ac:chgData name="Cathrine Duedahl-Olesen" userId="0f4ad920445e6980" providerId="LiveId" clId="{DC7B2068-E1F4-4E5C-877E-327DD41C7028}" dt="2022-09-14T12:30:20.089" v="1145" actId="1076"/>
+          <ac:picMkLst>
+            <pc:docMk/>
+            <pc:sldMk cId="245590996" sldId="262"/>
+            <ac:picMk id="1032" creationId="{AF608643-E4A8-377C-DA25-0751FBB5DC71}"/>
+          </ac:picMkLst>
+        </pc:picChg>
+        <pc:picChg chg="add mod">
+          <ac:chgData name="Cathrine Duedahl-Olesen" userId="0f4ad920445e6980" providerId="LiveId" clId="{DC7B2068-E1F4-4E5C-877E-327DD41C7028}" dt="2022-09-14T12:29:54.261" v="1141" actId="1076"/>
+          <ac:picMkLst>
+            <pc:docMk/>
+            <pc:sldMk cId="245590996" sldId="262"/>
+            <ac:picMk id="1034" creationId="{11911DF9-4F47-343B-AC69-9F5E2903230E}"/>
+          </ac:picMkLst>
+        </pc:picChg>
+        <pc:picChg chg="add mod">
+          <ac:chgData name="Cathrine Duedahl-Olesen" userId="0f4ad920445e6980" providerId="LiveId" clId="{DC7B2068-E1F4-4E5C-877E-327DD41C7028}" dt="2022-09-14T12:26:01.240" v="1125" actId="1076"/>
+          <ac:picMkLst>
+            <pc:docMk/>
+            <pc:sldMk cId="245590996" sldId="262"/>
+            <ac:picMk id="1036" creationId="{350EF46F-E59A-064F-A46F-151E29A6A069}"/>
+          </ac:picMkLst>
+        </pc:picChg>
+        <pc:picChg chg="add mod">
+          <ac:chgData name="Cathrine Duedahl-Olesen" userId="0f4ad920445e6980" providerId="LiveId" clId="{DC7B2068-E1F4-4E5C-877E-327DD41C7028}" dt="2022-09-14T12:33:34.145" v="1161" actId="1076"/>
+          <ac:picMkLst>
+            <pc:docMk/>
+            <pc:sldMk cId="245590996" sldId="262"/>
+            <ac:picMk id="1038" creationId="{FC4517FA-B3A7-D63F-CF3C-822352E6BC5E}"/>
+          </ac:picMkLst>
+        </pc:picChg>
+        <pc:picChg chg="add mod">
+          <ac:chgData name="Cathrine Duedahl-Olesen" userId="0f4ad920445e6980" providerId="LiveId" clId="{DC7B2068-E1F4-4E5C-877E-327DD41C7028}" dt="2022-09-14T12:27:33.821" v="1134" actId="1076"/>
+          <ac:picMkLst>
+            <pc:docMk/>
+            <pc:sldMk cId="245590996" sldId="262"/>
+            <ac:picMk id="1040" creationId="{D3C5DDB8-2B82-0763-DF8C-941D01E979C9}"/>
           </ac:picMkLst>
         </pc:picChg>
       </pc:sldChg>
@@ -5041,7 +5161,7 @@
         </p:nvSpPr>
         <p:spPr>
           <a:xfrm rot="325130">
-            <a:off x="-63710" y="2373360"/>
+            <a:off x="-63710" y="2418650"/>
             <a:ext cx="1312204" cy="1378227"/>
           </a:xfrm>
           <a:prstGeom prst="rect">
@@ -8499,6 +8619,517 @@
           <a:chExt cx="0" cy="0"/>
         </a:xfrm>
       </p:grpSpPr>
+      <p:sp>
+        <p:nvSpPr>
+          <p:cNvPr id="4" name="Rectangle 3">
+            <a:extLst>
+              <a:ext uri="{FF2B5EF4-FFF2-40B4-BE49-F238E27FC236}">
+                <a16:creationId xmlns:a16="http://schemas.microsoft.com/office/drawing/2014/main" id="{35FCD2C6-E5A3-4DA5-2B12-FF26B9AA88BE}"/>
+              </a:ext>
+            </a:extLst>
+          </p:cNvPr>
+          <p:cNvSpPr/>
+          <p:nvPr/>
+        </p:nvSpPr>
+        <p:spPr>
+          <a:xfrm>
+            <a:off x="6096000" y="-6978"/>
+            <a:ext cx="3052130" cy="3398277"/>
+          </a:xfrm>
+          <a:prstGeom prst="rect">
+            <a:avLst/>
+          </a:prstGeom>
+          <a:solidFill>
+            <a:srgbClr val="9A1D85"/>
+          </a:solidFill>
+        </p:spPr>
+        <p:style>
+          <a:lnRef idx="2">
+            <a:schemeClr val="accent1">
+              <a:shade val="50000"/>
+            </a:schemeClr>
+          </a:lnRef>
+          <a:fillRef idx="1">
+            <a:schemeClr val="accent1"/>
+          </a:fillRef>
+          <a:effectRef idx="0">
+            <a:schemeClr val="accent1"/>
+          </a:effectRef>
+          <a:fontRef idx="minor">
+            <a:schemeClr val="lt1"/>
+          </a:fontRef>
+        </p:style>
+        <p:txBody>
+          <a:bodyPr rtlCol="0" anchor="ctr"/>
+          <a:lstStyle/>
+          <a:p>
+            <a:pPr algn="ctr"/>
+            <a:endParaRPr lang="da-DK"/>
+          </a:p>
+        </p:txBody>
+      </p:sp>
+      <p:sp>
+        <p:nvSpPr>
+          <p:cNvPr id="3" name="Rectangle 2">
+            <a:extLst>
+              <a:ext uri="{FF2B5EF4-FFF2-40B4-BE49-F238E27FC236}">
+                <a16:creationId xmlns:a16="http://schemas.microsoft.com/office/drawing/2014/main" id="{232A40D1-99CE-8721-9766-D1FCFF542364}"/>
+              </a:ext>
+            </a:extLst>
+          </p:cNvPr>
+          <p:cNvSpPr/>
+          <p:nvPr/>
+        </p:nvSpPr>
+        <p:spPr>
+          <a:xfrm>
+            <a:off x="3026084" y="-6978"/>
+            <a:ext cx="3083447" cy="3390256"/>
+          </a:xfrm>
+          <a:prstGeom prst="rect">
+            <a:avLst/>
+          </a:prstGeom>
+          <a:solidFill>
+            <a:srgbClr val="00A14B"/>
+          </a:solidFill>
+          <a:ln>
+            <a:solidFill>
+              <a:srgbClr val="00A14B"/>
+            </a:solidFill>
+          </a:ln>
+        </p:spPr>
+        <p:style>
+          <a:lnRef idx="2">
+            <a:schemeClr val="accent1">
+              <a:shade val="50000"/>
+            </a:schemeClr>
+          </a:lnRef>
+          <a:fillRef idx="1">
+            <a:schemeClr val="accent1"/>
+          </a:fillRef>
+          <a:effectRef idx="0">
+            <a:schemeClr val="accent1"/>
+          </a:effectRef>
+          <a:fontRef idx="minor">
+            <a:schemeClr val="lt1"/>
+          </a:fontRef>
+        </p:style>
+        <p:txBody>
+          <a:bodyPr rtlCol="0" anchor="ctr"/>
+          <a:lstStyle/>
+          <a:p>
+            <a:pPr algn="ctr"/>
+            <a:endParaRPr lang="da-DK"/>
+          </a:p>
+        </p:txBody>
+      </p:sp>
+      <p:sp>
+        <p:nvSpPr>
+          <p:cNvPr id="2" name="Rectangle 1">
+            <a:extLst>
+              <a:ext uri="{FF2B5EF4-FFF2-40B4-BE49-F238E27FC236}">
+                <a16:creationId xmlns:a16="http://schemas.microsoft.com/office/drawing/2014/main" id="{544620E1-820B-CCA4-0A77-445ED2507882}"/>
+              </a:ext>
+            </a:extLst>
+          </p:cNvPr>
+          <p:cNvSpPr/>
+          <p:nvPr/>
+        </p:nvSpPr>
+        <p:spPr>
+          <a:xfrm>
+            <a:off x="-1" y="-6978"/>
+            <a:ext cx="3026085" cy="3390256"/>
+          </a:xfrm>
+          <a:prstGeom prst="rect">
+            <a:avLst/>
+          </a:prstGeom>
+          <a:solidFill>
+            <a:schemeClr val="tx1"/>
+          </a:solidFill>
+        </p:spPr>
+        <p:style>
+          <a:lnRef idx="2">
+            <a:schemeClr val="accent1">
+              <a:shade val="50000"/>
+            </a:schemeClr>
+          </a:lnRef>
+          <a:fillRef idx="1">
+            <a:schemeClr val="accent1"/>
+          </a:fillRef>
+          <a:effectRef idx="0">
+            <a:schemeClr val="accent1"/>
+          </a:effectRef>
+          <a:fontRef idx="minor">
+            <a:schemeClr val="lt1"/>
+          </a:fontRef>
+        </p:style>
+        <p:txBody>
+          <a:bodyPr rtlCol="0" anchor="ctr"/>
+          <a:lstStyle/>
+          <a:p>
+            <a:pPr algn="ctr"/>
+            <a:endParaRPr lang="da-DK"/>
+          </a:p>
+        </p:txBody>
+      </p:sp>
+      <p:pic>
+        <p:nvPicPr>
+          <p:cNvPr id="1026" name="Picture 2" descr="Åbn billede">
+            <a:extLst>
+              <a:ext uri="{FF2B5EF4-FFF2-40B4-BE49-F238E27FC236}">
+                <a16:creationId xmlns:a16="http://schemas.microsoft.com/office/drawing/2014/main" id="{FEAB18A7-8AF8-C3F0-DD4D-DF1C48C854D8}"/>
+              </a:ext>
+            </a:extLst>
+          </p:cNvPr>
+          <p:cNvPicPr>
+            <a:picLocks noChangeAspect="1" noChangeArrowheads="1"/>
+          </p:cNvPicPr>
+          <p:nvPr/>
+        </p:nvPicPr>
+        <p:blipFill rotWithShape="1">
+          <a:blip r:embed="rId2">
+            <a:extLst>
+              <a:ext uri="{28A0092B-C50C-407E-A947-70E740481C1C}">
+                <a14:useLocalDpi xmlns:a14="http://schemas.microsoft.com/office/drawing/2010/main" val="0"/>
+              </a:ext>
+            </a:extLst>
+          </a:blip>
+          <a:srcRect l="66964" t="66866"/>
+          <a:stretch/>
+        </p:blipFill>
+        <p:spPr bwMode="auto">
+          <a:xfrm>
+            <a:off x="0" y="0"/>
+            <a:ext cx="1268095" cy="1268730"/>
+          </a:xfrm>
+          <a:prstGeom prst="rect">
+            <a:avLst/>
+          </a:prstGeom>
+          <a:extLst>
+            <a:ext uri="{909E8E84-426E-40DD-AFC4-6F175D3DCCD1}">
+              <a14:hiddenFill xmlns:a14="http://schemas.microsoft.com/office/drawing/2010/main">
+                <a:solidFill>
+                  <a:srgbClr val="FFFFFF"/>
+                </a:solidFill>
+              </a14:hiddenFill>
+            </a:ext>
+          </a:extLst>
+        </p:spPr>
+      </p:pic>
+      <p:pic>
+        <p:nvPicPr>
+          <p:cNvPr id="1028" name="Picture 4" descr="Ingen tilgængelig beskrivelse.">
+            <a:extLst>
+              <a:ext uri="{FF2B5EF4-FFF2-40B4-BE49-F238E27FC236}">
+                <a16:creationId xmlns:a16="http://schemas.microsoft.com/office/drawing/2014/main" id="{E0DA57E9-21CA-99EA-B25B-86EEAE999903}"/>
+              </a:ext>
+            </a:extLst>
+          </p:cNvPr>
+          <p:cNvPicPr>
+            <a:picLocks noChangeAspect="1" noChangeArrowheads="1"/>
+          </p:cNvPicPr>
+          <p:nvPr/>
+        </p:nvPicPr>
+        <p:blipFill rotWithShape="1">
+          <a:blip r:embed="rId3">
+            <a:extLst>
+              <a:ext uri="{28A0092B-C50C-407E-A947-70E740481C1C}">
+                <a14:useLocalDpi xmlns:a14="http://schemas.microsoft.com/office/drawing/2010/main" val="0"/>
+              </a:ext>
+            </a:extLst>
+          </a:blip>
+          <a:srcRect r="66749" b="67009"/>
+          <a:stretch/>
+        </p:blipFill>
+        <p:spPr bwMode="auto">
+          <a:xfrm>
+            <a:off x="3026084" y="0"/>
+            <a:ext cx="1280610" cy="1268730"/>
+          </a:xfrm>
+          <a:prstGeom prst="rect">
+            <a:avLst/>
+          </a:prstGeom>
+          <a:noFill/>
+          <a:extLst>
+            <a:ext uri="{909E8E84-426E-40DD-AFC4-6F175D3DCCD1}">
+              <a14:hiddenFill xmlns:a14="http://schemas.microsoft.com/office/drawing/2010/main">
+                <a:solidFill>
+                  <a:srgbClr val="FFFFFF"/>
+                </a:solidFill>
+              </a14:hiddenFill>
+            </a:ext>
+          </a:extLst>
+        </p:spPr>
+      </p:pic>
+      <p:pic>
+        <p:nvPicPr>
+          <p:cNvPr id="1030" name="Picture 6" descr="Ingen tilgængelig beskrivelse.">
+            <a:extLst>
+              <a:ext uri="{FF2B5EF4-FFF2-40B4-BE49-F238E27FC236}">
+                <a16:creationId xmlns:a16="http://schemas.microsoft.com/office/drawing/2014/main" id="{CC60FBF3-A344-E2DF-45B5-F2F4A4B5DBE4}"/>
+              </a:ext>
+            </a:extLst>
+          </p:cNvPr>
+          <p:cNvPicPr>
+            <a:picLocks noChangeAspect="1" noChangeArrowheads="1"/>
+          </p:cNvPicPr>
+          <p:nvPr/>
+        </p:nvPicPr>
+        <p:blipFill rotWithShape="1">
+          <a:blip r:embed="rId3">
+            <a:extLst>
+              <a:ext uri="{28A0092B-C50C-407E-A947-70E740481C1C}">
+                <a14:useLocalDpi xmlns:a14="http://schemas.microsoft.com/office/drawing/2010/main" val="0"/>
+              </a:ext>
+            </a:extLst>
+          </a:blip>
+          <a:srcRect l="33709" t="-274" r="33711" b="66706"/>
+          <a:stretch/>
+        </p:blipFill>
+        <p:spPr bwMode="auto">
+          <a:xfrm>
+            <a:off x="0" y="3383278"/>
+            <a:ext cx="1233158" cy="1268730"/>
+          </a:xfrm>
+          <a:prstGeom prst="rect">
+            <a:avLst/>
+          </a:prstGeom>
+          <a:noFill/>
+          <a:extLst>
+            <a:ext uri="{909E8E84-426E-40DD-AFC4-6F175D3DCCD1}">
+              <a14:hiddenFill xmlns:a14="http://schemas.microsoft.com/office/drawing/2010/main">
+                <a:solidFill>
+                  <a:srgbClr val="FFFFFF"/>
+                </a:solidFill>
+              </a14:hiddenFill>
+            </a:ext>
+          </a:extLst>
+        </p:spPr>
+      </p:pic>
+      <p:pic>
+        <p:nvPicPr>
+          <p:cNvPr id="1032" name="Picture 8" descr="Ingen tilgængelig beskrivelse.">
+            <a:extLst>
+              <a:ext uri="{FF2B5EF4-FFF2-40B4-BE49-F238E27FC236}">
+                <a16:creationId xmlns:a16="http://schemas.microsoft.com/office/drawing/2014/main" id="{AF608643-E4A8-377C-DA25-0751FBB5DC71}"/>
+              </a:ext>
+            </a:extLst>
+          </p:cNvPr>
+          <p:cNvPicPr>
+            <a:picLocks noChangeAspect="1" noChangeArrowheads="1"/>
+          </p:cNvPicPr>
+          <p:nvPr/>
+        </p:nvPicPr>
+        <p:blipFill rotWithShape="1">
+          <a:blip r:embed="rId3">
+            <a:extLst>
+              <a:ext uri="{28A0092B-C50C-407E-A947-70E740481C1C}">
+                <a14:useLocalDpi xmlns:a14="http://schemas.microsoft.com/office/drawing/2010/main" val="0"/>
+              </a:ext>
+            </a:extLst>
+          </a:blip>
+          <a:srcRect l="66916" b="66863"/>
+          <a:stretch/>
+        </p:blipFill>
+        <p:spPr bwMode="auto">
+          <a:xfrm>
+            <a:off x="9148130" y="0"/>
+            <a:ext cx="1268095" cy="1268282"/>
+          </a:xfrm>
+          <a:prstGeom prst="rect">
+            <a:avLst/>
+          </a:prstGeom>
+          <a:noFill/>
+          <a:extLst>
+            <a:ext uri="{909E8E84-426E-40DD-AFC4-6F175D3DCCD1}">
+              <a14:hiddenFill xmlns:a14="http://schemas.microsoft.com/office/drawing/2010/main">
+                <a:solidFill>
+                  <a:srgbClr val="FFFFFF"/>
+                </a:solidFill>
+              </a14:hiddenFill>
+            </a:ext>
+          </a:extLst>
+        </p:spPr>
+      </p:pic>
+      <p:pic>
+        <p:nvPicPr>
+          <p:cNvPr id="1034" name="Picture 10" descr="Ingen tilgængelig beskrivelse.">
+            <a:extLst>
+              <a:ext uri="{FF2B5EF4-FFF2-40B4-BE49-F238E27FC236}">
+                <a16:creationId xmlns:a16="http://schemas.microsoft.com/office/drawing/2014/main" id="{11911DF9-4F47-343B-AC69-9F5E2903230E}"/>
+              </a:ext>
+            </a:extLst>
+          </p:cNvPr>
+          <p:cNvPicPr>
+            <a:picLocks noChangeAspect="1" noChangeArrowheads="1"/>
+          </p:cNvPicPr>
+          <p:nvPr/>
+        </p:nvPicPr>
+        <p:blipFill rotWithShape="1">
+          <a:blip r:embed="rId3">
+            <a:extLst>
+              <a:ext uri="{28A0092B-C50C-407E-A947-70E740481C1C}">
+                <a14:useLocalDpi xmlns:a14="http://schemas.microsoft.com/office/drawing/2010/main" val="0"/>
+              </a:ext>
+            </a:extLst>
+          </a:blip>
+          <a:srcRect t="33608" r="67230" b="33765"/>
+          <a:stretch/>
+        </p:blipFill>
+        <p:spPr bwMode="auto">
+          <a:xfrm>
+            <a:off x="3026085" y="3391299"/>
+            <a:ext cx="1268095" cy="1260709"/>
+          </a:xfrm>
+          <a:prstGeom prst="rect">
+            <a:avLst/>
+          </a:prstGeom>
+          <a:noFill/>
+          <a:extLst>
+            <a:ext uri="{909E8E84-426E-40DD-AFC4-6F175D3DCCD1}">
+              <a14:hiddenFill xmlns:a14="http://schemas.microsoft.com/office/drawing/2010/main">
+                <a:solidFill>
+                  <a:srgbClr val="FFFFFF"/>
+                </a:solidFill>
+              </a14:hiddenFill>
+            </a:ext>
+          </a:extLst>
+        </p:spPr>
+      </p:pic>
+      <p:pic>
+        <p:nvPicPr>
+          <p:cNvPr id="1036" name="Picture 12" descr="Ingen tilgængelig beskrivelse.">
+            <a:extLst>
+              <a:ext uri="{FF2B5EF4-FFF2-40B4-BE49-F238E27FC236}">
+                <a16:creationId xmlns:a16="http://schemas.microsoft.com/office/drawing/2014/main" id="{350EF46F-E59A-064F-A46F-151E29A6A069}"/>
+              </a:ext>
+            </a:extLst>
+          </p:cNvPr>
+          <p:cNvPicPr>
+            <a:picLocks noChangeAspect="1" noChangeArrowheads="1"/>
+          </p:cNvPicPr>
+          <p:nvPr/>
+        </p:nvPicPr>
+        <p:blipFill rotWithShape="1">
+          <a:blip r:embed="rId3">
+            <a:extLst>
+              <a:ext uri="{28A0092B-C50C-407E-A947-70E740481C1C}">
+                <a14:useLocalDpi xmlns:a14="http://schemas.microsoft.com/office/drawing/2010/main" val="0"/>
+              </a:ext>
+            </a:extLst>
+          </a:blip>
+          <a:srcRect l="33241" t="33294" r="33554" b="33451"/>
+          <a:stretch/>
+        </p:blipFill>
+        <p:spPr bwMode="auto">
+          <a:xfrm>
+            <a:off x="6087108" y="3383278"/>
+            <a:ext cx="1268730" cy="1268730"/>
+          </a:xfrm>
+          <a:prstGeom prst="rect">
+            <a:avLst/>
+          </a:prstGeom>
+          <a:noFill/>
+          <a:extLst>
+            <a:ext uri="{909E8E84-426E-40DD-AFC4-6F175D3DCCD1}">
+              <a14:hiddenFill xmlns:a14="http://schemas.microsoft.com/office/drawing/2010/main">
+                <a:solidFill>
+                  <a:srgbClr val="FFFFFF"/>
+                </a:solidFill>
+              </a14:hiddenFill>
+            </a:ext>
+          </a:extLst>
+        </p:spPr>
+      </p:pic>
+      <p:pic>
+        <p:nvPicPr>
+          <p:cNvPr id="1038" name="Picture 14" descr="Ingen tilgængelig beskrivelse.">
+            <a:extLst>
+              <a:ext uri="{FF2B5EF4-FFF2-40B4-BE49-F238E27FC236}">
+                <a16:creationId xmlns:a16="http://schemas.microsoft.com/office/drawing/2014/main" id="{FC4517FA-B3A7-D63F-CF3C-822352E6BC5E}"/>
+              </a:ext>
+            </a:extLst>
+          </p:cNvPr>
+          <p:cNvPicPr>
+            <a:picLocks noChangeAspect="1" noChangeArrowheads="1"/>
+          </p:cNvPicPr>
+          <p:nvPr/>
+        </p:nvPicPr>
+        <p:blipFill rotWithShape="1">
+          <a:blip r:embed="rId3">
+            <a:extLst>
+              <a:ext uri="{28A0092B-C50C-407E-A947-70E740481C1C}">
+                <a14:useLocalDpi xmlns:a14="http://schemas.microsoft.com/office/drawing/2010/main" val="0"/>
+              </a:ext>
+            </a:extLst>
+          </a:blip>
+          <a:srcRect l="66603" t="33608" b="33451"/>
+          <a:stretch/>
+        </p:blipFill>
+        <p:spPr bwMode="auto">
+          <a:xfrm>
+            <a:off x="6118423" y="19329"/>
+            <a:ext cx="1268096" cy="1248953"/>
+          </a:xfrm>
+          <a:prstGeom prst="rect">
+            <a:avLst/>
+          </a:prstGeom>
+          <a:noFill/>
+          <a:extLst>
+            <a:ext uri="{909E8E84-426E-40DD-AFC4-6F175D3DCCD1}">
+              <a14:hiddenFill xmlns:a14="http://schemas.microsoft.com/office/drawing/2010/main">
+                <a:solidFill>
+                  <a:srgbClr val="FFFFFF"/>
+                </a:solidFill>
+              </a14:hiddenFill>
+            </a:ext>
+          </a:extLst>
+        </p:spPr>
+      </p:pic>
+      <p:pic>
+        <p:nvPicPr>
+          <p:cNvPr id="1040" name="Picture 16" descr="Ingen tilgængelig beskrivelse.">
+            <a:extLst>
+              <a:ext uri="{FF2B5EF4-FFF2-40B4-BE49-F238E27FC236}">
+                <a16:creationId xmlns:a16="http://schemas.microsoft.com/office/drawing/2014/main" id="{D3C5DDB8-2B82-0763-DF8C-941D01E979C9}"/>
+              </a:ext>
+            </a:extLst>
+          </p:cNvPr>
+          <p:cNvPicPr>
+            <a:picLocks noChangeAspect="1" noChangeArrowheads="1"/>
+          </p:cNvPicPr>
+          <p:nvPr/>
+        </p:nvPicPr>
+        <p:blipFill rotWithShape="1">
+          <a:blip r:embed="rId3">
+            <a:extLst>
+              <a:ext uri="{28A0092B-C50C-407E-A947-70E740481C1C}">
+                <a14:useLocalDpi xmlns:a14="http://schemas.microsoft.com/office/drawing/2010/main" val="0"/>
+              </a:ext>
+            </a:extLst>
+          </a:blip>
+          <a:srcRect l="33654" t="67019" r="33296" b="354"/>
+          <a:stretch/>
+        </p:blipFill>
+        <p:spPr bwMode="auto">
+          <a:xfrm>
+            <a:off x="9148130" y="3429000"/>
+            <a:ext cx="1268096" cy="1250066"/>
+          </a:xfrm>
+          <a:prstGeom prst="rect">
+            <a:avLst/>
+          </a:prstGeom>
+          <a:noFill/>
+          <a:extLst>
+            <a:ext uri="{909E8E84-426E-40DD-AFC4-6F175D3DCCD1}">
+              <a14:hiddenFill xmlns:a14="http://schemas.microsoft.com/office/drawing/2010/main">
+                <a:solidFill>
+                  <a:srgbClr val="FFFFFF"/>
+                </a:solidFill>
+              </a14:hiddenFill>
+            </a:ext>
+          </a:extLst>
+        </p:spPr>
+      </p:pic>
     </p:spTree>
     <p:extLst>
       <p:ext uri="{BB962C8B-B14F-4D97-AF65-F5344CB8AC3E}">

</xml_diff>